<commit_message>
tweaking the figure from the data description section
</commit_message>
<xml_diff>
--- a/graphics/SSIO-bucket.pptx
+++ b/graphics/SSIO-bucket.pptx
@@ -106,7 +106,7 @@
   </p:defaultTextStyle>
   <p:extLst>
     <p:ext uri="{EFAFB233-063F-42B5-8137-9DF3F51BA10A}">
-      <p15:sldGuideLst xmlns:p15="http://schemas.microsoft.com/office/powerpoint/2012/main">
+      <p15:sldGuideLst xmlns:p15="http://schemas.microsoft.com/office/powerpoint/2012/main" xmlns="">
         <p15:guide id="1" orient="horz" pos="1584" userDrawn="1">
           <p15:clr>
             <a:srgbClr val="A4A3A4"/>
@@ -312,7 +312,7 @@
           <a:p>
             <a:fld id="{BF73EB66-4118-2C4A-8381-EC775B1B24A3}" type="datetimeFigureOut">
               <a:rPr lang="en-US" smtClean="0"/>
-              <a:t>7/5/2015</a:t>
+              <a:t>7/6/15</a:t>
             </a:fld>
             <a:endParaRPr lang="en-US"/>
           </a:p>
@@ -540,7 +540,7 @@
           <a:p>
             <a:fld id="{BF73EB66-4118-2C4A-8381-EC775B1B24A3}" type="datetimeFigureOut">
               <a:rPr lang="en-US" smtClean="0"/>
-              <a:t>7/5/2015</a:t>
+              <a:t>7/6/15</a:t>
             </a:fld>
             <a:endParaRPr lang="en-US"/>
           </a:p>
@@ -697,7 +697,7 @@
           <a:p>
             <a:fld id="{BF73EB66-4118-2C4A-8381-EC775B1B24A3}" type="datetimeFigureOut">
               <a:rPr lang="en-US" smtClean="0"/>
-              <a:t>7/5/2015</a:t>
+              <a:t>7/6/15</a:t>
             </a:fld>
             <a:endParaRPr lang="en-US"/>
           </a:p>
@@ -1186,7 +1186,7 @@
         </p:nvGrpSpPr>
         <p:grpSpPr>
           <a:xfrm>
-            <a:off x="3355" y="-8793"/>
+            <a:off x="231121" y="115443"/>
             <a:ext cx="5676889" cy="1620225"/>
             <a:chOff x="622102" y="1220597"/>
             <a:chExt cx="5676890" cy="1620225"/>
@@ -1905,7 +1905,6 @@
                   <a:rPr lang="en-US" sz="1100" dirty="0"/>
                   <a:t>SSIO layer</a:t>
                 </a:r>
-                <a:endParaRPr lang="en-US" sz="1100" dirty="0"/>
               </a:p>
             </p:txBody>
           </p:sp>
@@ -1941,7 +1940,6 @@
                   <a:rPr lang="en-US" sz="1100" dirty="0"/>
                   <a:t>and reduction</a:t>
                 </a:r>
-                <a:endParaRPr lang="en-US" sz="1100" dirty="0"/>
               </a:p>
             </p:txBody>
           </p:sp>
@@ -1949,589 +1947,545 @@
       </p:grpSp>
       <p:grpSp>
         <p:nvGrpSpPr>
-          <p:cNvPr id="138" name="Group 137"/>
+          <p:cNvPr id="139" name="Group 138"/>
           <p:cNvGrpSpPr/>
           <p:nvPr/>
         </p:nvGrpSpPr>
         <p:grpSpPr>
           <a:xfrm>
-            <a:off x="5202" y="1709588"/>
-            <a:ext cx="5065121" cy="1465099"/>
-            <a:chOff x="623950" y="2938978"/>
-            <a:chExt cx="5065122" cy="1465100"/>
+            <a:off x="802800" y="1892259"/>
+            <a:ext cx="4062720" cy="1364643"/>
+            <a:chOff x="632533" y="3388123"/>
+            <a:chExt cx="4062721" cy="1364644"/>
           </a:xfrm>
         </p:grpSpPr>
-        <p:grpSp>
-          <p:nvGrpSpPr>
-            <p:cNvPr id="139" name="Group 138"/>
-            <p:cNvGrpSpPr/>
-            <p:nvPr/>
-          </p:nvGrpSpPr>
-          <p:grpSpPr>
-            <a:xfrm>
-              <a:off x="623950" y="2938978"/>
-              <a:ext cx="3552805" cy="1382412"/>
-              <a:chOff x="1142449" y="3370355"/>
-              <a:chExt cx="3552805" cy="1382412"/>
-            </a:xfrm>
-          </p:grpSpPr>
-          <p:sp>
-            <p:nvSpPr>
-              <p:cNvPr id="141" name="Rectangle 140"/>
-              <p:cNvSpPr/>
-              <p:nvPr/>
-            </p:nvSpPr>
-            <p:spPr>
-              <a:xfrm>
-                <a:off x="1159394" y="3744557"/>
-                <a:ext cx="274320" cy="329184"/>
-              </a:xfrm>
-              <a:prstGeom prst="rect">
-                <a:avLst/>
-              </a:prstGeom>
-            </p:spPr>
-            <p:style>
-              <a:lnRef idx="2">
-                <a:schemeClr val="dk1"/>
-              </a:lnRef>
-              <a:fillRef idx="1">
-                <a:schemeClr val="lt1"/>
-              </a:fillRef>
-              <a:effectRef idx="0">
-                <a:schemeClr val="dk1"/>
-              </a:effectRef>
-              <a:fontRef idx="minor">
-                <a:schemeClr val="dk1"/>
-              </a:fontRef>
-            </p:style>
-            <p:txBody>
-              <a:bodyPr lIns="0" rIns="0" rtlCol="0" anchor="ctr"/>
-              <a:lstStyle/>
-              <a:p>
-                <a:pPr algn="ctr"/>
-                <a:r>
-                  <a:rPr lang="en-US" sz="1100" dirty="0">
-                    <a:solidFill>
-                      <a:sysClr val="windowText" lastClr="000000"/>
-                    </a:solidFill>
-                    <a:latin typeface="Arial"/>
-                    <a:cs typeface="Arial"/>
-                  </a:rPr>
-                  <a:t>P1</a:t>
-                </a:r>
-              </a:p>
-            </p:txBody>
-          </p:sp>
-          <p:sp>
-            <p:nvSpPr>
-              <p:cNvPr id="142" name="Rectangle 141"/>
-              <p:cNvSpPr/>
-              <p:nvPr/>
-            </p:nvSpPr>
-            <p:spPr>
-              <a:xfrm>
-                <a:off x="1432305" y="3743713"/>
-                <a:ext cx="716722" cy="329184"/>
-              </a:xfrm>
-              <a:prstGeom prst="rect">
-                <a:avLst/>
-              </a:prstGeom>
-            </p:spPr>
-            <p:style>
-              <a:lnRef idx="2">
-                <a:schemeClr val="dk1"/>
-              </a:lnRef>
-              <a:fillRef idx="1">
-                <a:schemeClr val="lt1"/>
-              </a:fillRef>
-              <a:effectRef idx="0">
-                <a:schemeClr val="dk1"/>
-              </a:effectRef>
-              <a:fontRef idx="minor">
-                <a:schemeClr val="dk1"/>
-              </a:fontRef>
-            </p:style>
-            <p:txBody>
-              <a:bodyPr lIns="0" rIns="0" rtlCol="0" anchor="ctr"/>
-              <a:lstStyle/>
-              <a:p>
-                <a:pPr algn="ctr"/>
-                <a:r>
-                  <a:rPr lang="en-US" sz="1100" dirty="0">
-                    <a:solidFill>
-                      <a:sysClr val="windowText" lastClr="000000"/>
-                    </a:solidFill>
-                    <a:latin typeface="Arial"/>
-                    <a:cs typeface="Arial"/>
-                  </a:rPr>
-                  <a:t>P2</a:t>
-                </a:r>
-              </a:p>
-            </p:txBody>
-          </p:sp>
-          <p:sp>
-            <p:nvSpPr>
-              <p:cNvPr id="143" name="Rectangle 142"/>
-              <p:cNvSpPr/>
-              <p:nvPr/>
-            </p:nvSpPr>
-            <p:spPr>
-              <a:xfrm>
-                <a:off x="2154088" y="3744557"/>
-                <a:ext cx="292608" cy="329184"/>
-              </a:xfrm>
-              <a:prstGeom prst="rect">
-                <a:avLst/>
-              </a:prstGeom>
-            </p:spPr>
-            <p:style>
-              <a:lnRef idx="2">
-                <a:schemeClr val="accent1"/>
-              </a:lnRef>
-              <a:fillRef idx="1">
-                <a:schemeClr val="lt1"/>
-              </a:fillRef>
-              <a:effectRef idx="0">
-                <a:schemeClr val="accent1"/>
-              </a:effectRef>
-              <a:fontRef idx="minor">
-                <a:schemeClr val="dk1"/>
-              </a:fontRef>
-            </p:style>
-            <p:txBody>
-              <a:bodyPr lIns="0" rIns="0" rtlCol="0" anchor="ctr"/>
-              <a:lstStyle/>
-              <a:p>
-                <a:pPr algn="ctr"/>
-                <a:r>
-                  <a:rPr lang="en-US" sz="1100" dirty="0">
-                    <a:solidFill>
-                      <a:sysClr val="windowText" lastClr="000000"/>
-                    </a:solidFill>
-                    <a:latin typeface="Arial"/>
-                    <a:cs typeface="Arial"/>
-                  </a:rPr>
-                  <a:t>F1</a:t>
-                </a:r>
-              </a:p>
-            </p:txBody>
-          </p:sp>
-          <p:sp>
-            <p:nvSpPr>
-              <p:cNvPr id="144" name="Rectangle 143"/>
-              <p:cNvSpPr/>
-              <p:nvPr/>
-            </p:nvSpPr>
-            <p:spPr>
-              <a:xfrm>
-                <a:off x="2456251" y="3744557"/>
-                <a:ext cx="292608" cy="329184"/>
-              </a:xfrm>
-              <a:prstGeom prst="rect">
-                <a:avLst/>
-              </a:prstGeom>
-            </p:spPr>
-            <p:style>
-              <a:lnRef idx="2">
-                <a:schemeClr val="accent1"/>
-              </a:lnRef>
-              <a:fillRef idx="1">
-                <a:schemeClr val="lt1"/>
-              </a:fillRef>
-              <a:effectRef idx="0">
-                <a:schemeClr val="accent1"/>
-              </a:effectRef>
-              <a:fontRef idx="minor">
-                <a:schemeClr val="dk1"/>
-              </a:fontRef>
-            </p:style>
-            <p:txBody>
-              <a:bodyPr lIns="0" rIns="0" rtlCol="0" anchor="ctr"/>
-              <a:lstStyle/>
-              <a:p>
-                <a:pPr algn="ctr"/>
-                <a:r>
-                  <a:rPr lang="en-US" sz="1100" dirty="0">
-                    <a:solidFill>
-                      <a:sysClr val="windowText" lastClr="000000"/>
-                    </a:solidFill>
-                    <a:latin typeface="Arial"/>
-                    <a:cs typeface="Arial"/>
-                  </a:rPr>
-                  <a:t>G1</a:t>
-                </a:r>
-              </a:p>
-            </p:txBody>
-          </p:sp>
-          <p:sp>
-            <p:nvSpPr>
-              <p:cNvPr id="145" name="Rectangle 144"/>
-              <p:cNvSpPr/>
-              <p:nvPr/>
-            </p:nvSpPr>
-            <p:spPr>
-              <a:xfrm>
-                <a:off x="2748859" y="3746037"/>
-                <a:ext cx="548640" cy="329184"/>
-              </a:xfrm>
-              <a:prstGeom prst="rect">
-                <a:avLst/>
-              </a:prstGeom>
-            </p:spPr>
-            <p:style>
-              <a:lnRef idx="2">
-                <a:schemeClr val="accent4"/>
-              </a:lnRef>
-              <a:fillRef idx="1">
-                <a:schemeClr val="lt1"/>
-              </a:fillRef>
-              <a:effectRef idx="0">
-                <a:schemeClr val="accent4"/>
-              </a:effectRef>
-              <a:fontRef idx="minor">
-                <a:schemeClr val="dk1"/>
-              </a:fontRef>
-            </p:style>
-            <p:txBody>
-              <a:bodyPr lIns="0" rIns="0" rtlCol="0" anchor="ctr"/>
-              <a:lstStyle/>
-              <a:p>
-                <a:pPr algn="ctr"/>
-                <a:r>
-                  <a:rPr lang="en-US" sz="1100" dirty="0">
-                    <a:solidFill>
-                      <a:sysClr val="windowText" lastClr="000000"/>
-                    </a:solidFill>
-                    <a:latin typeface="Arial"/>
-                    <a:cs typeface="Arial"/>
-                  </a:rPr>
-                  <a:t>M1</a:t>
-                </a:r>
-              </a:p>
-            </p:txBody>
-          </p:sp>
-          <p:sp>
-            <p:nvSpPr>
-              <p:cNvPr id="146" name="Rectangle 145"/>
-              <p:cNvSpPr/>
-              <p:nvPr/>
-            </p:nvSpPr>
-            <p:spPr>
-              <a:xfrm>
-                <a:off x="1159394" y="4094399"/>
-                <a:ext cx="951110" cy="329184"/>
-              </a:xfrm>
-              <a:prstGeom prst="rect">
-                <a:avLst/>
-              </a:prstGeom>
-            </p:spPr>
-            <p:style>
-              <a:lnRef idx="2">
-                <a:schemeClr val="dk1"/>
-              </a:lnRef>
-              <a:fillRef idx="1">
-                <a:schemeClr val="lt1"/>
-              </a:fillRef>
-              <a:effectRef idx="0">
-                <a:schemeClr val="dk1"/>
-              </a:effectRef>
-              <a:fontRef idx="minor">
-                <a:schemeClr val="dk1"/>
-              </a:fontRef>
-            </p:style>
-            <p:txBody>
-              <a:bodyPr lIns="0" rIns="0" rtlCol="0" anchor="ctr"/>
-              <a:lstStyle/>
-              <a:p>
-                <a:pPr algn="ctr"/>
-                <a:r>
-                  <a:rPr lang="en-US" sz="1100" dirty="0">
-                    <a:solidFill>
-                      <a:sysClr val="windowText" lastClr="000000"/>
-                    </a:solidFill>
-                    <a:latin typeface="Arial"/>
-                    <a:cs typeface="Arial"/>
-                  </a:rPr>
-                  <a:t>P3</a:t>
-                </a:r>
-              </a:p>
-            </p:txBody>
-          </p:sp>
-          <p:sp>
-            <p:nvSpPr>
-              <p:cNvPr id="147" name="Rectangle 146"/>
-              <p:cNvSpPr/>
-              <p:nvPr/>
-            </p:nvSpPr>
-            <p:spPr>
-              <a:xfrm>
-                <a:off x="2781976" y="4094399"/>
-                <a:ext cx="655490" cy="329184"/>
-              </a:xfrm>
-              <a:prstGeom prst="rect">
-                <a:avLst/>
-              </a:prstGeom>
-            </p:spPr>
-            <p:style>
-              <a:lnRef idx="2">
-                <a:schemeClr val="accent1"/>
-              </a:lnRef>
-              <a:fillRef idx="1">
-                <a:schemeClr val="lt1"/>
-              </a:fillRef>
-              <a:effectRef idx="0">
-                <a:schemeClr val="accent1"/>
-              </a:effectRef>
-              <a:fontRef idx="minor">
-                <a:schemeClr val="dk1"/>
-              </a:fontRef>
-            </p:style>
-            <p:txBody>
-              <a:bodyPr lIns="0" rIns="0" rtlCol="0" anchor="ctr"/>
-              <a:lstStyle/>
-              <a:p>
-                <a:pPr algn="ctr"/>
-                <a:r>
-                  <a:rPr lang="en-US" sz="1100" dirty="0">
-                    <a:solidFill>
-                      <a:sysClr val="windowText" lastClr="000000"/>
-                    </a:solidFill>
-                    <a:latin typeface="Arial"/>
-                    <a:cs typeface="Arial"/>
-                  </a:rPr>
-                  <a:t>G2</a:t>
-                </a:r>
-              </a:p>
-            </p:txBody>
-          </p:sp>
-          <p:sp>
-            <p:nvSpPr>
-              <p:cNvPr id="148" name="Rectangle 147"/>
-              <p:cNvSpPr/>
-              <p:nvPr/>
-            </p:nvSpPr>
-            <p:spPr>
-              <a:xfrm>
-                <a:off x="3448794" y="4088569"/>
-                <a:ext cx="1246460" cy="329184"/>
-              </a:xfrm>
-              <a:prstGeom prst="rect">
-                <a:avLst/>
-              </a:prstGeom>
-            </p:spPr>
-            <p:style>
-              <a:lnRef idx="2">
-                <a:schemeClr val="accent4"/>
-              </a:lnRef>
-              <a:fillRef idx="1">
-                <a:schemeClr val="lt1"/>
-              </a:fillRef>
-              <a:effectRef idx="0">
-                <a:schemeClr val="accent4"/>
-              </a:effectRef>
-              <a:fontRef idx="minor">
-                <a:schemeClr val="dk1"/>
-              </a:fontRef>
-            </p:style>
-            <p:txBody>
-              <a:bodyPr lIns="0" rIns="0" rtlCol="0" anchor="ctr"/>
-              <a:lstStyle/>
-              <a:p>
-                <a:pPr algn="ctr"/>
-                <a:r>
-                  <a:rPr lang="en-US" sz="1100" dirty="0">
-                    <a:solidFill>
-                      <a:sysClr val="windowText" lastClr="000000"/>
-                    </a:solidFill>
-                    <a:latin typeface="Arial"/>
-                    <a:cs typeface="Arial"/>
-                  </a:rPr>
-                  <a:t>M2</a:t>
-                </a:r>
-              </a:p>
-            </p:txBody>
-          </p:sp>
-          <p:sp>
-            <p:nvSpPr>
-              <p:cNvPr id="149" name="Rectangle 148"/>
-              <p:cNvSpPr/>
-              <p:nvPr/>
-            </p:nvSpPr>
-            <p:spPr>
-              <a:xfrm>
-                <a:off x="2115158" y="4094399"/>
-                <a:ext cx="655490" cy="329184"/>
-              </a:xfrm>
-              <a:prstGeom prst="rect">
-                <a:avLst/>
-              </a:prstGeom>
-            </p:spPr>
-            <p:style>
-              <a:lnRef idx="2">
-                <a:schemeClr val="accent1"/>
-              </a:lnRef>
-              <a:fillRef idx="1">
-                <a:schemeClr val="lt1"/>
-              </a:fillRef>
-              <a:effectRef idx="0">
-                <a:schemeClr val="accent1"/>
-              </a:effectRef>
-              <a:fontRef idx="minor">
-                <a:schemeClr val="dk1"/>
-              </a:fontRef>
-            </p:style>
-            <p:txBody>
-              <a:bodyPr lIns="0" rIns="0" rtlCol="0" anchor="ctr"/>
-              <a:lstStyle/>
-              <a:p>
-                <a:pPr algn="ctr"/>
-                <a:r>
-                  <a:rPr lang="en-US" sz="1100" dirty="0">
-                    <a:solidFill>
-                      <a:sysClr val="windowText" lastClr="000000"/>
-                    </a:solidFill>
-                    <a:latin typeface="Arial"/>
-                    <a:cs typeface="Arial"/>
-                  </a:rPr>
-                  <a:t>F2</a:t>
-                </a:r>
-              </a:p>
-            </p:txBody>
-          </p:sp>
-          <p:sp>
-            <p:nvSpPr>
-              <p:cNvPr id="150" name="Rectangle 149"/>
-              <p:cNvSpPr/>
-              <p:nvPr/>
-            </p:nvSpPr>
-            <p:spPr>
-              <a:xfrm>
-                <a:off x="1165702" y="4423583"/>
-                <a:ext cx="951110" cy="329184"/>
-              </a:xfrm>
-              <a:prstGeom prst="rect">
-                <a:avLst/>
-              </a:prstGeom>
-            </p:spPr>
-            <p:style>
-              <a:lnRef idx="2">
-                <a:schemeClr val="dk1"/>
-              </a:lnRef>
-              <a:fillRef idx="1">
-                <a:schemeClr val="lt1"/>
-              </a:fillRef>
-              <a:effectRef idx="0">
-                <a:schemeClr val="dk1"/>
-              </a:effectRef>
-              <a:fontRef idx="minor">
-                <a:schemeClr val="dk1"/>
-              </a:fontRef>
-            </p:style>
-            <p:txBody>
-              <a:bodyPr lIns="0" rIns="0" rtlCol="0" anchor="ctr"/>
-              <a:lstStyle/>
-              <a:p>
-                <a:pPr algn="ctr"/>
-                <a:r>
-                  <a:rPr lang="en-US" sz="1100" dirty="0">
-                    <a:solidFill>
-                      <a:sysClr val="windowText" lastClr="000000"/>
-                    </a:solidFill>
-                    <a:latin typeface="Arial"/>
-                    <a:cs typeface="Arial"/>
-                  </a:rPr>
-                  <a:t>P3</a:t>
-                </a:r>
-              </a:p>
-            </p:txBody>
-          </p:sp>
-          <p:sp>
-            <p:nvSpPr>
-              <p:cNvPr id="151" name="Rectangle 150"/>
-              <p:cNvSpPr/>
-              <p:nvPr/>
-            </p:nvSpPr>
-            <p:spPr>
-              <a:xfrm>
-                <a:off x="2125985" y="4423583"/>
-                <a:ext cx="1746504" cy="329184"/>
-              </a:xfrm>
-              <a:prstGeom prst="rect">
-                <a:avLst/>
-              </a:prstGeom>
-            </p:spPr>
-            <p:style>
-              <a:lnRef idx="2">
-                <a:schemeClr val="dk1"/>
-              </a:lnRef>
-              <a:fillRef idx="1">
-                <a:schemeClr val="lt1"/>
-              </a:fillRef>
-              <a:effectRef idx="0">
-                <a:schemeClr val="dk1"/>
-              </a:effectRef>
-              <a:fontRef idx="minor">
-                <a:schemeClr val="dk1"/>
-              </a:fontRef>
-            </p:style>
-            <p:txBody>
-              <a:bodyPr lIns="0" rIns="0" rtlCol="0" anchor="ctr"/>
-              <a:lstStyle/>
-              <a:p>
-                <a:pPr algn="ctr"/>
-                <a:r>
-                  <a:rPr lang="en-US" sz="1100" dirty="0">
-                    <a:solidFill>
-                      <a:sysClr val="windowText" lastClr="000000"/>
-                    </a:solidFill>
-                    <a:latin typeface="Arial"/>
-                    <a:cs typeface="Arial"/>
-                  </a:rPr>
-                  <a:t>P4</a:t>
-                </a:r>
-              </a:p>
-            </p:txBody>
-          </p:sp>
-          <p:sp>
-            <p:nvSpPr>
-              <p:cNvPr id="152" name="TextBox 151"/>
-              <p:cNvSpPr txBox="1"/>
-              <p:nvPr/>
-            </p:nvSpPr>
-            <p:spPr>
-              <a:xfrm>
-                <a:off x="1142449" y="3370355"/>
-                <a:ext cx="1019831" cy="261610"/>
-              </a:xfrm>
-              <a:prstGeom prst="rect">
-                <a:avLst/>
-              </a:prstGeom>
-              <a:noFill/>
-            </p:spPr>
-            <p:txBody>
-              <a:bodyPr wrap="none" rtlCol="0">
-                <a:spAutoFit/>
-              </a:bodyPr>
-              <a:lstStyle/>
-              <a:p>
-                <a:r>
-                  <a:rPr lang="en-US" sz="1100" dirty="0"/>
-                  <a:t>Original layout</a:t>
-                </a:r>
-              </a:p>
-            </p:txBody>
-          </p:sp>
-        </p:grpSp>
         <p:sp>
           <p:nvSpPr>
-            <p:cNvPr id="140" name="TextBox 139"/>
+            <p:cNvPr id="141" name="Rectangle 140"/>
+            <p:cNvSpPr/>
+            <p:nvPr/>
+          </p:nvSpPr>
+          <p:spPr>
+            <a:xfrm>
+              <a:off x="1159394" y="3744557"/>
+              <a:ext cx="274320" cy="329184"/>
+            </a:xfrm>
+            <a:prstGeom prst="rect">
+              <a:avLst/>
+            </a:prstGeom>
+          </p:spPr>
+          <p:style>
+            <a:lnRef idx="2">
+              <a:schemeClr val="dk1"/>
+            </a:lnRef>
+            <a:fillRef idx="1">
+              <a:schemeClr val="lt1"/>
+            </a:fillRef>
+            <a:effectRef idx="0">
+              <a:schemeClr val="dk1"/>
+            </a:effectRef>
+            <a:fontRef idx="minor">
+              <a:schemeClr val="dk1"/>
+            </a:fontRef>
+          </p:style>
+          <p:txBody>
+            <a:bodyPr lIns="0" rIns="0" rtlCol="0" anchor="ctr"/>
+            <a:lstStyle/>
+            <a:p>
+              <a:pPr algn="ctr"/>
+              <a:r>
+                <a:rPr lang="en-US" sz="1100" dirty="0">
+                  <a:solidFill>
+                    <a:sysClr val="windowText" lastClr="000000"/>
+                  </a:solidFill>
+                  <a:latin typeface="Arial"/>
+                  <a:cs typeface="Arial"/>
+                </a:rPr>
+                <a:t>P1</a:t>
+              </a:r>
+            </a:p>
+          </p:txBody>
+        </p:sp>
+        <p:sp>
+          <p:nvSpPr>
+            <p:cNvPr id="142" name="Rectangle 141"/>
+            <p:cNvSpPr/>
+            <p:nvPr/>
+          </p:nvSpPr>
+          <p:spPr>
+            <a:xfrm>
+              <a:off x="1432305" y="3743713"/>
+              <a:ext cx="716722" cy="329184"/>
+            </a:xfrm>
+            <a:prstGeom prst="rect">
+              <a:avLst/>
+            </a:prstGeom>
+          </p:spPr>
+          <p:style>
+            <a:lnRef idx="2">
+              <a:schemeClr val="dk1"/>
+            </a:lnRef>
+            <a:fillRef idx="1">
+              <a:schemeClr val="lt1"/>
+            </a:fillRef>
+            <a:effectRef idx="0">
+              <a:schemeClr val="dk1"/>
+            </a:effectRef>
+            <a:fontRef idx="minor">
+              <a:schemeClr val="dk1"/>
+            </a:fontRef>
+          </p:style>
+          <p:txBody>
+            <a:bodyPr lIns="0" rIns="0" rtlCol="0" anchor="ctr"/>
+            <a:lstStyle/>
+            <a:p>
+              <a:pPr algn="ctr"/>
+              <a:r>
+                <a:rPr lang="en-US" sz="1100" dirty="0">
+                  <a:solidFill>
+                    <a:sysClr val="windowText" lastClr="000000"/>
+                  </a:solidFill>
+                  <a:latin typeface="Arial"/>
+                  <a:cs typeface="Arial"/>
+                </a:rPr>
+                <a:t>P2</a:t>
+              </a:r>
+            </a:p>
+          </p:txBody>
+        </p:sp>
+        <p:sp>
+          <p:nvSpPr>
+            <p:cNvPr id="143" name="Rectangle 142"/>
+            <p:cNvSpPr/>
+            <p:nvPr/>
+          </p:nvSpPr>
+          <p:spPr>
+            <a:xfrm>
+              <a:off x="2154088" y="3744557"/>
+              <a:ext cx="292608" cy="329184"/>
+            </a:xfrm>
+            <a:prstGeom prst="rect">
+              <a:avLst/>
+            </a:prstGeom>
+          </p:spPr>
+          <p:style>
+            <a:lnRef idx="2">
+              <a:schemeClr val="accent1"/>
+            </a:lnRef>
+            <a:fillRef idx="1">
+              <a:schemeClr val="lt1"/>
+            </a:fillRef>
+            <a:effectRef idx="0">
+              <a:schemeClr val="accent1"/>
+            </a:effectRef>
+            <a:fontRef idx="minor">
+              <a:schemeClr val="dk1"/>
+            </a:fontRef>
+          </p:style>
+          <p:txBody>
+            <a:bodyPr lIns="0" rIns="0" rtlCol="0" anchor="ctr"/>
+            <a:lstStyle/>
+            <a:p>
+              <a:pPr algn="ctr"/>
+              <a:r>
+                <a:rPr lang="en-US" sz="1100" dirty="0">
+                  <a:solidFill>
+                    <a:sysClr val="windowText" lastClr="000000"/>
+                  </a:solidFill>
+                  <a:latin typeface="Arial"/>
+                  <a:cs typeface="Arial"/>
+                </a:rPr>
+                <a:t>F1</a:t>
+              </a:r>
+            </a:p>
+          </p:txBody>
+        </p:sp>
+        <p:sp>
+          <p:nvSpPr>
+            <p:cNvPr id="144" name="Rectangle 143"/>
+            <p:cNvSpPr/>
+            <p:nvPr/>
+          </p:nvSpPr>
+          <p:spPr>
+            <a:xfrm>
+              <a:off x="2456251" y="3744557"/>
+              <a:ext cx="292608" cy="329184"/>
+            </a:xfrm>
+            <a:prstGeom prst="rect">
+              <a:avLst/>
+            </a:prstGeom>
+          </p:spPr>
+          <p:style>
+            <a:lnRef idx="2">
+              <a:schemeClr val="accent1"/>
+            </a:lnRef>
+            <a:fillRef idx="1">
+              <a:schemeClr val="lt1"/>
+            </a:fillRef>
+            <a:effectRef idx="0">
+              <a:schemeClr val="accent1"/>
+            </a:effectRef>
+            <a:fontRef idx="minor">
+              <a:schemeClr val="dk1"/>
+            </a:fontRef>
+          </p:style>
+          <p:txBody>
+            <a:bodyPr lIns="0" rIns="0" rtlCol="0" anchor="ctr"/>
+            <a:lstStyle/>
+            <a:p>
+              <a:pPr algn="ctr"/>
+              <a:r>
+                <a:rPr lang="en-US" sz="1100" dirty="0">
+                  <a:solidFill>
+                    <a:sysClr val="windowText" lastClr="000000"/>
+                  </a:solidFill>
+                  <a:latin typeface="Arial"/>
+                  <a:cs typeface="Arial"/>
+                </a:rPr>
+                <a:t>G1</a:t>
+              </a:r>
+            </a:p>
+          </p:txBody>
+        </p:sp>
+        <p:sp>
+          <p:nvSpPr>
+            <p:cNvPr id="145" name="Rectangle 144"/>
+            <p:cNvSpPr/>
+            <p:nvPr/>
+          </p:nvSpPr>
+          <p:spPr>
+            <a:xfrm>
+              <a:off x="2748859" y="3746037"/>
+              <a:ext cx="548640" cy="329184"/>
+            </a:xfrm>
+            <a:prstGeom prst="rect">
+              <a:avLst/>
+            </a:prstGeom>
+          </p:spPr>
+          <p:style>
+            <a:lnRef idx="2">
+              <a:schemeClr val="accent4"/>
+            </a:lnRef>
+            <a:fillRef idx="1">
+              <a:schemeClr val="lt1"/>
+            </a:fillRef>
+            <a:effectRef idx="0">
+              <a:schemeClr val="accent4"/>
+            </a:effectRef>
+            <a:fontRef idx="minor">
+              <a:schemeClr val="dk1"/>
+            </a:fontRef>
+          </p:style>
+          <p:txBody>
+            <a:bodyPr lIns="0" rIns="0" rtlCol="0" anchor="ctr"/>
+            <a:lstStyle/>
+            <a:p>
+              <a:pPr algn="ctr"/>
+              <a:r>
+                <a:rPr lang="en-US" sz="1100" dirty="0">
+                  <a:solidFill>
+                    <a:sysClr val="windowText" lastClr="000000"/>
+                  </a:solidFill>
+                  <a:latin typeface="Arial"/>
+                  <a:cs typeface="Arial"/>
+                </a:rPr>
+                <a:t>M1</a:t>
+              </a:r>
+            </a:p>
+          </p:txBody>
+        </p:sp>
+        <p:sp>
+          <p:nvSpPr>
+            <p:cNvPr id="146" name="Rectangle 145"/>
+            <p:cNvSpPr/>
+            <p:nvPr/>
+          </p:nvSpPr>
+          <p:spPr>
+            <a:xfrm>
+              <a:off x="1159394" y="4094399"/>
+              <a:ext cx="951110" cy="329184"/>
+            </a:xfrm>
+            <a:prstGeom prst="rect">
+              <a:avLst/>
+            </a:prstGeom>
+          </p:spPr>
+          <p:style>
+            <a:lnRef idx="2">
+              <a:schemeClr val="dk1"/>
+            </a:lnRef>
+            <a:fillRef idx="1">
+              <a:schemeClr val="lt1"/>
+            </a:fillRef>
+            <a:effectRef idx="0">
+              <a:schemeClr val="dk1"/>
+            </a:effectRef>
+            <a:fontRef idx="minor">
+              <a:schemeClr val="dk1"/>
+            </a:fontRef>
+          </p:style>
+          <p:txBody>
+            <a:bodyPr lIns="0" rIns="0" rtlCol="0" anchor="ctr"/>
+            <a:lstStyle/>
+            <a:p>
+              <a:pPr algn="ctr"/>
+              <a:r>
+                <a:rPr lang="en-US" sz="1100" dirty="0">
+                  <a:solidFill>
+                    <a:sysClr val="windowText" lastClr="000000"/>
+                  </a:solidFill>
+                  <a:latin typeface="Arial"/>
+                  <a:cs typeface="Arial"/>
+                </a:rPr>
+                <a:t>P3</a:t>
+              </a:r>
+            </a:p>
+          </p:txBody>
+        </p:sp>
+        <p:sp>
+          <p:nvSpPr>
+            <p:cNvPr id="147" name="Rectangle 146"/>
+            <p:cNvSpPr/>
+            <p:nvPr/>
+          </p:nvSpPr>
+          <p:spPr>
+            <a:xfrm>
+              <a:off x="2781976" y="4094399"/>
+              <a:ext cx="655490" cy="329184"/>
+            </a:xfrm>
+            <a:prstGeom prst="rect">
+              <a:avLst/>
+            </a:prstGeom>
+          </p:spPr>
+          <p:style>
+            <a:lnRef idx="2">
+              <a:schemeClr val="accent1"/>
+            </a:lnRef>
+            <a:fillRef idx="1">
+              <a:schemeClr val="lt1"/>
+            </a:fillRef>
+            <a:effectRef idx="0">
+              <a:schemeClr val="accent1"/>
+            </a:effectRef>
+            <a:fontRef idx="minor">
+              <a:schemeClr val="dk1"/>
+            </a:fontRef>
+          </p:style>
+          <p:txBody>
+            <a:bodyPr lIns="0" rIns="0" rtlCol="0" anchor="ctr"/>
+            <a:lstStyle/>
+            <a:p>
+              <a:pPr algn="ctr"/>
+              <a:r>
+                <a:rPr lang="en-US" sz="1100" dirty="0">
+                  <a:solidFill>
+                    <a:sysClr val="windowText" lastClr="000000"/>
+                  </a:solidFill>
+                  <a:latin typeface="Arial"/>
+                  <a:cs typeface="Arial"/>
+                </a:rPr>
+                <a:t>G2</a:t>
+              </a:r>
+            </a:p>
+          </p:txBody>
+        </p:sp>
+        <p:sp>
+          <p:nvSpPr>
+            <p:cNvPr id="148" name="Rectangle 147"/>
+            <p:cNvSpPr/>
+            <p:nvPr/>
+          </p:nvSpPr>
+          <p:spPr>
+            <a:xfrm>
+              <a:off x="3448794" y="4088569"/>
+              <a:ext cx="1246460" cy="329184"/>
+            </a:xfrm>
+            <a:prstGeom prst="rect">
+              <a:avLst/>
+            </a:prstGeom>
+          </p:spPr>
+          <p:style>
+            <a:lnRef idx="2">
+              <a:schemeClr val="accent4"/>
+            </a:lnRef>
+            <a:fillRef idx="1">
+              <a:schemeClr val="lt1"/>
+            </a:fillRef>
+            <a:effectRef idx="0">
+              <a:schemeClr val="accent4"/>
+            </a:effectRef>
+            <a:fontRef idx="minor">
+              <a:schemeClr val="dk1"/>
+            </a:fontRef>
+          </p:style>
+          <p:txBody>
+            <a:bodyPr lIns="0" rIns="0" rtlCol="0" anchor="ctr"/>
+            <a:lstStyle/>
+            <a:p>
+              <a:pPr algn="ctr"/>
+              <a:r>
+                <a:rPr lang="en-US" sz="1100" dirty="0">
+                  <a:solidFill>
+                    <a:sysClr val="windowText" lastClr="000000"/>
+                  </a:solidFill>
+                  <a:latin typeface="Arial"/>
+                  <a:cs typeface="Arial"/>
+                </a:rPr>
+                <a:t>M2</a:t>
+              </a:r>
+            </a:p>
+          </p:txBody>
+        </p:sp>
+        <p:sp>
+          <p:nvSpPr>
+            <p:cNvPr id="149" name="Rectangle 148"/>
+            <p:cNvSpPr/>
+            <p:nvPr/>
+          </p:nvSpPr>
+          <p:spPr>
+            <a:xfrm>
+              <a:off x="2115158" y="4094399"/>
+              <a:ext cx="655490" cy="329184"/>
+            </a:xfrm>
+            <a:prstGeom prst="rect">
+              <a:avLst/>
+            </a:prstGeom>
+          </p:spPr>
+          <p:style>
+            <a:lnRef idx="2">
+              <a:schemeClr val="accent1"/>
+            </a:lnRef>
+            <a:fillRef idx="1">
+              <a:schemeClr val="lt1"/>
+            </a:fillRef>
+            <a:effectRef idx="0">
+              <a:schemeClr val="accent1"/>
+            </a:effectRef>
+            <a:fontRef idx="minor">
+              <a:schemeClr val="dk1"/>
+            </a:fontRef>
+          </p:style>
+          <p:txBody>
+            <a:bodyPr lIns="0" rIns="0" rtlCol="0" anchor="ctr"/>
+            <a:lstStyle/>
+            <a:p>
+              <a:pPr algn="ctr"/>
+              <a:r>
+                <a:rPr lang="en-US" sz="1100" dirty="0">
+                  <a:solidFill>
+                    <a:sysClr val="windowText" lastClr="000000"/>
+                  </a:solidFill>
+                  <a:latin typeface="Arial"/>
+                  <a:cs typeface="Arial"/>
+                </a:rPr>
+                <a:t>F2</a:t>
+              </a:r>
+            </a:p>
+          </p:txBody>
+        </p:sp>
+        <p:sp>
+          <p:nvSpPr>
+            <p:cNvPr id="150" name="Rectangle 149"/>
+            <p:cNvSpPr/>
+            <p:nvPr/>
+          </p:nvSpPr>
+          <p:spPr>
+            <a:xfrm>
+              <a:off x="1165702" y="4423583"/>
+              <a:ext cx="951110" cy="329184"/>
+            </a:xfrm>
+            <a:prstGeom prst="rect">
+              <a:avLst/>
+            </a:prstGeom>
+          </p:spPr>
+          <p:style>
+            <a:lnRef idx="2">
+              <a:schemeClr val="dk1"/>
+            </a:lnRef>
+            <a:fillRef idx="1">
+              <a:schemeClr val="lt1"/>
+            </a:fillRef>
+            <a:effectRef idx="0">
+              <a:schemeClr val="dk1"/>
+            </a:effectRef>
+            <a:fontRef idx="minor">
+              <a:schemeClr val="dk1"/>
+            </a:fontRef>
+          </p:style>
+          <p:txBody>
+            <a:bodyPr lIns="0" rIns="0" rtlCol="0" anchor="ctr"/>
+            <a:lstStyle/>
+            <a:p>
+              <a:pPr algn="ctr"/>
+              <a:r>
+                <a:rPr lang="en-US" sz="1100" dirty="0">
+                  <a:solidFill>
+                    <a:sysClr val="windowText" lastClr="000000"/>
+                  </a:solidFill>
+                  <a:latin typeface="Arial"/>
+                  <a:cs typeface="Arial"/>
+                </a:rPr>
+                <a:t>P3</a:t>
+              </a:r>
+            </a:p>
+          </p:txBody>
+        </p:sp>
+        <p:sp>
+          <p:nvSpPr>
+            <p:cNvPr id="151" name="Rectangle 150"/>
+            <p:cNvSpPr/>
+            <p:nvPr/>
+          </p:nvSpPr>
+          <p:spPr>
+            <a:xfrm>
+              <a:off x="2125985" y="4423583"/>
+              <a:ext cx="1746504" cy="329184"/>
+            </a:xfrm>
+            <a:prstGeom prst="rect">
+              <a:avLst/>
+            </a:prstGeom>
+          </p:spPr>
+          <p:style>
+            <a:lnRef idx="2">
+              <a:schemeClr val="dk1"/>
+            </a:lnRef>
+            <a:fillRef idx="1">
+              <a:schemeClr val="lt1"/>
+            </a:fillRef>
+            <a:effectRef idx="0">
+              <a:schemeClr val="dk1"/>
+            </a:effectRef>
+            <a:fontRef idx="minor">
+              <a:schemeClr val="dk1"/>
+            </a:fontRef>
+          </p:style>
+          <p:txBody>
+            <a:bodyPr lIns="0" rIns="0" rtlCol="0" anchor="ctr"/>
+            <a:lstStyle/>
+            <a:p>
+              <a:pPr algn="ctr"/>
+              <a:r>
+                <a:rPr lang="en-US" sz="1100" dirty="0">
+                  <a:solidFill>
+                    <a:sysClr val="windowText" lastClr="000000"/>
+                  </a:solidFill>
+                  <a:latin typeface="Arial"/>
+                  <a:cs typeface="Arial"/>
+                </a:rPr>
+                <a:t>P4</a:t>
+              </a:r>
+            </a:p>
+          </p:txBody>
+        </p:sp>
+        <p:sp>
+          <p:nvSpPr>
+            <p:cNvPr id="152" name="TextBox 151"/>
             <p:cNvSpPr txBox="1"/>
             <p:nvPr/>
           </p:nvSpPr>
           <p:spPr>
             <a:xfrm>
-              <a:off x="4231750" y="3203748"/>
-              <a:ext cx="1457322" cy="1200330"/>
+              <a:off x="632533" y="3388123"/>
+              <a:ext cx="1019831" cy="261610"/>
             </a:xfrm>
             <a:prstGeom prst="rect">
               <a:avLst/>
@@ -2545,20 +2499,8 @@
             <a:lstStyle/>
             <a:p>
               <a:r>
-                <a:rPr lang="en-US" sz="2400" dirty="0"/>
-                <a:t>PFS</a:t>
-              </a:r>
-            </a:p>
-            <a:p>
-              <a:r>
-                <a:rPr lang="en-US" sz="2400" dirty="0"/>
-                <a:t>Campaign</a:t>
-              </a:r>
-            </a:p>
-            <a:p>
-              <a:r>
-                <a:rPr lang="en-US" sz="2400" dirty="0"/>
-                <a:t>Long term</a:t>
+                <a:rPr lang="en-US" sz="1100" dirty="0"/>
+                <a:t>Original layout</a:t>
               </a:r>
             </a:p>
           </p:txBody>
@@ -2572,10 +2514,10 @@
         </p:nvGrpSpPr>
         <p:grpSpPr>
           <a:xfrm>
-            <a:off x="22534" y="3305899"/>
-            <a:ext cx="5860075" cy="1428832"/>
-            <a:chOff x="641281" y="4535287"/>
-            <a:chExt cx="5860076" cy="1428833"/>
+            <a:off x="736590" y="3459375"/>
+            <a:ext cx="5012747" cy="1389605"/>
+            <a:chOff x="41902" y="4535287"/>
+            <a:chExt cx="5012748" cy="1389606"/>
           </a:xfrm>
         </p:grpSpPr>
         <p:sp>
@@ -3056,7 +2998,7 @@
           </p:nvSpPr>
           <p:spPr>
             <a:xfrm>
-              <a:off x="641281" y="4535287"/>
+              <a:off x="41902" y="4535287"/>
               <a:ext cx="3647153" cy="261610"/>
             </a:xfrm>
             <a:prstGeom prst="rect">
@@ -3124,52 +3066,269 @@
             </a:p>
           </p:txBody>
         </p:sp>
-        <p:sp>
-          <p:nvSpPr>
-            <p:cNvPr id="166" name="TextBox 165"/>
-            <p:cNvSpPr txBox="1"/>
-            <p:nvPr/>
-          </p:nvSpPr>
-          <p:spPr>
-            <a:xfrm>
-              <a:off x="3320805" y="4763790"/>
-              <a:ext cx="3180552" cy="1200330"/>
-            </a:xfrm>
-            <a:prstGeom prst="rect">
-              <a:avLst/>
-            </a:prstGeom>
-            <a:noFill/>
-          </p:spPr>
-          <p:txBody>
-            <a:bodyPr wrap="none" rtlCol="0">
-              <a:spAutoFit/>
-            </a:bodyPr>
-            <a:lstStyle/>
-            <a:p>
-              <a:r>
-                <a:rPr lang="en-US" sz="2400" dirty="0"/>
-                <a:t>PFS</a:t>
-              </a:r>
-            </a:p>
-            <a:p>
-              <a:r>
-                <a:rPr lang="en-US" sz="2400" dirty="0"/>
-                <a:t>Campaign</a:t>
-              </a:r>
-            </a:p>
-            <a:p>
-              <a:r>
-                <a:rPr lang="en-US" sz="2400" dirty="0"/>
-                <a:t>                         Long </a:t>
-              </a:r>
-              <a:r>
-                <a:rPr lang="en-US" sz="2400" dirty="0"/>
-                <a:t>term</a:t>
-              </a:r>
-            </a:p>
-          </p:txBody>
-        </p:sp>
       </p:grpSp>
+      <p:sp>
+        <p:nvSpPr>
+          <p:cNvPr id="2" name="TextBox 1"/>
+          <p:cNvSpPr txBox="1"/>
+          <p:nvPr/>
+        </p:nvSpPr>
+        <p:spPr>
+          <a:xfrm>
+            <a:off x="471694" y="2247849"/>
+            <a:ext cx="732630" cy="246221"/>
+          </a:xfrm>
+          <a:prstGeom prst="rect">
+            <a:avLst/>
+          </a:prstGeom>
+          <a:noFill/>
+        </p:spPr>
+        <p:txBody>
+          <a:bodyPr wrap="none" rtlCol="0">
+            <a:spAutoFit/>
+          </a:bodyPr>
+          <a:lstStyle/>
+          <a:p>
+            <a:pPr algn="r"/>
+            <a:r>
+              <a:rPr lang="en-US" sz="1000" b="1" dirty="0" smtClean="0"/>
+              <a:t>Parallel FS</a:t>
+            </a:r>
+            <a:endParaRPr lang="en-US" sz="1000" b="1" dirty="0"/>
+          </a:p>
+        </p:txBody>
+      </p:sp>
+      <p:sp>
+        <p:nvSpPr>
+          <p:cNvPr id="51" name="TextBox 50"/>
+          <p:cNvSpPr txBox="1"/>
+          <p:nvPr/>
+        </p:nvSpPr>
+        <p:spPr>
+          <a:xfrm>
+            <a:off x="490918" y="2604586"/>
+            <a:ext cx="713406" cy="246221"/>
+          </a:xfrm>
+          <a:prstGeom prst="rect">
+            <a:avLst/>
+          </a:prstGeom>
+          <a:noFill/>
+        </p:spPr>
+        <p:txBody>
+          <a:bodyPr wrap="none" rtlCol="0">
+            <a:spAutoFit/>
+          </a:bodyPr>
+          <a:lstStyle/>
+          <a:p>
+            <a:pPr algn="r"/>
+            <a:r>
+              <a:rPr lang="en-US" sz="1000" b="1" dirty="0" smtClean="0"/>
+              <a:t>Campaign</a:t>
+            </a:r>
+            <a:endParaRPr lang="en-US" sz="1000" b="1" dirty="0"/>
+          </a:p>
+        </p:txBody>
+      </p:sp>
+      <p:sp>
+        <p:nvSpPr>
+          <p:cNvPr id="52" name="TextBox 51"/>
+          <p:cNvSpPr txBox="1"/>
+          <p:nvPr/>
+        </p:nvSpPr>
+        <p:spPr>
+          <a:xfrm>
+            <a:off x="455401" y="2979903"/>
+            <a:ext cx="748923" cy="246221"/>
+          </a:xfrm>
+          <a:prstGeom prst="rect">
+            <a:avLst/>
+          </a:prstGeom>
+          <a:noFill/>
+        </p:spPr>
+        <p:txBody>
+          <a:bodyPr wrap="none" rtlCol="0">
+            <a:spAutoFit/>
+          </a:bodyPr>
+          <a:lstStyle/>
+          <a:p>
+            <a:pPr algn="r"/>
+            <a:r>
+              <a:rPr lang="en-US" sz="1000" b="1" dirty="0" smtClean="0"/>
+              <a:t>Long Term</a:t>
+            </a:r>
+            <a:endParaRPr lang="en-US" sz="1000" b="1" dirty="0"/>
+          </a:p>
+        </p:txBody>
+      </p:sp>
+      <p:sp>
+        <p:nvSpPr>
+          <p:cNvPr id="53" name="TextBox 52"/>
+          <p:cNvSpPr txBox="1"/>
+          <p:nvPr/>
+        </p:nvSpPr>
+        <p:spPr>
+          <a:xfrm>
+            <a:off x="494461" y="3832733"/>
+            <a:ext cx="732630" cy="246221"/>
+          </a:xfrm>
+          <a:prstGeom prst="rect">
+            <a:avLst/>
+          </a:prstGeom>
+          <a:noFill/>
+        </p:spPr>
+        <p:txBody>
+          <a:bodyPr wrap="none" rtlCol="0">
+            <a:spAutoFit/>
+          </a:bodyPr>
+          <a:lstStyle/>
+          <a:p>
+            <a:pPr algn="r"/>
+            <a:r>
+              <a:rPr lang="en-US" sz="1000" b="1" dirty="0" smtClean="0"/>
+              <a:t>Parallel FS</a:t>
+            </a:r>
+            <a:endParaRPr lang="en-US" sz="1000" b="1" dirty="0"/>
+          </a:p>
+        </p:txBody>
+      </p:sp>
+      <p:sp>
+        <p:nvSpPr>
+          <p:cNvPr id="54" name="TextBox 53"/>
+          <p:cNvSpPr txBox="1"/>
+          <p:nvPr/>
+        </p:nvSpPr>
+        <p:spPr>
+          <a:xfrm>
+            <a:off x="513685" y="4189470"/>
+            <a:ext cx="713406" cy="246221"/>
+          </a:xfrm>
+          <a:prstGeom prst="rect">
+            <a:avLst/>
+          </a:prstGeom>
+          <a:noFill/>
+        </p:spPr>
+        <p:txBody>
+          <a:bodyPr wrap="none" rtlCol="0">
+            <a:spAutoFit/>
+          </a:bodyPr>
+          <a:lstStyle/>
+          <a:p>
+            <a:pPr algn="r"/>
+            <a:r>
+              <a:rPr lang="en-US" sz="1000" b="1" dirty="0" smtClean="0"/>
+              <a:t>Campaign</a:t>
+            </a:r>
+            <a:endParaRPr lang="en-US" sz="1000" b="1" dirty="0"/>
+          </a:p>
+        </p:txBody>
+      </p:sp>
+      <p:sp>
+        <p:nvSpPr>
+          <p:cNvPr id="55" name="TextBox 54"/>
+          <p:cNvSpPr txBox="1"/>
+          <p:nvPr/>
+        </p:nvSpPr>
+        <p:spPr>
+          <a:xfrm>
+            <a:off x="478168" y="4564787"/>
+            <a:ext cx="748923" cy="246221"/>
+          </a:xfrm>
+          <a:prstGeom prst="rect">
+            <a:avLst/>
+          </a:prstGeom>
+          <a:noFill/>
+        </p:spPr>
+        <p:txBody>
+          <a:bodyPr wrap="none" rtlCol="0">
+            <a:spAutoFit/>
+          </a:bodyPr>
+          <a:lstStyle/>
+          <a:p>
+            <a:pPr algn="r"/>
+            <a:r>
+              <a:rPr lang="en-US" sz="1000" b="1" dirty="0" smtClean="0"/>
+              <a:t>Long Term</a:t>
+            </a:r>
+            <a:endParaRPr lang="en-US" sz="1000" b="1" dirty="0"/>
+          </a:p>
+        </p:txBody>
+      </p:sp>
+      <p:cxnSp>
+        <p:nvCxnSpPr>
+          <p:cNvPr id="4" name="Straight Connector 3"/>
+          <p:cNvCxnSpPr/>
+          <p:nvPr/>
+        </p:nvCxnSpPr>
+        <p:spPr>
+          <a:xfrm flipV="1">
+            <a:off x="0" y="1794602"/>
+            <a:ext cx="6126163" cy="20707"/>
+          </a:xfrm>
+          <a:prstGeom prst="line">
+            <a:avLst/>
+          </a:prstGeom>
+          <a:ln>
+            <a:solidFill>
+              <a:schemeClr val="bg1">
+                <a:lumMod val="85000"/>
+              </a:schemeClr>
+            </a:solidFill>
+          </a:ln>
+          <a:effectLst/>
+        </p:spPr>
+        <p:style>
+          <a:lnRef idx="2">
+            <a:schemeClr val="accent1"/>
+          </a:lnRef>
+          <a:fillRef idx="0">
+            <a:schemeClr val="accent1"/>
+          </a:fillRef>
+          <a:effectRef idx="1">
+            <a:schemeClr val="accent1"/>
+          </a:effectRef>
+          <a:fontRef idx="minor">
+            <a:schemeClr val="tx1"/>
+          </a:fontRef>
+        </p:style>
+      </p:cxnSp>
+      <p:cxnSp>
+        <p:nvCxnSpPr>
+          <p:cNvPr id="58" name="Straight Connector 57"/>
+          <p:cNvCxnSpPr/>
+          <p:nvPr/>
+        </p:nvCxnSpPr>
+        <p:spPr>
+          <a:xfrm flipV="1">
+            <a:off x="-6136" y="3438668"/>
+            <a:ext cx="6126163" cy="20707"/>
+          </a:xfrm>
+          <a:prstGeom prst="line">
+            <a:avLst/>
+          </a:prstGeom>
+          <a:ln>
+            <a:solidFill>
+              <a:schemeClr val="bg1">
+                <a:lumMod val="85000"/>
+              </a:schemeClr>
+            </a:solidFill>
+          </a:ln>
+          <a:effectLst/>
+        </p:spPr>
+        <p:style>
+          <a:lnRef idx="2">
+            <a:schemeClr val="accent1"/>
+          </a:lnRef>
+          <a:fillRef idx="0">
+            <a:schemeClr val="accent1"/>
+          </a:fillRef>
+          <a:effectRef idx="1">
+            <a:schemeClr val="accent1"/>
+          </a:effectRef>
+          <a:fontRef idx="minor">
+            <a:schemeClr val="tx1"/>
+          </a:fontRef>
+        </p:style>
+      </p:cxnSp>
     </p:spTree>
     <p:extLst>
       <p:ext uri="{BB962C8B-B14F-4D97-AF65-F5344CB8AC3E}">

</xml_diff>

<commit_message>
More tweaking of figure 1.1
</commit_message>
<xml_diff>
--- a/graphics/SSIO-bucket.pptx
+++ b/graphics/SSIO-bucket.pptx
@@ -106,7 +106,7 @@
   </p:defaultTextStyle>
   <p:extLst>
     <p:ext uri="{EFAFB233-063F-42B5-8137-9DF3F51BA10A}">
-      <p15:sldGuideLst xmlns:p15="http://schemas.microsoft.com/office/powerpoint/2012/main" xmlns="">
+      <p15:sldGuideLst xmlns="" xmlns:p15="http://schemas.microsoft.com/office/powerpoint/2012/main">
         <p15:guide id="1" orient="horz" pos="1584" userDrawn="1">
           <p15:clr>
             <a:srgbClr val="A4A3A4"/>
@@ -1187,9 +1187,9 @@
         <p:grpSpPr>
           <a:xfrm>
             <a:off x="231121" y="115443"/>
-            <a:ext cx="5676889" cy="1620225"/>
+            <a:ext cx="5552542" cy="1720482"/>
             <a:chOff x="622102" y="1220597"/>
-            <a:chExt cx="5676890" cy="1620225"/>
+            <a:chExt cx="5552543" cy="1720482"/>
           </a:xfrm>
         </p:grpSpPr>
         <p:grpSp>
@@ -1451,9 +1451,9 @@
           <p:grpSpPr>
             <a:xfrm>
               <a:off x="622102" y="2072829"/>
-              <a:ext cx="5676890" cy="767993"/>
+              <a:ext cx="5552543" cy="868250"/>
               <a:chOff x="647346" y="2072829"/>
-              <a:chExt cx="5676890" cy="767993"/>
+              <a:chExt cx="5552543" cy="868250"/>
             </a:xfrm>
           </p:grpSpPr>
           <p:sp>
@@ -1916,8 +1916,8 @@
             </p:nvSpPr>
             <p:spPr>
               <a:xfrm>
-                <a:off x="4810680" y="2409935"/>
-                <a:ext cx="1513556" cy="430887"/>
+                <a:off x="4810680" y="2340915"/>
+                <a:ext cx="1389209" cy="600164"/>
               </a:xfrm>
               <a:prstGeom prst="rect">
                 <a:avLst/>
@@ -1925,7 +1925,7 @@
               <a:noFill/>
             </p:spPr>
             <p:txBody>
-              <a:bodyPr wrap="none" rtlCol="0">
+              <a:bodyPr wrap="square" rtlCol="0">
                 <a:spAutoFit/>
               </a:bodyPr>
               <a:lstStyle/>
@@ -1953,7 +1953,7 @@
         </p:nvGrpSpPr>
         <p:grpSpPr>
           <a:xfrm>
-            <a:off x="802800" y="1892259"/>
+            <a:off x="512916" y="1892259"/>
             <a:ext cx="4062720" cy="1364643"/>
             <a:chOff x="632533" y="3388123"/>
             <a:chExt cx="4062721" cy="1364644"/>
@@ -2514,7 +2514,7 @@
         </p:nvGrpSpPr>
         <p:grpSpPr>
           <a:xfrm>
-            <a:off x="736590" y="3459375"/>
+            <a:off x="446706" y="3459375"/>
             <a:ext cx="5012747" cy="1389605"/>
             <a:chOff x="41902" y="4535287"/>
             <a:chExt cx="5012748" cy="1389606"/>
@@ -3075,7 +3075,7 @@
         </p:nvSpPr>
         <p:spPr>
           <a:xfrm>
-            <a:off x="471694" y="2247849"/>
+            <a:off x="181810" y="2247849"/>
             <a:ext cx="732630" cy="246221"/>
           </a:xfrm>
           <a:prstGeom prst="rect">
@@ -3106,7 +3106,7 @@
         </p:nvSpPr>
         <p:spPr>
           <a:xfrm>
-            <a:off x="490918" y="2604586"/>
+            <a:off x="201034" y="2604586"/>
             <a:ext cx="713406" cy="246221"/>
           </a:xfrm>
           <a:prstGeom prst="rect">
@@ -3137,7 +3137,7 @@
         </p:nvSpPr>
         <p:spPr>
           <a:xfrm>
-            <a:off x="455401" y="2979903"/>
+            <a:off x="165517" y="2979903"/>
             <a:ext cx="748923" cy="246221"/>
           </a:xfrm>
           <a:prstGeom prst="rect">
@@ -3168,7 +3168,7 @@
         </p:nvSpPr>
         <p:spPr>
           <a:xfrm>
-            <a:off x="494461" y="3832733"/>
+            <a:off x="204577" y="3832733"/>
             <a:ext cx="732630" cy="246221"/>
           </a:xfrm>
           <a:prstGeom prst="rect">
@@ -3199,7 +3199,7 @@
         </p:nvSpPr>
         <p:spPr>
           <a:xfrm>
-            <a:off x="513685" y="4189470"/>
+            <a:off x="223801" y="4189470"/>
             <a:ext cx="713406" cy="246221"/>
           </a:xfrm>
           <a:prstGeom prst="rect">
@@ -3230,7 +3230,7 @@
         </p:nvSpPr>
         <p:spPr>
           <a:xfrm>
-            <a:off x="478168" y="4564787"/>
+            <a:off x="188284" y="4564787"/>
             <a:ext cx="748923" cy="246221"/>
           </a:xfrm>
           <a:prstGeom prst="rect">
@@ -3262,7 +3262,7 @@
         <p:spPr>
           <a:xfrm flipV="1">
             <a:off x="0" y="1794602"/>
-            <a:ext cx="6126163" cy="20707"/>
+            <a:ext cx="5459453" cy="20708"/>
           </a:xfrm>
           <a:prstGeom prst="line">
             <a:avLst/>
@@ -3299,8 +3299,8 @@
         </p:nvCxnSpPr>
         <p:spPr>
           <a:xfrm flipV="1">
-            <a:off x="-6136" y="3438668"/>
-            <a:ext cx="6126163" cy="20707"/>
+            <a:off x="-6136" y="3459375"/>
+            <a:ext cx="5465589" cy="1"/>
           </a:xfrm>
           <a:prstGeom prst="line">
             <a:avLst/>

</xml_diff>

<commit_message>
Still tweaking fig. 1.1
</commit_message>
<xml_diff>
--- a/graphics/SSIO-bucket.pptx
+++ b/graphics/SSIO-bucket.pptx
@@ -106,7 +106,7 @@
   </p:defaultTextStyle>
   <p:extLst>
     <p:ext uri="{EFAFB233-063F-42B5-8137-9DF3F51BA10A}">
-      <p15:sldGuideLst xmlns="" xmlns:p15="http://schemas.microsoft.com/office/powerpoint/2012/main">
+      <p15:sldGuideLst xmlns:p15="http://schemas.microsoft.com/office/powerpoint/2012/main" xmlns="">
         <p15:guide id="1" orient="horz" pos="1584" userDrawn="1">
           <p15:clr>
             <a:srgbClr val="A4A3A4"/>
@@ -1178,773 +1178,671 @@
           <a:chExt cx="0" cy="0"/>
         </a:xfrm>
       </p:grpSpPr>
-      <p:grpSp>
-        <p:nvGrpSpPr>
-          <p:cNvPr id="119" name="Group 118"/>
-          <p:cNvGrpSpPr/>
+      <p:sp>
+        <p:nvSpPr>
+          <p:cNvPr id="133" name="Rectangle 132"/>
+          <p:cNvSpPr/>
           <p:nvPr/>
-        </p:nvGrpSpPr>
-        <p:grpSpPr>
-          <a:xfrm>
-            <a:off x="231121" y="115443"/>
-            <a:ext cx="5552542" cy="1720482"/>
-            <a:chOff x="622102" y="1220597"/>
-            <a:chExt cx="5552543" cy="1720482"/>
-          </a:xfrm>
-        </p:grpSpPr>
-        <p:grpSp>
-          <p:nvGrpSpPr>
-            <p:cNvPr id="120" name="Group 119"/>
-            <p:cNvGrpSpPr/>
-            <p:nvPr/>
-          </p:nvGrpSpPr>
-          <p:grpSpPr>
-            <a:xfrm>
-              <a:off x="622102" y="1220597"/>
-              <a:ext cx="4418908" cy="657521"/>
-              <a:chOff x="622102" y="1220597"/>
-              <a:chExt cx="4418908" cy="657521"/>
-            </a:xfrm>
-          </p:grpSpPr>
-          <p:sp>
-            <p:nvSpPr>
-              <p:cNvPr id="133" name="Rectangle 132"/>
-              <p:cNvSpPr/>
-              <p:nvPr/>
-            </p:nvSpPr>
-            <p:spPr>
-              <a:xfrm>
-                <a:off x="622102" y="1220597"/>
-                <a:ext cx="4418908" cy="328339"/>
-              </a:xfrm>
-              <a:prstGeom prst="rect">
-                <a:avLst/>
-              </a:prstGeom>
-            </p:spPr>
-            <p:style>
-              <a:lnRef idx="2">
-                <a:schemeClr val="dk1"/>
-              </a:lnRef>
-              <a:fillRef idx="1">
-                <a:schemeClr val="lt1"/>
-              </a:fillRef>
-              <a:effectRef idx="0">
-                <a:schemeClr val="dk1"/>
-              </a:effectRef>
-              <a:fontRef idx="minor">
-                <a:schemeClr val="dk1"/>
-              </a:fontRef>
-            </p:style>
-            <p:txBody>
-              <a:bodyPr lIns="0" rIns="0" rtlCol="0" anchor="ctr"/>
-              <a:lstStyle/>
-              <a:p>
-                <a:pPr algn="ctr"/>
-                <a:r>
-                  <a:rPr lang="en-US" sz="1100" dirty="0">
-                    <a:solidFill>
-                      <a:sysClr val="windowText" lastClr="000000"/>
-                    </a:solidFill>
-                    <a:latin typeface="Arial"/>
-                    <a:cs typeface="Arial"/>
-                  </a:rPr>
-                  <a:t>Particle</a:t>
-                </a:r>
-              </a:p>
-            </p:txBody>
-          </p:sp>
-          <p:sp>
-            <p:nvSpPr>
-              <p:cNvPr id="134" name="Rectangle 133"/>
-              <p:cNvSpPr/>
-              <p:nvPr/>
-            </p:nvSpPr>
-            <p:spPr>
-              <a:xfrm>
-                <a:off x="622102" y="1548934"/>
-                <a:ext cx="274320" cy="329184"/>
-              </a:xfrm>
-              <a:prstGeom prst="rect">
-                <a:avLst/>
-              </a:prstGeom>
-            </p:spPr>
-            <p:style>
-              <a:lnRef idx="2">
-                <a:schemeClr val="dk1"/>
-              </a:lnRef>
-              <a:fillRef idx="1">
-                <a:schemeClr val="lt1"/>
-              </a:fillRef>
-              <a:effectRef idx="0">
-                <a:schemeClr val="dk1"/>
-              </a:effectRef>
-              <a:fontRef idx="minor">
-                <a:schemeClr val="dk1"/>
-              </a:fontRef>
-            </p:style>
-            <p:txBody>
-              <a:bodyPr lIns="0" rIns="0" rtlCol="0" anchor="ctr"/>
-              <a:lstStyle/>
-              <a:p>
-                <a:pPr algn="ctr"/>
-                <a:r>
-                  <a:rPr lang="en-US" sz="1100" dirty="0">
-                    <a:solidFill>
-                      <a:sysClr val="windowText" lastClr="000000"/>
-                    </a:solidFill>
-                    <a:latin typeface="Arial"/>
-                    <a:cs typeface="Arial"/>
-                  </a:rPr>
-                  <a:t>P1</a:t>
-                </a:r>
-              </a:p>
-            </p:txBody>
-          </p:sp>
-          <p:sp>
-            <p:nvSpPr>
-              <p:cNvPr id="135" name="Rectangle 134"/>
-              <p:cNvSpPr/>
-              <p:nvPr/>
-            </p:nvSpPr>
-            <p:spPr>
-              <a:xfrm>
-                <a:off x="895013" y="1548934"/>
-                <a:ext cx="716722" cy="329184"/>
-              </a:xfrm>
-              <a:prstGeom prst="rect">
-                <a:avLst/>
-              </a:prstGeom>
-            </p:spPr>
-            <p:style>
-              <a:lnRef idx="2">
-                <a:schemeClr val="dk1"/>
-              </a:lnRef>
-              <a:fillRef idx="1">
-                <a:schemeClr val="lt1"/>
-              </a:fillRef>
-              <a:effectRef idx="0">
-                <a:schemeClr val="dk1"/>
-              </a:effectRef>
-              <a:fontRef idx="minor">
-                <a:schemeClr val="dk1"/>
-              </a:fontRef>
-            </p:style>
-            <p:txBody>
-              <a:bodyPr lIns="0" rIns="0" rtlCol="0" anchor="ctr"/>
-              <a:lstStyle/>
-              <a:p>
-                <a:pPr algn="ctr"/>
-                <a:r>
-                  <a:rPr lang="en-US" sz="1100" dirty="0">
-                    <a:solidFill>
-                      <a:sysClr val="windowText" lastClr="000000"/>
-                    </a:solidFill>
-                    <a:latin typeface="Arial"/>
-                    <a:cs typeface="Arial"/>
-                  </a:rPr>
-                  <a:t>P2</a:t>
-                </a:r>
-              </a:p>
-            </p:txBody>
-          </p:sp>
-          <p:sp>
-            <p:nvSpPr>
-              <p:cNvPr id="136" name="Rectangle 135"/>
-              <p:cNvSpPr/>
-              <p:nvPr/>
-            </p:nvSpPr>
-            <p:spPr>
-              <a:xfrm>
-                <a:off x="1614687" y="1548934"/>
-                <a:ext cx="951110" cy="329184"/>
-              </a:xfrm>
-              <a:prstGeom prst="rect">
-                <a:avLst/>
-              </a:prstGeom>
-            </p:spPr>
-            <p:style>
-              <a:lnRef idx="2">
-                <a:schemeClr val="dk1"/>
-              </a:lnRef>
-              <a:fillRef idx="1">
-                <a:schemeClr val="lt1"/>
-              </a:fillRef>
-              <a:effectRef idx="0">
-                <a:schemeClr val="dk1"/>
-              </a:effectRef>
-              <a:fontRef idx="minor">
-                <a:schemeClr val="dk1"/>
-              </a:fontRef>
-            </p:style>
-            <p:txBody>
-              <a:bodyPr lIns="0" rIns="0" rtlCol="0" anchor="ctr"/>
-              <a:lstStyle/>
-              <a:p>
-                <a:pPr algn="ctr"/>
-                <a:r>
-                  <a:rPr lang="en-US" sz="1100" dirty="0">
-                    <a:solidFill>
-                      <a:sysClr val="windowText" lastClr="000000"/>
-                    </a:solidFill>
-                    <a:latin typeface="Arial"/>
-                    <a:cs typeface="Arial"/>
-                  </a:rPr>
-                  <a:t>P3</a:t>
-                </a:r>
-              </a:p>
-            </p:txBody>
-          </p:sp>
-          <p:sp>
-            <p:nvSpPr>
-              <p:cNvPr id="137" name="Rectangle 136"/>
-              <p:cNvSpPr/>
-              <p:nvPr/>
-            </p:nvSpPr>
-            <p:spPr>
-              <a:xfrm>
-                <a:off x="2561622" y="1548934"/>
-                <a:ext cx="1748879" cy="329184"/>
-              </a:xfrm>
-              <a:prstGeom prst="rect">
-                <a:avLst/>
-              </a:prstGeom>
-            </p:spPr>
-            <p:style>
-              <a:lnRef idx="2">
-                <a:schemeClr val="dk1"/>
-              </a:lnRef>
-              <a:fillRef idx="1">
-                <a:schemeClr val="lt1"/>
-              </a:fillRef>
-              <a:effectRef idx="0">
-                <a:schemeClr val="dk1"/>
-              </a:effectRef>
-              <a:fontRef idx="minor">
-                <a:schemeClr val="dk1"/>
-              </a:fontRef>
-            </p:style>
-            <p:txBody>
-              <a:bodyPr lIns="0" rIns="0" rtlCol="0" anchor="ctr"/>
-              <a:lstStyle/>
-              <a:p>
-                <a:pPr algn="ctr"/>
-                <a:r>
-                  <a:rPr lang="en-US" sz="1100" dirty="0">
-                    <a:solidFill>
-                      <a:sysClr val="windowText" lastClr="000000"/>
-                    </a:solidFill>
-                    <a:latin typeface="Arial"/>
-                    <a:cs typeface="Arial"/>
-                  </a:rPr>
-                  <a:t>P4</a:t>
-                </a:r>
-              </a:p>
-            </p:txBody>
-          </p:sp>
-        </p:grpSp>
-        <p:grpSp>
-          <p:nvGrpSpPr>
-            <p:cNvPr id="121" name="Group 120"/>
-            <p:cNvGrpSpPr/>
-            <p:nvPr/>
-          </p:nvGrpSpPr>
-          <p:grpSpPr>
-            <a:xfrm>
-              <a:off x="622102" y="2072829"/>
-              <a:ext cx="5552543" cy="868250"/>
-              <a:chOff x="647346" y="2072829"/>
-              <a:chExt cx="5552543" cy="868250"/>
-            </a:xfrm>
-          </p:grpSpPr>
-          <p:sp>
-            <p:nvSpPr>
-              <p:cNvPr id="122" name="Rectangle 121"/>
-              <p:cNvSpPr/>
-              <p:nvPr/>
-            </p:nvSpPr>
-            <p:spPr>
-              <a:xfrm>
-                <a:off x="649194" y="2114965"/>
-                <a:ext cx="1151113" cy="328339"/>
-              </a:xfrm>
-              <a:prstGeom prst="rect">
-                <a:avLst/>
-              </a:prstGeom>
-            </p:spPr>
-            <p:style>
-              <a:lnRef idx="2">
-                <a:schemeClr val="accent1"/>
-              </a:lnRef>
-              <a:fillRef idx="1">
-                <a:schemeClr val="lt1"/>
-              </a:fillRef>
-              <a:effectRef idx="0">
-                <a:schemeClr val="accent1"/>
-              </a:effectRef>
-              <a:fontRef idx="minor">
-                <a:schemeClr val="dk1"/>
-              </a:fontRef>
-            </p:style>
-            <p:txBody>
-              <a:bodyPr lIns="0" rIns="0" rtlCol="0" anchor="ctr"/>
-              <a:lstStyle/>
-              <a:p>
-                <a:pPr algn="ctr"/>
-                <a:r>
-                  <a:rPr lang="en-US" sz="1100" dirty="0">
-                    <a:solidFill>
-                      <a:sysClr val="windowText" lastClr="000000"/>
-                    </a:solidFill>
-                    <a:latin typeface="Arial"/>
-                    <a:cs typeface="Arial"/>
-                  </a:rPr>
-                  <a:t>Field 1</a:t>
-                </a:r>
-              </a:p>
-            </p:txBody>
-          </p:sp>
-          <p:sp>
-            <p:nvSpPr>
-              <p:cNvPr id="123" name="Rectangle 122"/>
-              <p:cNvSpPr/>
-              <p:nvPr/>
-            </p:nvSpPr>
-            <p:spPr>
-              <a:xfrm>
-                <a:off x="2955510" y="2114965"/>
-                <a:ext cx="1825337" cy="328339"/>
-              </a:xfrm>
-              <a:prstGeom prst="rect">
-                <a:avLst/>
-              </a:prstGeom>
-            </p:spPr>
-            <p:style>
-              <a:lnRef idx="2">
-                <a:schemeClr val="accent4"/>
-              </a:lnRef>
-              <a:fillRef idx="1">
-                <a:schemeClr val="lt1"/>
-              </a:fillRef>
-              <a:effectRef idx="0">
-                <a:schemeClr val="accent4"/>
-              </a:effectRef>
-              <a:fontRef idx="minor">
-                <a:schemeClr val="dk1"/>
-              </a:fontRef>
-            </p:style>
-            <p:txBody>
-              <a:bodyPr lIns="0" rIns="0" rtlCol="0" anchor="ctr"/>
-              <a:lstStyle/>
-              <a:p>
-                <a:pPr algn="ctr"/>
-                <a:r>
-                  <a:rPr lang="en-US" sz="1100" dirty="0">
-                    <a:solidFill>
-                      <a:sysClr val="windowText" lastClr="000000"/>
-                    </a:solidFill>
-                    <a:latin typeface="Arial"/>
-                    <a:cs typeface="Arial"/>
-                  </a:rPr>
-                  <a:t>Mesh</a:t>
-                </a:r>
-              </a:p>
-            </p:txBody>
-          </p:sp>
-          <p:sp>
-            <p:nvSpPr>
-              <p:cNvPr id="124" name="Rectangle 123"/>
-              <p:cNvSpPr/>
-              <p:nvPr/>
-            </p:nvSpPr>
-            <p:spPr>
-              <a:xfrm>
-                <a:off x="1805593" y="2114965"/>
-                <a:ext cx="1151113" cy="328339"/>
-              </a:xfrm>
-              <a:prstGeom prst="rect">
-                <a:avLst/>
-              </a:prstGeom>
-            </p:spPr>
-            <p:style>
-              <a:lnRef idx="2">
-                <a:schemeClr val="accent1"/>
-              </a:lnRef>
-              <a:fillRef idx="1">
-                <a:schemeClr val="lt1"/>
-              </a:fillRef>
-              <a:effectRef idx="0">
-                <a:schemeClr val="accent1"/>
-              </a:effectRef>
-              <a:fontRef idx="minor">
-                <a:schemeClr val="dk1"/>
-              </a:fontRef>
-            </p:style>
-            <p:txBody>
-              <a:bodyPr lIns="0" rIns="0" rtlCol="0" anchor="ctr"/>
-              <a:lstStyle/>
-              <a:p>
-                <a:pPr algn="ctr"/>
-                <a:r>
-                  <a:rPr lang="en-US" sz="1100" dirty="0">
-                    <a:solidFill>
-                      <a:sysClr val="windowText" lastClr="000000"/>
-                    </a:solidFill>
-                    <a:latin typeface="Arial"/>
-                    <a:cs typeface="Arial"/>
-                  </a:rPr>
-                  <a:t>Field 2</a:t>
-                </a:r>
-              </a:p>
-            </p:txBody>
-          </p:sp>
-          <p:sp>
-            <p:nvSpPr>
-              <p:cNvPr id="125" name="Rectangle 124"/>
-              <p:cNvSpPr/>
-              <p:nvPr/>
-            </p:nvSpPr>
-            <p:spPr>
-              <a:xfrm>
-                <a:off x="647346" y="2443302"/>
-                <a:ext cx="292608" cy="329184"/>
-              </a:xfrm>
-              <a:prstGeom prst="rect">
-                <a:avLst/>
-              </a:prstGeom>
-            </p:spPr>
-            <p:style>
-              <a:lnRef idx="2">
-                <a:schemeClr val="accent1"/>
-              </a:lnRef>
-              <a:fillRef idx="1">
-                <a:schemeClr val="lt1"/>
-              </a:fillRef>
-              <a:effectRef idx="0">
-                <a:schemeClr val="accent1"/>
-              </a:effectRef>
-              <a:fontRef idx="minor">
-                <a:schemeClr val="dk1"/>
-              </a:fontRef>
-            </p:style>
-            <p:txBody>
-              <a:bodyPr lIns="0" rIns="0" rtlCol="0" anchor="ctr"/>
-              <a:lstStyle/>
-              <a:p>
-                <a:pPr algn="ctr"/>
-                <a:r>
-                  <a:rPr lang="en-US" sz="1100" dirty="0">
-                    <a:solidFill>
-                      <a:sysClr val="windowText" lastClr="000000"/>
-                    </a:solidFill>
-                    <a:latin typeface="Arial"/>
-                    <a:cs typeface="Arial"/>
-                  </a:rPr>
-                  <a:t>F1</a:t>
-                </a:r>
-              </a:p>
-            </p:txBody>
-          </p:sp>
-          <p:sp>
-            <p:nvSpPr>
-              <p:cNvPr id="126" name="Rectangle 125"/>
-              <p:cNvSpPr/>
-              <p:nvPr/>
-            </p:nvSpPr>
-            <p:spPr>
-              <a:xfrm>
-                <a:off x="1817181" y="2443302"/>
-                <a:ext cx="292608" cy="329184"/>
-              </a:xfrm>
-              <a:prstGeom prst="rect">
-                <a:avLst/>
-              </a:prstGeom>
-            </p:spPr>
-            <p:style>
-              <a:lnRef idx="2">
-                <a:schemeClr val="accent1"/>
-              </a:lnRef>
-              <a:fillRef idx="1">
-                <a:schemeClr val="lt1"/>
-              </a:fillRef>
-              <a:effectRef idx="0">
-                <a:schemeClr val="accent1"/>
-              </a:effectRef>
-              <a:fontRef idx="minor">
-                <a:schemeClr val="dk1"/>
-              </a:fontRef>
-            </p:style>
-            <p:txBody>
-              <a:bodyPr lIns="0" rIns="0" rtlCol="0" anchor="ctr"/>
-              <a:lstStyle/>
-              <a:p>
-                <a:pPr algn="ctr"/>
-                <a:r>
-                  <a:rPr lang="en-US" sz="1100" dirty="0">
-                    <a:solidFill>
-                      <a:sysClr val="windowText" lastClr="000000"/>
-                    </a:solidFill>
-                    <a:latin typeface="Arial"/>
-                    <a:cs typeface="Arial"/>
-                  </a:rPr>
-                  <a:t>G1</a:t>
-                </a:r>
-              </a:p>
-            </p:txBody>
-          </p:sp>
-          <p:sp>
-            <p:nvSpPr>
-              <p:cNvPr id="127" name="Rectangle 126"/>
-              <p:cNvSpPr/>
-              <p:nvPr/>
-            </p:nvSpPr>
-            <p:spPr>
-              <a:xfrm>
-                <a:off x="2109937" y="2443302"/>
-                <a:ext cx="655490" cy="329184"/>
-              </a:xfrm>
-              <a:prstGeom prst="rect">
-                <a:avLst/>
-              </a:prstGeom>
-            </p:spPr>
-            <p:style>
-              <a:lnRef idx="2">
-                <a:schemeClr val="accent1"/>
-              </a:lnRef>
-              <a:fillRef idx="1">
-                <a:schemeClr val="lt1"/>
-              </a:fillRef>
-              <a:effectRef idx="0">
-                <a:schemeClr val="accent1"/>
-              </a:effectRef>
-              <a:fontRef idx="minor">
-                <a:schemeClr val="dk1"/>
-              </a:fontRef>
-            </p:style>
-            <p:txBody>
-              <a:bodyPr lIns="0" rIns="0" rtlCol="0" anchor="ctr"/>
-              <a:lstStyle/>
-              <a:p>
-                <a:pPr algn="ctr"/>
-                <a:r>
-                  <a:rPr lang="en-US" sz="1100" dirty="0">
-                    <a:solidFill>
-                      <a:sysClr val="windowText" lastClr="000000"/>
-                    </a:solidFill>
-                    <a:latin typeface="Arial"/>
-                    <a:cs typeface="Arial"/>
-                  </a:rPr>
-                  <a:t>G2</a:t>
-                </a:r>
-              </a:p>
-            </p:txBody>
-          </p:sp>
-          <p:sp>
-            <p:nvSpPr>
-              <p:cNvPr id="128" name="Rectangle 127"/>
-              <p:cNvSpPr/>
-              <p:nvPr/>
-            </p:nvSpPr>
-            <p:spPr>
-              <a:xfrm>
-                <a:off x="2956704" y="2443302"/>
-                <a:ext cx="548640" cy="329184"/>
-              </a:xfrm>
-              <a:prstGeom prst="rect">
-                <a:avLst/>
-              </a:prstGeom>
-            </p:spPr>
-            <p:style>
-              <a:lnRef idx="2">
-                <a:schemeClr val="accent4"/>
-              </a:lnRef>
-              <a:fillRef idx="1">
-                <a:schemeClr val="lt1"/>
-              </a:fillRef>
-              <a:effectRef idx="0">
-                <a:schemeClr val="accent4"/>
-              </a:effectRef>
-              <a:fontRef idx="minor">
-                <a:schemeClr val="dk1"/>
-              </a:fontRef>
-            </p:style>
-            <p:txBody>
-              <a:bodyPr lIns="0" rIns="0" rtlCol="0" anchor="ctr"/>
-              <a:lstStyle/>
-              <a:p>
-                <a:pPr algn="ctr"/>
-                <a:r>
-                  <a:rPr lang="en-US" sz="1100" dirty="0">
-                    <a:solidFill>
-                      <a:sysClr val="windowText" lastClr="000000"/>
-                    </a:solidFill>
-                    <a:latin typeface="Arial"/>
-                    <a:cs typeface="Arial"/>
-                  </a:rPr>
-                  <a:t>M1</a:t>
-                </a:r>
-              </a:p>
-            </p:txBody>
-          </p:sp>
-          <p:sp>
-            <p:nvSpPr>
-              <p:cNvPr id="129" name="Rectangle 128"/>
-              <p:cNvSpPr/>
-              <p:nvPr/>
-            </p:nvSpPr>
-            <p:spPr>
-              <a:xfrm>
-                <a:off x="3505344" y="2443302"/>
-                <a:ext cx="1246460" cy="329184"/>
-              </a:xfrm>
-              <a:prstGeom prst="rect">
-                <a:avLst/>
-              </a:prstGeom>
-            </p:spPr>
-            <p:style>
-              <a:lnRef idx="2">
-                <a:schemeClr val="accent4"/>
-              </a:lnRef>
-              <a:fillRef idx="1">
-                <a:schemeClr val="lt1"/>
-              </a:fillRef>
-              <a:effectRef idx="0">
-                <a:schemeClr val="accent4"/>
-              </a:effectRef>
-              <a:fontRef idx="minor">
-                <a:schemeClr val="dk1"/>
-              </a:fontRef>
-            </p:style>
-            <p:txBody>
-              <a:bodyPr lIns="0" rIns="0" rtlCol="0" anchor="ctr"/>
-              <a:lstStyle/>
-              <a:p>
-                <a:pPr algn="ctr"/>
-                <a:r>
-                  <a:rPr lang="en-US" sz="1100" dirty="0">
-                    <a:solidFill>
-                      <a:sysClr val="windowText" lastClr="000000"/>
-                    </a:solidFill>
-                    <a:latin typeface="Arial"/>
-                    <a:cs typeface="Arial"/>
-                  </a:rPr>
-                  <a:t>M2</a:t>
-                </a:r>
-              </a:p>
-            </p:txBody>
-          </p:sp>
-          <p:sp>
-            <p:nvSpPr>
-              <p:cNvPr id="130" name="Rectangle 129"/>
-              <p:cNvSpPr/>
-              <p:nvPr/>
-            </p:nvSpPr>
-            <p:spPr>
-              <a:xfrm>
-                <a:off x="934618" y="2443302"/>
-                <a:ext cx="655490" cy="329184"/>
-              </a:xfrm>
-              <a:prstGeom prst="rect">
-                <a:avLst/>
-              </a:prstGeom>
-            </p:spPr>
-            <p:style>
-              <a:lnRef idx="2">
-                <a:schemeClr val="accent1"/>
-              </a:lnRef>
-              <a:fillRef idx="1">
-                <a:schemeClr val="lt1"/>
-              </a:fillRef>
-              <a:effectRef idx="0">
-                <a:schemeClr val="accent1"/>
-              </a:effectRef>
-              <a:fontRef idx="minor">
-                <a:schemeClr val="dk1"/>
-              </a:fontRef>
-            </p:style>
-            <p:txBody>
-              <a:bodyPr lIns="0" rIns="0" rtlCol="0" anchor="ctr"/>
-              <a:lstStyle/>
-              <a:p>
-                <a:pPr algn="ctr"/>
-                <a:r>
-                  <a:rPr lang="en-US" sz="1100" dirty="0">
-                    <a:solidFill>
-                      <a:sysClr val="windowText" lastClr="000000"/>
-                    </a:solidFill>
-                    <a:latin typeface="Arial"/>
-                    <a:cs typeface="Arial"/>
-                  </a:rPr>
-                  <a:t>F2</a:t>
-                </a:r>
-              </a:p>
-            </p:txBody>
-          </p:sp>
-          <p:sp>
-            <p:nvSpPr>
-              <p:cNvPr id="131" name="TextBox 130"/>
-              <p:cNvSpPr txBox="1"/>
-              <p:nvPr/>
-            </p:nvSpPr>
-            <p:spPr>
-              <a:xfrm>
-                <a:off x="4819695" y="2072829"/>
-                <a:ext cx="756938" cy="261610"/>
-              </a:xfrm>
-              <a:prstGeom prst="rect">
-                <a:avLst/>
-              </a:prstGeom>
-              <a:noFill/>
-            </p:spPr>
-            <p:txBody>
-              <a:bodyPr wrap="none" rtlCol="0">
-                <a:spAutoFit/>
-              </a:bodyPr>
-              <a:lstStyle/>
-              <a:p>
-                <a:r>
-                  <a:rPr lang="en-US" sz="1100" dirty="0"/>
-                  <a:t>SSIO layer</a:t>
-                </a:r>
-              </a:p>
-            </p:txBody>
-          </p:sp>
-          <p:sp>
-            <p:nvSpPr>
-              <p:cNvPr id="132" name="TextBox 131"/>
-              <p:cNvSpPr txBox="1"/>
-              <p:nvPr/>
-            </p:nvSpPr>
-            <p:spPr>
-              <a:xfrm>
-                <a:off x="4810680" y="2340915"/>
-                <a:ext cx="1389209" cy="600164"/>
-              </a:xfrm>
-              <a:prstGeom prst="rect">
-                <a:avLst/>
-              </a:prstGeom>
-              <a:noFill/>
-            </p:spPr>
-            <p:txBody>
-              <a:bodyPr wrap="square" rtlCol="0">
-                <a:spAutoFit/>
-              </a:bodyPr>
-              <a:lstStyle/>
-              <a:p>
-                <a:r>
-                  <a:rPr lang="en-US" sz="1100" dirty="0"/>
-                  <a:t>App Level prioritization</a:t>
-                </a:r>
-              </a:p>
-              <a:p>
-                <a:r>
-                  <a:rPr lang="en-US" sz="1100" dirty="0"/>
-                  <a:t>and reduction</a:t>
-                </a:r>
-              </a:p>
-            </p:txBody>
-          </p:sp>
-        </p:grpSp>
-      </p:grpSp>
+        </p:nvSpPr>
+        <p:spPr>
+          <a:xfrm>
+            <a:off x="1039777" y="253488"/>
+            <a:ext cx="4418907" cy="328339"/>
+          </a:xfrm>
+          <a:prstGeom prst="rect">
+            <a:avLst/>
+          </a:prstGeom>
+        </p:spPr>
+        <p:style>
+          <a:lnRef idx="2">
+            <a:schemeClr val="dk1"/>
+          </a:lnRef>
+          <a:fillRef idx="1">
+            <a:schemeClr val="lt1"/>
+          </a:fillRef>
+          <a:effectRef idx="0">
+            <a:schemeClr val="dk1"/>
+          </a:effectRef>
+          <a:fontRef idx="minor">
+            <a:schemeClr val="dk1"/>
+          </a:fontRef>
+        </p:style>
+        <p:txBody>
+          <a:bodyPr lIns="0" rIns="0" rtlCol="0" anchor="ctr"/>
+          <a:lstStyle/>
+          <a:p>
+            <a:pPr algn="ctr"/>
+            <a:r>
+              <a:rPr lang="en-US" sz="1100" dirty="0" smtClean="0">
+                <a:solidFill>
+                  <a:sysClr val="windowText" lastClr="000000"/>
+                </a:solidFill>
+                <a:latin typeface="Arial"/>
+                <a:cs typeface="Arial"/>
+              </a:rPr>
+              <a:t>Particles</a:t>
+            </a:r>
+            <a:endParaRPr lang="en-US" sz="1100" dirty="0">
+              <a:solidFill>
+                <a:sysClr val="windowText" lastClr="000000"/>
+              </a:solidFill>
+              <a:latin typeface="Arial"/>
+              <a:cs typeface="Arial"/>
+            </a:endParaRPr>
+          </a:p>
+        </p:txBody>
+      </p:sp>
+      <p:sp>
+        <p:nvSpPr>
+          <p:cNvPr id="134" name="Rectangle 133"/>
+          <p:cNvSpPr/>
+          <p:nvPr/>
+        </p:nvSpPr>
+        <p:spPr>
+          <a:xfrm>
+            <a:off x="1045557" y="1341040"/>
+            <a:ext cx="274320" cy="329184"/>
+          </a:xfrm>
+          <a:prstGeom prst="rect">
+            <a:avLst/>
+          </a:prstGeom>
+        </p:spPr>
+        <p:style>
+          <a:lnRef idx="2">
+            <a:schemeClr val="dk1"/>
+          </a:lnRef>
+          <a:fillRef idx="1">
+            <a:schemeClr val="lt1"/>
+          </a:fillRef>
+          <a:effectRef idx="0">
+            <a:schemeClr val="dk1"/>
+          </a:effectRef>
+          <a:fontRef idx="minor">
+            <a:schemeClr val="dk1"/>
+          </a:fontRef>
+        </p:style>
+        <p:txBody>
+          <a:bodyPr lIns="0" rIns="0" rtlCol="0" anchor="ctr"/>
+          <a:lstStyle/>
+          <a:p>
+            <a:pPr algn="ctr"/>
+            <a:r>
+              <a:rPr lang="en-US" sz="1100" dirty="0">
+                <a:solidFill>
+                  <a:sysClr val="windowText" lastClr="000000"/>
+                </a:solidFill>
+                <a:latin typeface="Arial"/>
+                <a:cs typeface="Arial"/>
+              </a:rPr>
+              <a:t>P1</a:t>
+            </a:r>
+          </a:p>
+        </p:txBody>
+      </p:sp>
+      <p:sp>
+        <p:nvSpPr>
+          <p:cNvPr id="135" name="Rectangle 134"/>
+          <p:cNvSpPr/>
+          <p:nvPr/>
+        </p:nvSpPr>
+        <p:spPr>
+          <a:xfrm>
+            <a:off x="1318468" y="1341040"/>
+            <a:ext cx="716722" cy="329184"/>
+          </a:xfrm>
+          <a:prstGeom prst="rect">
+            <a:avLst/>
+          </a:prstGeom>
+        </p:spPr>
+        <p:style>
+          <a:lnRef idx="2">
+            <a:schemeClr val="dk1"/>
+          </a:lnRef>
+          <a:fillRef idx="1">
+            <a:schemeClr val="lt1"/>
+          </a:fillRef>
+          <a:effectRef idx="0">
+            <a:schemeClr val="dk1"/>
+          </a:effectRef>
+          <a:fontRef idx="minor">
+            <a:schemeClr val="dk1"/>
+          </a:fontRef>
+        </p:style>
+        <p:txBody>
+          <a:bodyPr lIns="0" rIns="0" rtlCol="0" anchor="ctr"/>
+          <a:lstStyle/>
+          <a:p>
+            <a:pPr algn="ctr"/>
+            <a:r>
+              <a:rPr lang="en-US" sz="1100" dirty="0">
+                <a:solidFill>
+                  <a:sysClr val="windowText" lastClr="000000"/>
+                </a:solidFill>
+                <a:latin typeface="Arial"/>
+                <a:cs typeface="Arial"/>
+              </a:rPr>
+              <a:t>P2</a:t>
+            </a:r>
+          </a:p>
+        </p:txBody>
+      </p:sp>
+      <p:sp>
+        <p:nvSpPr>
+          <p:cNvPr id="136" name="Rectangle 135"/>
+          <p:cNvSpPr/>
+          <p:nvPr/>
+        </p:nvSpPr>
+        <p:spPr>
+          <a:xfrm>
+            <a:off x="2038142" y="1341040"/>
+            <a:ext cx="951110" cy="329184"/>
+          </a:xfrm>
+          <a:prstGeom prst="rect">
+            <a:avLst/>
+          </a:prstGeom>
+        </p:spPr>
+        <p:style>
+          <a:lnRef idx="2">
+            <a:schemeClr val="dk1"/>
+          </a:lnRef>
+          <a:fillRef idx="1">
+            <a:schemeClr val="lt1"/>
+          </a:fillRef>
+          <a:effectRef idx="0">
+            <a:schemeClr val="dk1"/>
+          </a:effectRef>
+          <a:fontRef idx="minor">
+            <a:schemeClr val="dk1"/>
+          </a:fontRef>
+        </p:style>
+        <p:txBody>
+          <a:bodyPr lIns="0" rIns="0" rtlCol="0" anchor="ctr"/>
+          <a:lstStyle/>
+          <a:p>
+            <a:pPr algn="ctr"/>
+            <a:r>
+              <a:rPr lang="en-US" sz="1100" dirty="0">
+                <a:solidFill>
+                  <a:sysClr val="windowText" lastClr="000000"/>
+                </a:solidFill>
+                <a:latin typeface="Arial"/>
+                <a:cs typeface="Arial"/>
+              </a:rPr>
+              <a:t>P3</a:t>
+            </a:r>
+          </a:p>
+        </p:txBody>
+      </p:sp>
+      <p:sp>
+        <p:nvSpPr>
+          <p:cNvPr id="137" name="Rectangle 136"/>
+          <p:cNvSpPr/>
+          <p:nvPr/>
+        </p:nvSpPr>
+        <p:spPr>
+          <a:xfrm>
+            <a:off x="2985077" y="1341040"/>
+            <a:ext cx="1748879" cy="329184"/>
+          </a:xfrm>
+          <a:prstGeom prst="rect">
+            <a:avLst/>
+          </a:prstGeom>
+        </p:spPr>
+        <p:style>
+          <a:lnRef idx="2">
+            <a:schemeClr val="dk1"/>
+          </a:lnRef>
+          <a:fillRef idx="1">
+            <a:schemeClr val="lt1"/>
+          </a:fillRef>
+          <a:effectRef idx="0">
+            <a:schemeClr val="dk1"/>
+          </a:effectRef>
+          <a:fontRef idx="minor">
+            <a:schemeClr val="dk1"/>
+          </a:fontRef>
+        </p:style>
+        <p:txBody>
+          <a:bodyPr lIns="0" rIns="0" rtlCol="0" anchor="ctr"/>
+          <a:lstStyle/>
+          <a:p>
+            <a:pPr algn="ctr"/>
+            <a:r>
+              <a:rPr lang="en-US" sz="1100" dirty="0">
+                <a:solidFill>
+                  <a:sysClr val="windowText" lastClr="000000"/>
+                </a:solidFill>
+                <a:latin typeface="Arial"/>
+                <a:cs typeface="Arial"/>
+              </a:rPr>
+              <a:t>P4</a:t>
+            </a:r>
+          </a:p>
+        </p:txBody>
+      </p:sp>
+      <p:sp>
+        <p:nvSpPr>
+          <p:cNvPr id="122" name="Rectangle 121"/>
+          <p:cNvSpPr/>
+          <p:nvPr/>
+        </p:nvSpPr>
+        <p:spPr>
+          <a:xfrm>
+            <a:off x="1041625" y="602598"/>
+            <a:ext cx="1151113" cy="328339"/>
+          </a:xfrm>
+          <a:prstGeom prst="rect">
+            <a:avLst/>
+          </a:prstGeom>
+        </p:spPr>
+        <p:style>
+          <a:lnRef idx="2">
+            <a:schemeClr val="accent1"/>
+          </a:lnRef>
+          <a:fillRef idx="1">
+            <a:schemeClr val="lt1"/>
+          </a:fillRef>
+          <a:effectRef idx="0">
+            <a:schemeClr val="accent1"/>
+          </a:effectRef>
+          <a:fontRef idx="minor">
+            <a:schemeClr val="dk1"/>
+          </a:fontRef>
+        </p:style>
+        <p:txBody>
+          <a:bodyPr lIns="0" rIns="0" rtlCol="0" anchor="ctr"/>
+          <a:lstStyle/>
+          <a:p>
+            <a:pPr algn="ctr"/>
+            <a:r>
+              <a:rPr lang="en-US" sz="1100" dirty="0">
+                <a:solidFill>
+                  <a:sysClr val="windowText" lastClr="000000"/>
+                </a:solidFill>
+                <a:latin typeface="Arial"/>
+                <a:cs typeface="Arial"/>
+              </a:rPr>
+              <a:t>Field 1</a:t>
+            </a:r>
+          </a:p>
+        </p:txBody>
+      </p:sp>
+      <p:sp>
+        <p:nvSpPr>
+          <p:cNvPr id="123" name="Rectangle 122"/>
+          <p:cNvSpPr/>
+          <p:nvPr/>
+        </p:nvSpPr>
+        <p:spPr>
+          <a:xfrm>
+            <a:off x="3347941" y="602598"/>
+            <a:ext cx="1825337" cy="328339"/>
+          </a:xfrm>
+          <a:prstGeom prst="rect">
+            <a:avLst/>
+          </a:prstGeom>
+        </p:spPr>
+        <p:style>
+          <a:lnRef idx="2">
+            <a:schemeClr val="accent4"/>
+          </a:lnRef>
+          <a:fillRef idx="1">
+            <a:schemeClr val="lt1"/>
+          </a:fillRef>
+          <a:effectRef idx="0">
+            <a:schemeClr val="accent4"/>
+          </a:effectRef>
+          <a:fontRef idx="minor">
+            <a:schemeClr val="dk1"/>
+          </a:fontRef>
+        </p:style>
+        <p:txBody>
+          <a:bodyPr lIns="0" rIns="0" rtlCol="0" anchor="ctr"/>
+          <a:lstStyle/>
+          <a:p>
+            <a:pPr algn="ctr"/>
+            <a:r>
+              <a:rPr lang="en-US" sz="1100" dirty="0">
+                <a:solidFill>
+                  <a:sysClr val="windowText" lastClr="000000"/>
+                </a:solidFill>
+                <a:latin typeface="Arial"/>
+                <a:cs typeface="Arial"/>
+              </a:rPr>
+              <a:t>Mesh</a:t>
+            </a:r>
+          </a:p>
+        </p:txBody>
+      </p:sp>
+      <p:sp>
+        <p:nvSpPr>
+          <p:cNvPr id="124" name="Rectangle 123"/>
+          <p:cNvSpPr/>
+          <p:nvPr/>
+        </p:nvSpPr>
+        <p:spPr>
+          <a:xfrm>
+            <a:off x="2198024" y="602598"/>
+            <a:ext cx="1151113" cy="328339"/>
+          </a:xfrm>
+          <a:prstGeom prst="rect">
+            <a:avLst/>
+          </a:prstGeom>
+        </p:spPr>
+        <p:style>
+          <a:lnRef idx="2">
+            <a:schemeClr val="accent1"/>
+          </a:lnRef>
+          <a:fillRef idx="1">
+            <a:schemeClr val="lt1"/>
+          </a:fillRef>
+          <a:effectRef idx="0">
+            <a:schemeClr val="accent1"/>
+          </a:effectRef>
+          <a:fontRef idx="minor">
+            <a:schemeClr val="dk1"/>
+          </a:fontRef>
+        </p:style>
+        <p:txBody>
+          <a:bodyPr lIns="0" rIns="0" rtlCol="0" anchor="ctr"/>
+          <a:lstStyle/>
+          <a:p>
+            <a:pPr algn="ctr"/>
+            <a:r>
+              <a:rPr lang="en-US" sz="1100" dirty="0">
+                <a:solidFill>
+                  <a:sysClr val="windowText" lastClr="000000"/>
+                </a:solidFill>
+                <a:latin typeface="Arial"/>
+                <a:cs typeface="Arial"/>
+              </a:rPr>
+              <a:t>Field 2</a:t>
+            </a:r>
+          </a:p>
+        </p:txBody>
+      </p:sp>
+      <p:sp>
+        <p:nvSpPr>
+          <p:cNvPr id="125" name="Rectangle 124"/>
+          <p:cNvSpPr/>
+          <p:nvPr/>
+        </p:nvSpPr>
+        <p:spPr>
+          <a:xfrm>
+            <a:off x="1045557" y="1697052"/>
+            <a:ext cx="292608" cy="329184"/>
+          </a:xfrm>
+          <a:prstGeom prst="rect">
+            <a:avLst/>
+          </a:prstGeom>
+        </p:spPr>
+        <p:style>
+          <a:lnRef idx="2">
+            <a:schemeClr val="accent1"/>
+          </a:lnRef>
+          <a:fillRef idx="1">
+            <a:schemeClr val="lt1"/>
+          </a:fillRef>
+          <a:effectRef idx="0">
+            <a:schemeClr val="accent1"/>
+          </a:effectRef>
+          <a:fontRef idx="minor">
+            <a:schemeClr val="dk1"/>
+          </a:fontRef>
+        </p:style>
+        <p:txBody>
+          <a:bodyPr lIns="0" rIns="0" rtlCol="0" anchor="ctr"/>
+          <a:lstStyle/>
+          <a:p>
+            <a:pPr algn="ctr"/>
+            <a:r>
+              <a:rPr lang="en-US" sz="1100" dirty="0">
+                <a:solidFill>
+                  <a:sysClr val="windowText" lastClr="000000"/>
+                </a:solidFill>
+                <a:latin typeface="Arial"/>
+                <a:cs typeface="Arial"/>
+              </a:rPr>
+              <a:t>F1</a:t>
+            </a:r>
+          </a:p>
+        </p:txBody>
+      </p:sp>
+      <p:sp>
+        <p:nvSpPr>
+          <p:cNvPr id="126" name="Rectangle 125"/>
+          <p:cNvSpPr/>
+          <p:nvPr/>
+        </p:nvSpPr>
+        <p:spPr>
+          <a:xfrm>
+            <a:off x="2215392" y="1697052"/>
+            <a:ext cx="292608" cy="329184"/>
+          </a:xfrm>
+          <a:prstGeom prst="rect">
+            <a:avLst/>
+          </a:prstGeom>
+        </p:spPr>
+        <p:style>
+          <a:lnRef idx="2">
+            <a:schemeClr val="accent1"/>
+          </a:lnRef>
+          <a:fillRef idx="1">
+            <a:schemeClr val="lt1"/>
+          </a:fillRef>
+          <a:effectRef idx="0">
+            <a:schemeClr val="accent1"/>
+          </a:effectRef>
+          <a:fontRef idx="minor">
+            <a:schemeClr val="dk1"/>
+          </a:fontRef>
+        </p:style>
+        <p:txBody>
+          <a:bodyPr lIns="0" rIns="0" rtlCol="0" anchor="ctr"/>
+          <a:lstStyle/>
+          <a:p>
+            <a:pPr algn="ctr"/>
+            <a:r>
+              <a:rPr lang="en-US" sz="1100" dirty="0">
+                <a:solidFill>
+                  <a:sysClr val="windowText" lastClr="000000"/>
+                </a:solidFill>
+                <a:latin typeface="Arial"/>
+                <a:cs typeface="Arial"/>
+              </a:rPr>
+              <a:t>G1</a:t>
+            </a:r>
+          </a:p>
+        </p:txBody>
+      </p:sp>
+      <p:sp>
+        <p:nvSpPr>
+          <p:cNvPr id="127" name="Rectangle 126"/>
+          <p:cNvSpPr/>
+          <p:nvPr/>
+        </p:nvSpPr>
+        <p:spPr>
+          <a:xfrm>
+            <a:off x="2508148" y="1697052"/>
+            <a:ext cx="655490" cy="329184"/>
+          </a:xfrm>
+          <a:prstGeom prst="rect">
+            <a:avLst/>
+          </a:prstGeom>
+        </p:spPr>
+        <p:style>
+          <a:lnRef idx="2">
+            <a:schemeClr val="accent1"/>
+          </a:lnRef>
+          <a:fillRef idx="1">
+            <a:schemeClr val="lt1"/>
+          </a:fillRef>
+          <a:effectRef idx="0">
+            <a:schemeClr val="accent1"/>
+          </a:effectRef>
+          <a:fontRef idx="minor">
+            <a:schemeClr val="dk1"/>
+          </a:fontRef>
+        </p:style>
+        <p:txBody>
+          <a:bodyPr lIns="0" rIns="0" rtlCol="0" anchor="ctr"/>
+          <a:lstStyle/>
+          <a:p>
+            <a:pPr algn="ctr"/>
+            <a:r>
+              <a:rPr lang="en-US" sz="1100" dirty="0">
+                <a:solidFill>
+                  <a:sysClr val="windowText" lastClr="000000"/>
+                </a:solidFill>
+                <a:latin typeface="Arial"/>
+                <a:cs typeface="Arial"/>
+              </a:rPr>
+              <a:t>G2</a:t>
+            </a:r>
+          </a:p>
+        </p:txBody>
+      </p:sp>
+      <p:sp>
+        <p:nvSpPr>
+          <p:cNvPr id="128" name="Rectangle 127"/>
+          <p:cNvSpPr/>
+          <p:nvPr/>
+        </p:nvSpPr>
+        <p:spPr>
+          <a:xfrm>
+            <a:off x="3354915" y="1697052"/>
+            <a:ext cx="548640" cy="329184"/>
+          </a:xfrm>
+          <a:prstGeom prst="rect">
+            <a:avLst/>
+          </a:prstGeom>
+        </p:spPr>
+        <p:style>
+          <a:lnRef idx="2">
+            <a:schemeClr val="accent4"/>
+          </a:lnRef>
+          <a:fillRef idx="1">
+            <a:schemeClr val="lt1"/>
+          </a:fillRef>
+          <a:effectRef idx="0">
+            <a:schemeClr val="accent4"/>
+          </a:effectRef>
+          <a:fontRef idx="minor">
+            <a:schemeClr val="dk1"/>
+          </a:fontRef>
+        </p:style>
+        <p:txBody>
+          <a:bodyPr lIns="0" rIns="0" rtlCol="0" anchor="ctr"/>
+          <a:lstStyle/>
+          <a:p>
+            <a:pPr algn="ctr"/>
+            <a:r>
+              <a:rPr lang="en-US" sz="1100" dirty="0">
+                <a:solidFill>
+                  <a:sysClr val="windowText" lastClr="000000"/>
+                </a:solidFill>
+                <a:latin typeface="Arial"/>
+                <a:cs typeface="Arial"/>
+              </a:rPr>
+              <a:t>M1</a:t>
+            </a:r>
+          </a:p>
+        </p:txBody>
+      </p:sp>
+      <p:sp>
+        <p:nvSpPr>
+          <p:cNvPr id="129" name="Rectangle 128"/>
+          <p:cNvSpPr/>
+          <p:nvPr/>
+        </p:nvSpPr>
+        <p:spPr>
+          <a:xfrm>
+            <a:off x="3903554" y="1697052"/>
+            <a:ext cx="1246460" cy="329184"/>
+          </a:xfrm>
+          <a:prstGeom prst="rect">
+            <a:avLst/>
+          </a:prstGeom>
+        </p:spPr>
+        <p:style>
+          <a:lnRef idx="2">
+            <a:schemeClr val="accent4"/>
+          </a:lnRef>
+          <a:fillRef idx="1">
+            <a:schemeClr val="lt1"/>
+          </a:fillRef>
+          <a:effectRef idx="0">
+            <a:schemeClr val="accent4"/>
+          </a:effectRef>
+          <a:fontRef idx="minor">
+            <a:schemeClr val="dk1"/>
+          </a:fontRef>
+        </p:style>
+        <p:txBody>
+          <a:bodyPr lIns="0" rIns="0" rtlCol="0" anchor="ctr"/>
+          <a:lstStyle/>
+          <a:p>
+            <a:pPr algn="ctr"/>
+            <a:r>
+              <a:rPr lang="en-US" sz="1100" dirty="0">
+                <a:solidFill>
+                  <a:sysClr val="windowText" lastClr="000000"/>
+                </a:solidFill>
+                <a:latin typeface="Arial"/>
+                <a:cs typeface="Arial"/>
+              </a:rPr>
+              <a:t>M2</a:t>
+            </a:r>
+          </a:p>
+        </p:txBody>
+      </p:sp>
+      <p:sp>
+        <p:nvSpPr>
+          <p:cNvPr id="130" name="Rectangle 129"/>
+          <p:cNvSpPr/>
+          <p:nvPr/>
+        </p:nvSpPr>
+        <p:spPr>
+          <a:xfrm>
+            <a:off x="1332829" y="1697052"/>
+            <a:ext cx="655490" cy="329184"/>
+          </a:xfrm>
+          <a:prstGeom prst="rect">
+            <a:avLst/>
+          </a:prstGeom>
+        </p:spPr>
+        <p:style>
+          <a:lnRef idx="2">
+            <a:schemeClr val="accent1"/>
+          </a:lnRef>
+          <a:fillRef idx="1">
+            <a:schemeClr val="lt1"/>
+          </a:fillRef>
+          <a:effectRef idx="0">
+            <a:schemeClr val="accent1"/>
+          </a:effectRef>
+          <a:fontRef idx="minor">
+            <a:schemeClr val="dk1"/>
+          </a:fontRef>
+        </p:style>
+        <p:txBody>
+          <a:bodyPr lIns="0" rIns="0" rtlCol="0" anchor="ctr"/>
+          <a:lstStyle/>
+          <a:p>
+            <a:pPr algn="ctr"/>
+            <a:r>
+              <a:rPr lang="en-US" sz="1100" dirty="0">
+                <a:solidFill>
+                  <a:sysClr val="windowText" lastClr="000000"/>
+                </a:solidFill>
+                <a:latin typeface="Arial"/>
+                <a:cs typeface="Arial"/>
+              </a:rPr>
+              <a:t>F2</a:t>
+            </a:r>
+          </a:p>
+        </p:txBody>
+      </p:sp>
       <p:grpSp>
         <p:nvGrpSpPr>
           <p:cNvPr id="139" name="Group 138"/>
@@ -1953,10 +1851,10 @@
         </p:nvGrpSpPr>
         <p:grpSpPr>
           <a:xfrm>
-            <a:off x="512916" y="1892259"/>
-            <a:ext cx="4062720" cy="1364643"/>
-            <a:chOff x="632533" y="3388123"/>
-            <a:chExt cx="4062721" cy="1364644"/>
+            <a:off x="1039776" y="2168676"/>
+            <a:ext cx="3535860" cy="1315992"/>
+            <a:chOff x="1159393" y="3436774"/>
+            <a:chExt cx="3535861" cy="1315993"/>
           </a:xfrm>
         </p:grpSpPr>
         <p:sp>
@@ -2484,8 +2382,8 @@
           </p:nvSpPr>
           <p:spPr>
             <a:xfrm>
-              <a:off x="632533" y="3388123"/>
-              <a:ext cx="1019831" cy="261610"/>
+              <a:off x="1159393" y="3436774"/>
+              <a:ext cx="1358709" cy="261610"/>
             </a:xfrm>
             <a:prstGeom prst="rect">
               <a:avLst/>
@@ -2499,9 +2397,22 @@
             <a:lstStyle/>
             <a:p>
               <a:r>
+                <a:rPr lang="en-US" sz="1100" dirty="0" smtClean="0"/>
+                <a:t>Initial</a:t>
+              </a:r>
+              <a:r>
+                <a:rPr lang="en-US" sz="1100" dirty="0" smtClean="0"/>
+                <a:t> storage </a:t>
+              </a:r>
+              <a:r>
                 <a:rPr lang="en-US" sz="1100" dirty="0"/>
-                <a:t>Original layout</a:t>
+                <a:t>l</a:t>
               </a:r>
+              <a:r>
+                <a:rPr lang="en-US" sz="1100" dirty="0" smtClean="0"/>
+                <a:t>ayout</a:t>
+              </a:r>
+              <a:endParaRPr lang="en-US" sz="1100" dirty="0"/>
             </a:p>
           </p:txBody>
         </p:sp>
@@ -2514,10 +2425,10 @@
         </p:nvGrpSpPr>
         <p:grpSpPr>
           <a:xfrm>
-            <a:off x="446706" y="3459375"/>
-            <a:ext cx="5012747" cy="1389605"/>
-            <a:chOff x="41902" y="4535287"/>
-            <a:chExt cx="5012748" cy="1389606"/>
+            <a:off x="1039777" y="3618121"/>
+            <a:ext cx="3474102" cy="1345011"/>
+            <a:chOff x="634973" y="4576699"/>
+            <a:chExt cx="3474103" cy="1345012"/>
           </a:xfrm>
         </p:grpSpPr>
         <p:sp>
@@ -2710,53 +2621,6 @@
         </p:sp>
         <p:sp>
           <p:nvSpPr>
-            <p:cNvPr id="158" name="Rectangle 157"/>
-            <p:cNvSpPr/>
-            <p:nvPr/>
-          </p:nvSpPr>
-          <p:spPr>
-            <a:xfrm>
-              <a:off x="3382406" y="5595709"/>
-              <a:ext cx="951110" cy="329184"/>
-            </a:xfrm>
-            <a:prstGeom prst="rect">
-              <a:avLst/>
-            </a:prstGeom>
-          </p:spPr>
-          <p:style>
-            <a:lnRef idx="2">
-              <a:schemeClr val="dk1"/>
-            </a:lnRef>
-            <a:fillRef idx="1">
-              <a:schemeClr val="lt1"/>
-            </a:fillRef>
-            <a:effectRef idx="0">
-              <a:schemeClr val="dk1"/>
-            </a:effectRef>
-            <a:fontRef idx="minor">
-              <a:schemeClr val="dk1"/>
-            </a:fontRef>
-          </p:style>
-          <p:txBody>
-            <a:bodyPr lIns="0" rIns="0" rtlCol="0" anchor="ctr"/>
-            <a:lstStyle/>
-            <a:p>
-              <a:pPr algn="ctr"/>
-              <a:r>
-                <a:rPr lang="en-US" sz="1100" dirty="0">
-                  <a:solidFill>
-                    <a:sysClr val="windowText" lastClr="000000"/>
-                  </a:solidFill>
-                  <a:latin typeface="Arial"/>
-                  <a:cs typeface="Arial"/>
-                </a:rPr>
-                <a:t>P3</a:t>
-              </a:r>
-            </a:p>
-          </p:txBody>
-        </p:sp>
-        <p:sp>
-          <p:nvSpPr>
             <p:cNvPr id="159" name="Rectangle 158"/>
             <p:cNvSpPr/>
             <p:nvPr/>
@@ -2998,8 +2862,8 @@
           </p:nvSpPr>
           <p:spPr>
             <a:xfrm>
-              <a:off x="41902" y="4535287"/>
-              <a:ext cx="3647153" cy="261610"/>
+              <a:off x="634973" y="4576699"/>
+              <a:ext cx="2067474" cy="261610"/>
             </a:xfrm>
             <a:prstGeom prst="rect">
               <a:avLst/>
@@ -3014,8 +2878,13 @@
             <a:p>
               <a:r>
                 <a:rPr lang="en-US" sz="1100" dirty="0"/>
-                <a:t>Layout after System Migrates to optimize across many codes</a:t>
+                <a:t>Layout after </a:t>
               </a:r>
+              <a:r>
+                <a:rPr lang="en-US" sz="1100" dirty="0" smtClean="0"/>
+                <a:t>system optimization</a:t>
+              </a:r>
+              <a:endParaRPr lang="en-US" sz="1100" dirty="0"/>
             </a:p>
           </p:txBody>
         </p:sp>
@@ -3027,7 +2896,7 @@
           </p:nvSpPr>
           <p:spPr>
             <a:xfrm>
-              <a:off x="4337928" y="5592527"/>
+              <a:off x="3392354" y="5592527"/>
               <a:ext cx="716722" cy="329184"/>
             </a:xfrm>
             <a:prstGeom prst="rect">
@@ -3075,7 +2944,7 @@
         </p:nvSpPr>
         <p:spPr>
           <a:xfrm>
-            <a:off x="181810" y="2247849"/>
+            <a:off x="181810" y="2475615"/>
             <a:ext cx="732630" cy="246221"/>
           </a:xfrm>
           <a:prstGeom prst="rect">
@@ -3106,7 +2975,7 @@
         </p:nvSpPr>
         <p:spPr>
           <a:xfrm>
-            <a:off x="201034" y="2604586"/>
+            <a:off x="201034" y="2832352"/>
             <a:ext cx="713406" cy="246221"/>
           </a:xfrm>
           <a:prstGeom prst="rect">
@@ -3137,7 +3006,7 @@
         </p:nvSpPr>
         <p:spPr>
           <a:xfrm>
-            <a:off x="165517" y="2979903"/>
+            <a:off x="165517" y="3207669"/>
             <a:ext cx="748923" cy="246221"/>
           </a:xfrm>
           <a:prstGeom prst="rect">
@@ -3168,7 +3037,7 @@
         </p:nvSpPr>
         <p:spPr>
           <a:xfrm>
-            <a:off x="204577" y="3832733"/>
+            <a:off x="204577" y="3950067"/>
             <a:ext cx="732630" cy="246221"/>
           </a:xfrm>
           <a:prstGeom prst="rect">
@@ -3199,7 +3068,7 @@
         </p:nvSpPr>
         <p:spPr>
           <a:xfrm>
-            <a:off x="223801" y="4189470"/>
+            <a:off x="223801" y="4306804"/>
             <a:ext cx="713406" cy="246221"/>
           </a:xfrm>
           <a:prstGeom prst="rect">
@@ -3230,7 +3099,7 @@
         </p:nvSpPr>
         <p:spPr>
           <a:xfrm>
-            <a:off x="188284" y="4564787"/>
+            <a:off x="188284" y="4682121"/>
             <a:ext cx="748923" cy="246221"/>
           </a:xfrm>
           <a:prstGeom prst="rect">
@@ -3261,7 +3130,7 @@
         </p:nvCxnSpPr>
         <p:spPr>
           <a:xfrm flipV="1">
-            <a:off x="0" y="1794602"/>
+            <a:off x="0" y="2139702"/>
             <a:ext cx="5459453" cy="20708"/>
           </a:xfrm>
           <a:prstGeom prst="line">
@@ -3299,7 +3168,7 @@
         </p:nvCxnSpPr>
         <p:spPr>
           <a:xfrm flipV="1">
-            <a:off x="-6136" y="3459375"/>
+            <a:off x="-6136" y="3590513"/>
             <a:ext cx="5465589" cy="1"/>
           </a:xfrm>
           <a:prstGeom prst="line">
@@ -3329,6 +3198,188 @@
           </a:fontRef>
         </p:style>
       </p:cxnSp>
+      <p:sp>
+        <p:nvSpPr>
+          <p:cNvPr id="56" name="TextBox 55"/>
+          <p:cNvSpPr txBox="1"/>
+          <p:nvPr/>
+        </p:nvSpPr>
+        <p:spPr>
+          <a:xfrm>
+            <a:off x="1039776" y="1009299"/>
+            <a:ext cx="2376588" cy="261610"/>
+          </a:xfrm>
+          <a:prstGeom prst="rect">
+            <a:avLst/>
+          </a:prstGeom>
+          <a:noFill/>
+        </p:spPr>
+        <p:txBody>
+          <a:bodyPr wrap="square" rtlCol="0">
+            <a:spAutoFit/>
+          </a:bodyPr>
+          <a:lstStyle/>
+          <a:p>
+            <a:r>
+              <a:rPr lang="en-US" sz="1100" dirty="0" smtClean="0"/>
+              <a:t>Refactored and </a:t>
+            </a:r>
+            <a:r>
+              <a:rPr lang="en-US" sz="1100" dirty="0"/>
+              <a:t>r</a:t>
+            </a:r>
+            <a:r>
+              <a:rPr lang="en-US" sz="1100" dirty="0" smtClean="0"/>
+              <a:t>educed data</a:t>
+            </a:r>
+            <a:endParaRPr lang="en-US" sz="1100" dirty="0"/>
+          </a:p>
+        </p:txBody>
+      </p:sp>
+      <p:cxnSp>
+        <p:nvCxnSpPr>
+          <p:cNvPr id="57" name="Straight Connector 56"/>
+          <p:cNvCxnSpPr/>
+          <p:nvPr/>
+        </p:nvCxnSpPr>
+        <p:spPr>
+          <a:xfrm flipV="1">
+            <a:off x="-6136" y="1019653"/>
+            <a:ext cx="5459453" cy="20708"/>
+          </a:xfrm>
+          <a:prstGeom prst="line">
+            <a:avLst/>
+          </a:prstGeom>
+          <a:ln>
+            <a:solidFill>
+              <a:schemeClr val="bg1">
+                <a:lumMod val="85000"/>
+              </a:schemeClr>
+            </a:solidFill>
+          </a:ln>
+          <a:effectLst/>
+        </p:spPr>
+        <p:style>
+          <a:lnRef idx="2">
+            <a:schemeClr val="accent1"/>
+          </a:lnRef>
+          <a:fillRef idx="0">
+            <a:schemeClr val="accent1"/>
+          </a:fillRef>
+          <a:effectRef idx="1">
+            <a:schemeClr val="accent1"/>
+          </a:effectRef>
+          <a:fontRef idx="minor">
+            <a:schemeClr val="tx1"/>
+          </a:fontRef>
+        </p:style>
+      </p:cxnSp>
+      <p:sp>
+        <p:nvSpPr>
+          <p:cNvPr id="59" name="TextBox 58"/>
+          <p:cNvSpPr txBox="1"/>
+          <p:nvPr/>
+        </p:nvSpPr>
+        <p:spPr>
+          <a:xfrm>
+            <a:off x="95172" y="1477313"/>
+            <a:ext cx="842035" cy="400110"/>
+          </a:xfrm>
+          <a:prstGeom prst="rect">
+            <a:avLst/>
+          </a:prstGeom>
+          <a:noFill/>
+        </p:spPr>
+        <p:txBody>
+          <a:bodyPr wrap="none" rtlCol="0">
+            <a:spAutoFit/>
+          </a:bodyPr>
+          <a:lstStyle/>
+          <a:p>
+            <a:pPr algn="r"/>
+            <a:r>
+              <a:rPr lang="en-US" sz="1000" b="1" dirty="0" smtClean="0"/>
+              <a:t>Application</a:t>
+            </a:r>
+          </a:p>
+          <a:p>
+            <a:pPr algn="r"/>
+            <a:r>
+              <a:rPr lang="en-US" sz="1000" b="1" dirty="0" smtClean="0"/>
+              <a:t>Memory</a:t>
+            </a:r>
+            <a:endParaRPr lang="en-US" sz="1000" b="1" dirty="0"/>
+          </a:p>
+        </p:txBody>
+      </p:sp>
+      <p:sp>
+        <p:nvSpPr>
+          <p:cNvPr id="60" name="TextBox 59"/>
+          <p:cNvSpPr txBox="1"/>
+          <p:nvPr/>
+        </p:nvSpPr>
+        <p:spPr>
+          <a:xfrm>
+            <a:off x="95172" y="381772"/>
+            <a:ext cx="842035" cy="400110"/>
+          </a:xfrm>
+          <a:prstGeom prst="rect">
+            <a:avLst/>
+          </a:prstGeom>
+          <a:noFill/>
+        </p:spPr>
+        <p:txBody>
+          <a:bodyPr wrap="none" rtlCol="0">
+            <a:spAutoFit/>
+          </a:bodyPr>
+          <a:lstStyle/>
+          <a:p>
+            <a:pPr algn="r"/>
+            <a:r>
+              <a:rPr lang="en-US" sz="1000" b="1" dirty="0" smtClean="0"/>
+              <a:t>Application</a:t>
+            </a:r>
+          </a:p>
+          <a:p>
+            <a:pPr algn="r"/>
+            <a:r>
+              <a:rPr lang="en-US" sz="1000" b="1" dirty="0" smtClean="0"/>
+              <a:t>Memory</a:t>
+            </a:r>
+            <a:endParaRPr lang="en-US" sz="1000" b="1" dirty="0"/>
+          </a:p>
+        </p:txBody>
+      </p:sp>
+      <p:sp>
+        <p:nvSpPr>
+          <p:cNvPr id="61" name="TextBox 60"/>
+          <p:cNvSpPr txBox="1"/>
+          <p:nvPr/>
+        </p:nvSpPr>
+        <p:spPr>
+          <a:xfrm>
+            <a:off x="1046085" y="0"/>
+            <a:ext cx="2376588" cy="261610"/>
+          </a:xfrm>
+          <a:prstGeom prst="rect">
+            <a:avLst/>
+          </a:prstGeom>
+          <a:noFill/>
+        </p:spPr>
+        <p:txBody>
+          <a:bodyPr wrap="square" rtlCol="0">
+            <a:spAutoFit/>
+          </a:bodyPr>
+          <a:lstStyle/>
+          <a:p>
+            <a:r>
+              <a:rPr lang="en-US" sz="1100" dirty="0" smtClean="0"/>
+              <a:t>Original memory arrangement</a:t>
+            </a:r>
+            <a:endParaRPr lang="en-US" sz="1100" dirty="0"/>
+          </a:p>
+        </p:txBody>
+      </p:sp>
     </p:spTree>
     <p:extLst>
       <p:ext uri="{BB962C8B-B14F-4D97-AF65-F5344CB8AC3E}">

</xml_diff>

<commit_message>
Tweaked figure 1.1 captions
</commit_message>
<xml_diff>
--- a/graphics/SSIO-bucket.pptx
+++ b/graphics/SSIO-bucket.pptx
@@ -2383,7 +2383,7 @@
           <p:spPr>
             <a:xfrm>
               <a:off x="1159393" y="3436774"/>
-              <a:ext cx="1358709" cy="261610"/>
+              <a:ext cx="1527431" cy="261610"/>
             </a:xfrm>
             <a:prstGeom prst="rect">
               <a:avLst/>
@@ -2397,22 +2397,22 @@
             <a:lstStyle/>
             <a:p>
               <a:r>
-                <a:rPr lang="en-US" sz="1100" dirty="0" smtClean="0"/>
-                <a:t>Initial</a:t>
+                <a:rPr lang="en-US" sz="1100" i="1" dirty="0" smtClean="0"/>
+                <a:t>c. Initial</a:t>
               </a:r>
               <a:r>
-                <a:rPr lang="en-US" sz="1100" dirty="0" smtClean="0"/>
+                <a:rPr lang="en-US" sz="1100" i="1" dirty="0" smtClean="0"/>
                 <a:t> storage </a:t>
               </a:r>
               <a:r>
-                <a:rPr lang="en-US" sz="1100" dirty="0"/>
+                <a:rPr lang="en-US" sz="1100" i="1" dirty="0"/>
                 <a:t>l</a:t>
               </a:r>
               <a:r>
-                <a:rPr lang="en-US" sz="1100" dirty="0" smtClean="0"/>
+                <a:rPr lang="en-US" sz="1100" i="1" dirty="0" smtClean="0"/>
                 <a:t>ayout</a:t>
               </a:r>
-              <a:endParaRPr lang="en-US" sz="1100" dirty="0"/>
+              <a:endParaRPr lang="en-US" sz="1100" i="1" dirty="0"/>
             </a:p>
           </p:txBody>
         </p:sp>
@@ -2425,7 +2425,7 @@
         </p:nvGrpSpPr>
         <p:grpSpPr>
           <a:xfrm>
-            <a:off x="1039777" y="3618121"/>
+            <a:off x="1039776" y="3618121"/>
             <a:ext cx="3474102" cy="1345011"/>
             <a:chOff x="634973" y="4576699"/>
             <a:chExt cx="3474103" cy="1345012"/>
@@ -2863,7 +2863,7 @@
           <p:spPr>
             <a:xfrm>
               <a:off x="634973" y="4576699"/>
-              <a:ext cx="2067474" cy="261610"/>
+              <a:ext cx="2680774" cy="261610"/>
             </a:xfrm>
             <a:prstGeom prst="rect">
               <a:avLst/>
@@ -2877,14 +2877,18 @@
             <a:lstStyle/>
             <a:p>
               <a:r>
-                <a:rPr lang="en-US" sz="1100" dirty="0"/>
-                <a:t>Layout after </a:t>
+                <a:rPr lang="en-US" sz="1100" i="1" dirty="0" smtClean="0"/>
+                <a:t>d. Storage layout </a:t>
               </a:r>
               <a:r>
-                <a:rPr lang="en-US" sz="1100" dirty="0" smtClean="0"/>
+                <a:rPr lang="en-US" sz="1100" i="1" dirty="0"/>
+                <a:t>after </a:t>
+              </a:r>
+              <a:r>
+                <a:rPr lang="en-US" sz="1100" i="1" dirty="0" smtClean="0"/>
                 <a:t>system optimization</a:t>
               </a:r>
-              <a:endParaRPr lang="en-US" sz="1100" dirty="0"/>
+              <a:endParaRPr lang="en-US" sz="1100" i="1" dirty="0"/>
             </a:p>
           </p:txBody>
         </p:sp>
@@ -3221,18 +3225,18 @@
           <a:lstStyle/>
           <a:p>
             <a:r>
-              <a:rPr lang="en-US" sz="1100" dirty="0" smtClean="0"/>
-              <a:t>Refactored and </a:t>
-            </a:r>
-            <a:r>
-              <a:rPr lang="en-US" sz="1100" dirty="0"/>
+              <a:rPr lang="en-US" sz="1100" i="1" dirty="0" smtClean="0"/>
+              <a:t>b. Refactored and </a:t>
+            </a:r>
+            <a:r>
+              <a:rPr lang="en-US" sz="1100" i="1" dirty="0"/>
               <a:t>r</a:t>
             </a:r>
             <a:r>
-              <a:rPr lang="en-US" sz="1100" dirty="0" smtClean="0"/>
+              <a:rPr lang="en-US" sz="1100" i="1" dirty="0" smtClean="0"/>
               <a:t>educed data</a:t>
             </a:r>
-            <a:endParaRPr lang="en-US" sz="1100" dirty="0"/>
+            <a:endParaRPr lang="en-US" sz="1100" i="1" dirty="0"/>
           </a:p>
         </p:txBody>
       </p:sp>
@@ -3373,10 +3377,10 @@
           <a:lstStyle/>
           <a:p>
             <a:r>
-              <a:rPr lang="en-US" sz="1100" dirty="0" smtClean="0"/>
-              <a:t>Original memory arrangement</a:t>
-            </a:r>
-            <a:endParaRPr lang="en-US" sz="1100" dirty="0"/>
+              <a:rPr lang="en-US" sz="1100" i="1" dirty="0" smtClean="0"/>
+              <a:t>a. Original memory arrangement</a:t>
+            </a:r>
+            <a:endParaRPr lang="en-US" sz="1100" i="1" dirty="0"/>
           </a:p>
         </p:txBody>
       </p:sp>

</xml_diff>

<commit_message>
clarified example and figure in data description
</commit_message>
<xml_diff>
--- a/graphics/SSIO-bucket.pptx
+++ b/graphics/SSIO-bucket.pptx
@@ -6,6 +6,7 @@
   </p:sldMasterIdLst>
   <p:sldIdLst>
     <p:sldId id="257" r:id="rId2"/>
+    <p:sldId id="258" r:id="rId3"/>
   </p:sldIdLst>
   <p:sldSz cx="6126163" cy="5029200"/>
   <p:notesSz cx="6858000" cy="9144000"/>
@@ -106,7 +107,7 @@
   </p:defaultTextStyle>
   <p:extLst>
     <p:ext uri="{EFAFB233-063F-42B5-8137-9DF3F51BA10A}">
-      <p15:sldGuideLst xmlns:p15="http://schemas.microsoft.com/office/powerpoint/2012/main" xmlns="">
+      <p15:sldGuideLst xmlns="" xmlns:p15="http://schemas.microsoft.com/office/powerpoint/2012/main">
         <p15:guide id="1" orient="horz" pos="1584" userDrawn="1">
           <p15:clr>
             <a:srgbClr val="A4A3A4"/>
@@ -312,7 +313,7 @@
           <a:p>
             <a:fld id="{BF73EB66-4118-2C4A-8381-EC775B1B24A3}" type="datetimeFigureOut">
               <a:rPr lang="en-US" smtClean="0"/>
-              <a:t>7/6/15</a:t>
+              <a:t>7/7/15</a:t>
             </a:fld>
             <a:endParaRPr lang="en-US"/>
           </a:p>
@@ -540,7 +541,7 @@
           <a:p>
             <a:fld id="{BF73EB66-4118-2C4A-8381-EC775B1B24A3}" type="datetimeFigureOut">
               <a:rPr lang="en-US" smtClean="0"/>
-              <a:t>7/6/15</a:t>
+              <a:t>7/7/15</a:t>
             </a:fld>
             <a:endParaRPr lang="en-US"/>
           </a:p>
@@ -697,7 +698,7 @@
           <a:p>
             <a:fld id="{BF73EB66-4118-2C4A-8381-EC775B1B24A3}" type="datetimeFigureOut">
               <a:rPr lang="en-US" smtClean="0"/>
-              <a:t>7/6/15</a:t>
+              <a:t>7/7/15</a:t>
             </a:fld>
             <a:endParaRPr lang="en-US"/>
           </a:p>
@@ -1852,9 +1853,9 @@
         <p:grpSpPr>
           <a:xfrm>
             <a:off x="1039776" y="2168676"/>
-            <a:ext cx="3535860" cy="1315992"/>
+            <a:ext cx="2713095" cy="1315992"/>
             <a:chOff x="1159393" y="3436774"/>
-            <a:chExt cx="3535861" cy="1315993"/>
+            <a:chExt cx="2713096" cy="1315993"/>
           </a:xfrm>
         </p:grpSpPr>
         <p:sp>
@@ -2094,60 +2095,13 @@
         </p:sp>
         <p:sp>
           <p:nvSpPr>
-            <p:cNvPr id="146" name="Rectangle 145"/>
-            <p:cNvSpPr/>
-            <p:nvPr/>
-          </p:nvSpPr>
-          <p:spPr>
-            <a:xfrm>
-              <a:off x="1159394" y="4094399"/>
-              <a:ext cx="951110" cy="329184"/>
-            </a:xfrm>
-            <a:prstGeom prst="rect">
-              <a:avLst/>
-            </a:prstGeom>
-          </p:spPr>
-          <p:style>
-            <a:lnRef idx="2">
-              <a:schemeClr val="dk1"/>
-            </a:lnRef>
-            <a:fillRef idx="1">
-              <a:schemeClr val="lt1"/>
-            </a:fillRef>
-            <a:effectRef idx="0">
-              <a:schemeClr val="dk1"/>
-            </a:effectRef>
-            <a:fontRef idx="minor">
-              <a:schemeClr val="dk1"/>
-            </a:fontRef>
-          </p:style>
-          <p:txBody>
-            <a:bodyPr lIns="0" rIns="0" rtlCol="0" anchor="ctr"/>
-            <a:lstStyle/>
-            <a:p>
-              <a:pPr algn="ctr"/>
-              <a:r>
-                <a:rPr lang="en-US" sz="1100" dirty="0">
-                  <a:solidFill>
-                    <a:sysClr val="windowText" lastClr="000000"/>
-                  </a:solidFill>
-                  <a:latin typeface="Arial"/>
-                  <a:cs typeface="Arial"/>
-                </a:rPr>
-                <a:t>P3</a:t>
-              </a:r>
-            </a:p>
-          </p:txBody>
-        </p:sp>
-        <p:sp>
-          <p:nvSpPr>
             <p:cNvPr id="147" name="Rectangle 146"/>
             <p:cNvSpPr/>
             <p:nvPr/>
           </p:nvSpPr>
           <p:spPr>
             <a:xfrm>
-              <a:off x="2781976" y="4094399"/>
+              <a:off x="1829479" y="4094399"/>
               <a:ext cx="655490" cy="329184"/>
             </a:xfrm>
             <a:prstGeom prst="rect">
@@ -2194,7 +2148,7 @@
           </p:nvSpPr>
           <p:spPr>
             <a:xfrm>
-              <a:off x="3448794" y="4088569"/>
+              <a:off x="2496296" y="4088569"/>
               <a:ext cx="1246460" cy="329184"/>
             </a:xfrm>
             <a:prstGeom prst="rect">
@@ -2241,7 +2195,7 @@
           </p:nvSpPr>
           <p:spPr>
             <a:xfrm>
-              <a:off x="2115158" y="4094399"/>
+              <a:off x="1162661" y="4094399"/>
               <a:ext cx="655490" cy="329184"/>
             </a:xfrm>
             <a:prstGeom prst="rect">
@@ -2398,11 +2352,7 @@
             <a:p>
               <a:r>
                 <a:rPr lang="en-US" sz="1100" i="1" dirty="0" smtClean="0"/>
-                <a:t>c. Initial</a:t>
-              </a:r>
-              <a:r>
-                <a:rPr lang="en-US" sz="1100" i="1" dirty="0" smtClean="0"/>
-                <a:t> storage </a:t>
+                <a:t>c. Initial storage </a:t>
               </a:r>
               <a:r>
                 <a:rPr lang="en-US" sz="1100" i="1" dirty="0"/>
@@ -3388,6 +3338,2183 @@
     <p:extLst>
       <p:ext uri="{BB962C8B-B14F-4D97-AF65-F5344CB8AC3E}">
         <p14:creationId xmlns:p14="http://schemas.microsoft.com/office/powerpoint/2010/main" val="1894904609"/>
+      </p:ext>
+    </p:extLst>
+  </p:cSld>
+  <p:clrMapOvr>
+    <a:masterClrMapping/>
+  </p:clrMapOvr>
+</p:sld>
+</file>
+
+<file path=ppt/slides/slide2.xml><?xml version="1.0" encoding="utf-8"?>
+<p:sld xmlns:a="http://schemas.openxmlformats.org/drawingml/2006/main" xmlns:r="http://schemas.openxmlformats.org/officeDocument/2006/relationships" xmlns:p="http://schemas.openxmlformats.org/presentationml/2006/main">
+  <p:cSld>
+    <p:spTree>
+      <p:nvGrpSpPr>
+        <p:cNvPr id="1" name=""/>
+        <p:cNvGrpSpPr/>
+        <p:nvPr/>
+      </p:nvGrpSpPr>
+      <p:grpSpPr>
+        <a:xfrm>
+          <a:off x="0" y="0"/>
+          <a:ext cx="0" cy="0"/>
+          <a:chOff x="0" y="0"/>
+          <a:chExt cx="0" cy="0"/>
+        </a:xfrm>
+      </p:grpSpPr>
+      <p:sp>
+        <p:nvSpPr>
+          <p:cNvPr id="133" name="Rectangle 132"/>
+          <p:cNvSpPr/>
+          <p:nvPr/>
+        </p:nvSpPr>
+        <p:spPr>
+          <a:xfrm>
+            <a:off x="1039777" y="253489"/>
+            <a:ext cx="3474101" cy="259739"/>
+          </a:xfrm>
+          <a:prstGeom prst="rect">
+            <a:avLst/>
+          </a:prstGeom>
+        </p:spPr>
+        <p:style>
+          <a:lnRef idx="2">
+            <a:schemeClr val="dk1"/>
+          </a:lnRef>
+          <a:fillRef idx="1">
+            <a:schemeClr val="lt1"/>
+          </a:fillRef>
+          <a:effectRef idx="0">
+            <a:schemeClr val="dk1"/>
+          </a:effectRef>
+          <a:fontRef idx="minor">
+            <a:schemeClr val="dk1"/>
+          </a:fontRef>
+        </p:style>
+        <p:txBody>
+          <a:bodyPr lIns="0" rIns="0" rtlCol="0" anchor="ctr"/>
+          <a:lstStyle/>
+          <a:p>
+            <a:pPr algn="ctr"/>
+            <a:r>
+              <a:rPr lang="en-US" sz="1100" dirty="0" smtClean="0">
+                <a:solidFill>
+                  <a:sysClr val="windowText" lastClr="000000"/>
+                </a:solidFill>
+                <a:latin typeface="Arial"/>
+                <a:cs typeface="Arial"/>
+              </a:rPr>
+              <a:t>Particles</a:t>
+            </a:r>
+            <a:endParaRPr lang="en-US" sz="1100" dirty="0">
+              <a:solidFill>
+                <a:sysClr val="windowText" lastClr="000000"/>
+              </a:solidFill>
+              <a:latin typeface="Arial"/>
+              <a:cs typeface="Arial"/>
+            </a:endParaRPr>
+          </a:p>
+        </p:txBody>
+      </p:sp>
+      <p:sp>
+        <p:nvSpPr>
+          <p:cNvPr id="134" name="Rectangle 133"/>
+          <p:cNvSpPr/>
+          <p:nvPr/>
+        </p:nvSpPr>
+        <p:spPr>
+          <a:xfrm>
+            <a:off x="1045557" y="1227067"/>
+            <a:ext cx="274320" cy="260408"/>
+          </a:xfrm>
+          <a:prstGeom prst="rect">
+            <a:avLst/>
+          </a:prstGeom>
+        </p:spPr>
+        <p:style>
+          <a:lnRef idx="2">
+            <a:schemeClr val="dk1"/>
+          </a:lnRef>
+          <a:fillRef idx="1">
+            <a:schemeClr val="lt1"/>
+          </a:fillRef>
+          <a:effectRef idx="0">
+            <a:schemeClr val="dk1"/>
+          </a:effectRef>
+          <a:fontRef idx="minor">
+            <a:schemeClr val="dk1"/>
+          </a:fontRef>
+        </p:style>
+        <p:txBody>
+          <a:bodyPr lIns="0" rIns="0" rtlCol="0" anchor="ctr"/>
+          <a:lstStyle/>
+          <a:p>
+            <a:pPr algn="ctr"/>
+            <a:r>
+              <a:rPr lang="en-US" sz="1100" dirty="0">
+                <a:solidFill>
+                  <a:sysClr val="windowText" lastClr="000000"/>
+                </a:solidFill>
+                <a:latin typeface="Arial"/>
+                <a:cs typeface="Arial"/>
+              </a:rPr>
+              <a:t>P1</a:t>
+            </a:r>
+          </a:p>
+        </p:txBody>
+      </p:sp>
+      <p:sp>
+        <p:nvSpPr>
+          <p:cNvPr id="135" name="Rectangle 134"/>
+          <p:cNvSpPr/>
+          <p:nvPr/>
+        </p:nvSpPr>
+        <p:spPr>
+          <a:xfrm>
+            <a:off x="1318468" y="1227067"/>
+            <a:ext cx="545839" cy="260408"/>
+          </a:xfrm>
+          <a:prstGeom prst="rect">
+            <a:avLst/>
+          </a:prstGeom>
+        </p:spPr>
+        <p:style>
+          <a:lnRef idx="2">
+            <a:schemeClr val="dk1"/>
+          </a:lnRef>
+          <a:fillRef idx="1">
+            <a:schemeClr val="lt1"/>
+          </a:fillRef>
+          <a:effectRef idx="0">
+            <a:schemeClr val="dk1"/>
+          </a:effectRef>
+          <a:fontRef idx="minor">
+            <a:schemeClr val="dk1"/>
+          </a:fontRef>
+        </p:style>
+        <p:txBody>
+          <a:bodyPr lIns="0" rIns="0" rtlCol="0" anchor="ctr"/>
+          <a:lstStyle/>
+          <a:p>
+            <a:pPr algn="ctr"/>
+            <a:r>
+              <a:rPr lang="en-US" sz="1100" dirty="0">
+                <a:solidFill>
+                  <a:sysClr val="windowText" lastClr="000000"/>
+                </a:solidFill>
+                <a:latin typeface="Arial"/>
+                <a:cs typeface="Arial"/>
+              </a:rPr>
+              <a:t>P2</a:t>
+            </a:r>
+          </a:p>
+        </p:txBody>
+      </p:sp>
+      <p:sp>
+        <p:nvSpPr>
+          <p:cNvPr id="136" name="Rectangle 135"/>
+          <p:cNvSpPr/>
+          <p:nvPr/>
+        </p:nvSpPr>
+        <p:spPr>
+          <a:xfrm>
+            <a:off x="1864308" y="1227067"/>
+            <a:ext cx="830390" cy="260408"/>
+          </a:xfrm>
+          <a:prstGeom prst="rect">
+            <a:avLst/>
+          </a:prstGeom>
+        </p:spPr>
+        <p:style>
+          <a:lnRef idx="2">
+            <a:schemeClr val="dk1"/>
+          </a:lnRef>
+          <a:fillRef idx="1">
+            <a:schemeClr val="lt1"/>
+          </a:fillRef>
+          <a:effectRef idx="0">
+            <a:schemeClr val="dk1"/>
+          </a:effectRef>
+          <a:fontRef idx="minor">
+            <a:schemeClr val="dk1"/>
+          </a:fontRef>
+        </p:style>
+        <p:txBody>
+          <a:bodyPr lIns="0" rIns="0" rtlCol="0" anchor="ctr"/>
+          <a:lstStyle/>
+          <a:p>
+            <a:pPr algn="ctr"/>
+            <a:r>
+              <a:rPr lang="en-US" sz="1100" dirty="0">
+                <a:solidFill>
+                  <a:sysClr val="windowText" lastClr="000000"/>
+                </a:solidFill>
+                <a:latin typeface="Arial"/>
+                <a:cs typeface="Arial"/>
+              </a:rPr>
+              <a:t>P3</a:t>
+            </a:r>
+          </a:p>
+        </p:txBody>
+      </p:sp>
+      <p:sp>
+        <p:nvSpPr>
+          <p:cNvPr id="137" name="Rectangle 136"/>
+          <p:cNvSpPr/>
+          <p:nvPr/>
+        </p:nvSpPr>
+        <p:spPr>
+          <a:xfrm>
+            <a:off x="2691809" y="1227067"/>
+            <a:ext cx="1822069" cy="260408"/>
+          </a:xfrm>
+          <a:prstGeom prst="rect">
+            <a:avLst/>
+          </a:prstGeom>
+        </p:spPr>
+        <p:style>
+          <a:lnRef idx="2">
+            <a:schemeClr val="dk1"/>
+          </a:lnRef>
+          <a:fillRef idx="1">
+            <a:schemeClr val="lt1"/>
+          </a:fillRef>
+          <a:effectRef idx="0">
+            <a:schemeClr val="dk1"/>
+          </a:effectRef>
+          <a:fontRef idx="minor">
+            <a:schemeClr val="dk1"/>
+          </a:fontRef>
+        </p:style>
+        <p:txBody>
+          <a:bodyPr lIns="0" rIns="0" rtlCol="0" anchor="ctr"/>
+          <a:lstStyle/>
+          <a:p>
+            <a:pPr algn="ctr"/>
+            <a:r>
+              <a:rPr lang="en-US" sz="1100" dirty="0">
+                <a:solidFill>
+                  <a:sysClr val="windowText" lastClr="000000"/>
+                </a:solidFill>
+                <a:latin typeface="Arial"/>
+                <a:cs typeface="Arial"/>
+              </a:rPr>
+              <a:t>P4</a:t>
+            </a:r>
+          </a:p>
+        </p:txBody>
+      </p:sp>
+      <p:sp>
+        <p:nvSpPr>
+          <p:cNvPr id="122" name="Rectangle 121"/>
+          <p:cNvSpPr/>
+          <p:nvPr/>
+        </p:nvSpPr>
+        <p:spPr>
+          <a:xfrm>
+            <a:off x="1041626" y="537471"/>
+            <a:ext cx="955570" cy="259739"/>
+          </a:xfrm>
+          <a:prstGeom prst="rect">
+            <a:avLst/>
+          </a:prstGeom>
+        </p:spPr>
+        <p:style>
+          <a:lnRef idx="2">
+            <a:schemeClr val="accent1"/>
+          </a:lnRef>
+          <a:fillRef idx="1">
+            <a:schemeClr val="lt1"/>
+          </a:fillRef>
+          <a:effectRef idx="0">
+            <a:schemeClr val="accent1"/>
+          </a:effectRef>
+          <a:fontRef idx="minor">
+            <a:schemeClr val="dk1"/>
+          </a:fontRef>
+        </p:style>
+        <p:txBody>
+          <a:bodyPr lIns="0" rIns="0" rtlCol="0" anchor="ctr"/>
+          <a:lstStyle/>
+          <a:p>
+            <a:pPr algn="ctr"/>
+            <a:r>
+              <a:rPr lang="en-US" sz="1100" dirty="0">
+                <a:solidFill>
+                  <a:sysClr val="windowText" lastClr="000000"/>
+                </a:solidFill>
+                <a:latin typeface="Arial"/>
+                <a:cs typeface="Arial"/>
+              </a:rPr>
+              <a:t>Field 1</a:t>
+            </a:r>
+          </a:p>
+        </p:txBody>
+      </p:sp>
+      <p:sp>
+        <p:nvSpPr>
+          <p:cNvPr id="123" name="Rectangle 122"/>
+          <p:cNvSpPr/>
+          <p:nvPr/>
+        </p:nvSpPr>
+        <p:spPr>
+          <a:xfrm>
+            <a:off x="3152557" y="537471"/>
+            <a:ext cx="1361321" cy="259739"/>
+          </a:xfrm>
+          <a:prstGeom prst="rect">
+            <a:avLst/>
+          </a:prstGeom>
+        </p:spPr>
+        <p:style>
+          <a:lnRef idx="2">
+            <a:schemeClr val="accent4"/>
+          </a:lnRef>
+          <a:fillRef idx="1">
+            <a:schemeClr val="lt1"/>
+          </a:fillRef>
+          <a:effectRef idx="0">
+            <a:schemeClr val="accent4"/>
+          </a:effectRef>
+          <a:fontRef idx="minor">
+            <a:schemeClr val="dk1"/>
+          </a:fontRef>
+        </p:style>
+        <p:txBody>
+          <a:bodyPr lIns="0" rIns="0" rtlCol="0" anchor="ctr"/>
+          <a:lstStyle/>
+          <a:p>
+            <a:pPr algn="ctr"/>
+            <a:r>
+              <a:rPr lang="en-US" sz="1100" dirty="0">
+                <a:solidFill>
+                  <a:sysClr val="windowText" lastClr="000000"/>
+                </a:solidFill>
+                <a:latin typeface="Arial"/>
+                <a:cs typeface="Arial"/>
+              </a:rPr>
+              <a:t>Mesh</a:t>
+            </a:r>
+          </a:p>
+        </p:txBody>
+      </p:sp>
+      <p:sp>
+        <p:nvSpPr>
+          <p:cNvPr id="124" name="Rectangle 123"/>
+          <p:cNvSpPr/>
+          <p:nvPr/>
+        </p:nvSpPr>
+        <p:spPr>
+          <a:xfrm>
+            <a:off x="2086089" y="537471"/>
+            <a:ext cx="979857" cy="259739"/>
+          </a:xfrm>
+          <a:prstGeom prst="rect">
+            <a:avLst/>
+          </a:prstGeom>
+        </p:spPr>
+        <p:style>
+          <a:lnRef idx="2">
+            <a:schemeClr val="accent1"/>
+          </a:lnRef>
+          <a:fillRef idx="1">
+            <a:schemeClr val="lt1"/>
+          </a:fillRef>
+          <a:effectRef idx="0">
+            <a:schemeClr val="accent1"/>
+          </a:effectRef>
+          <a:fontRef idx="minor">
+            <a:schemeClr val="dk1"/>
+          </a:fontRef>
+        </p:style>
+        <p:txBody>
+          <a:bodyPr lIns="0" rIns="0" rtlCol="0" anchor="ctr"/>
+          <a:lstStyle/>
+          <a:p>
+            <a:pPr algn="ctr"/>
+            <a:r>
+              <a:rPr lang="en-US" sz="1100" dirty="0">
+                <a:solidFill>
+                  <a:sysClr val="windowText" lastClr="000000"/>
+                </a:solidFill>
+                <a:latin typeface="Arial"/>
+                <a:cs typeface="Arial"/>
+              </a:rPr>
+              <a:t>Field 2</a:t>
+            </a:r>
+          </a:p>
+        </p:txBody>
+      </p:sp>
+      <p:sp>
+        <p:nvSpPr>
+          <p:cNvPr id="125" name="Rectangle 124"/>
+          <p:cNvSpPr/>
+          <p:nvPr/>
+        </p:nvSpPr>
+        <p:spPr>
+          <a:xfrm>
+            <a:off x="1045557" y="1509810"/>
+            <a:ext cx="292608" cy="260408"/>
+          </a:xfrm>
+          <a:prstGeom prst="rect">
+            <a:avLst/>
+          </a:prstGeom>
+        </p:spPr>
+        <p:style>
+          <a:lnRef idx="2">
+            <a:schemeClr val="accent1"/>
+          </a:lnRef>
+          <a:fillRef idx="1">
+            <a:schemeClr val="lt1"/>
+          </a:fillRef>
+          <a:effectRef idx="0">
+            <a:schemeClr val="accent1"/>
+          </a:effectRef>
+          <a:fontRef idx="minor">
+            <a:schemeClr val="dk1"/>
+          </a:fontRef>
+        </p:style>
+        <p:txBody>
+          <a:bodyPr lIns="0" rIns="0" rtlCol="0" anchor="ctr"/>
+          <a:lstStyle/>
+          <a:p>
+            <a:pPr algn="ctr"/>
+            <a:r>
+              <a:rPr lang="en-US" sz="1100" dirty="0">
+                <a:solidFill>
+                  <a:sysClr val="windowText" lastClr="000000"/>
+                </a:solidFill>
+                <a:latin typeface="Arial"/>
+                <a:cs typeface="Arial"/>
+              </a:rPr>
+              <a:t>F1</a:t>
+            </a:r>
+          </a:p>
+        </p:txBody>
+      </p:sp>
+      <p:sp>
+        <p:nvSpPr>
+          <p:cNvPr id="126" name="Rectangle 125"/>
+          <p:cNvSpPr/>
+          <p:nvPr/>
+        </p:nvSpPr>
+        <p:spPr>
+          <a:xfrm>
+            <a:off x="2093277" y="1509810"/>
+            <a:ext cx="292608" cy="260408"/>
+          </a:xfrm>
+          <a:prstGeom prst="rect">
+            <a:avLst/>
+          </a:prstGeom>
+        </p:spPr>
+        <p:style>
+          <a:lnRef idx="2">
+            <a:schemeClr val="accent1"/>
+          </a:lnRef>
+          <a:fillRef idx="1">
+            <a:schemeClr val="lt1"/>
+          </a:fillRef>
+          <a:effectRef idx="0">
+            <a:schemeClr val="accent1"/>
+          </a:effectRef>
+          <a:fontRef idx="minor">
+            <a:schemeClr val="dk1"/>
+          </a:fontRef>
+        </p:style>
+        <p:txBody>
+          <a:bodyPr lIns="0" rIns="0" rtlCol="0" anchor="ctr"/>
+          <a:lstStyle/>
+          <a:p>
+            <a:pPr algn="ctr"/>
+            <a:r>
+              <a:rPr lang="en-US" sz="1100" dirty="0">
+                <a:solidFill>
+                  <a:sysClr val="windowText" lastClr="000000"/>
+                </a:solidFill>
+                <a:latin typeface="Arial"/>
+                <a:cs typeface="Arial"/>
+              </a:rPr>
+              <a:t>G1</a:t>
+            </a:r>
+          </a:p>
+        </p:txBody>
+      </p:sp>
+      <p:sp>
+        <p:nvSpPr>
+          <p:cNvPr id="127" name="Rectangle 126"/>
+          <p:cNvSpPr/>
+          <p:nvPr/>
+        </p:nvSpPr>
+        <p:spPr>
+          <a:xfrm>
+            <a:off x="2386033" y="1509810"/>
+            <a:ext cx="655490" cy="260408"/>
+          </a:xfrm>
+          <a:prstGeom prst="rect">
+            <a:avLst/>
+          </a:prstGeom>
+        </p:spPr>
+        <p:style>
+          <a:lnRef idx="2">
+            <a:schemeClr val="accent1"/>
+          </a:lnRef>
+          <a:fillRef idx="1">
+            <a:schemeClr val="lt1"/>
+          </a:fillRef>
+          <a:effectRef idx="0">
+            <a:schemeClr val="accent1"/>
+          </a:effectRef>
+          <a:fontRef idx="minor">
+            <a:schemeClr val="dk1"/>
+          </a:fontRef>
+        </p:style>
+        <p:txBody>
+          <a:bodyPr lIns="0" rIns="0" rtlCol="0" anchor="ctr"/>
+          <a:lstStyle/>
+          <a:p>
+            <a:pPr algn="ctr"/>
+            <a:r>
+              <a:rPr lang="en-US" sz="1100" dirty="0">
+                <a:solidFill>
+                  <a:sysClr val="windowText" lastClr="000000"/>
+                </a:solidFill>
+                <a:latin typeface="Arial"/>
+                <a:cs typeface="Arial"/>
+              </a:rPr>
+              <a:t>G2</a:t>
+            </a:r>
+          </a:p>
+        </p:txBody>
+      </p:sp>
+      <p:sp>
+        <p:nvSpPr>
+          <p:cNvPr id="128" name="Rectangle 127"/>
+          <p:cNvSpPr/>
+          <p:nvPr/>
+        </p:nvSpPr>
+        <p:spPr>
+          <a:xfrm>
+            <a:off x="3152557" y="1509810"/>
+            <a:ext cx="397956" cy="260408"/>
+          </a:xfrm>
+          <a:prstGeom prst="rect">
+            <a:avLst/>
+          </a:prstGeom>
+        </p:spPr>
+        <p:style>
+          <a:lnRef idx="2">
+            <a:schemeClr val="accent4"/>
+          </a:lnRef>
+          <a:fillRef idx="1">
+            <a:schemeClr val="lt1"/>
+          </a:fillRef>
+          <a:effectRef idx="0">
+            <a:schemeClr val="accent4"/>
+          </a:effectRef>
+          <a:fontRef idx="minor">
+            <a:schemeClr val="dk1"/>
+          </a:fontRef>
+        </p:style>
+        <p:txBody>
+          <a:bodyPr lIns="0" rIns="0" rtlCol="0" anchor="ctr"/>
+          <a:lstStyle/>
+          <a:p>
+            <a:pPr algn="ctr"/>
+            <a:r>
+              <a:rPr lang="en-US" sz="1100" dirty="0">
+                <a:solidFill>
+                  <a:sysClr val="windowText" lastClr="000000"/>
+                </a:solidFill>
+                <a:latin typeface="Arial"/>
+                <a:cs typeface="Arial"/>
+              </a:rPr>
+              <a:t>M1</a:t>
+            </a:r>
+          </a:p>
+        </p:txBody>
+      </p:sp>
+      <p:sp>
+        <p:nvSpPr>
+          <p:cNvPr id="129" name="Rectangle 128"/>
+          <p:cNvSpPr/>
+          <p:nvPr/>
+        </p:nvSpPr>
+        <p:spPr>
+          <a:xfrm>
+            <a:off x="3550513" y="1509810"/>
+            <a:ext cx="963365" cy="260408"/>
+          </a:xfrm>
+          <a:prstGeom prst="rect">
+            <a:avLst/>
+          </a:prstGeom>
+        </p:spPr>
+        <p:style>
+          <a:lnRef idx="2">
+            <a:schemeClr val="accent4"/>
+          </a:lnRef>
+          <a:fillRef idx="1">
+            <a:schemeClr val="lt1"/>
+          </a:fillRef>
+          <a:effectRef idx="0">
+            <a:schemeClr val="accent4"/>
+          </a:effectRef>
+          <a:fontRef idx="minor">
+            <a:schemeClr val="dk1"/>
+          </a:fontRef>
+        </p:style>
+        <p:txBody>
+          <a:bodyPr lIns="0" rIns="0" rtlCol="0" anchor="ctr"/>
+          <a:lstStyle/>
+          <a:p>
+            <a:pPr algn="ctr"/>
+            <a:r>
+              <a:rPr lang="en-US" sz="1100" dirty="0">
+                <a:solidFill>
+                  <a:sysClr val="windowText" lastClr="000000"/>
+                </a:solidFill>
+                <a:latin typeface="Arial"/>
+                <a:cs typeface="Arial"/>
+              </a:rPr>
+              <a:t>M2</a:t>
+            </a:r>
+          </a:p>
+        </p:txBody>
+      </p:sp>
+      <p:sp>
+        <p:nvSpPr>
+          <p:cNvPr id="130" name="Rectangle 129"/>
+          <p:cNvSpPr/>
+          <p:nvPr/>
+        </p:nvSpPr>
+        <p:spPr>
+          <a:xfrm>
+            <a:off x="1332829" y="1509810"/>
+            <a:ext cx="655490" cy="260408"/>
+          </a:xfrm>
+          <a:prstGeom prst="rect">
+            <a:avLst/>
+          </a:prstGeom>
+        </p:spPr>
+        <p:style>
+          <a:lnRef idx="2">
+            <a:schemeClr val="accent1"/>
+          </a:lnRef>
+          <a:fillRef idx="1">
+            <a:schemeClr val="lt1"/>
+          </a:fillRef>
+          <a:effectRef idx="0">
+            <a:schemeClr val="accent1"/>
+          </a:effectRef>
+          <a:fontRef idx="minor">
+            <a:schemeClr val="dk1"/>
+          </a:fontRef>
+        </p:style>
+        <p:txBody>
+          <a:bodyPr lIns="0" rIns="0" rtlCol="0" anchor="ctr"/>
+          <a:lstStyle/>
+          <a:p>
+            <a:pPr algn="ctr"/>
+            <a:r>
+              <a:rPr lang="en-US" sz="1100" dirty="0">
+                <a:solidFill>
+                  <a:sysClr val="windowText" lastClr="000000"/>
+                </a:solidFill>
+                <a:latin typeface="Arial"/>
+                <a:cs typeface="Arial"/>
+              </a:rPr>
+              <a:t>F2</a:t>
+            </a:r>
+          </a:p>
+        </p:txBody>
+      </p:sp>
+      <p:grpSp>
+        <p:nvGrpSpPr>
+          <p:cNvPr id="139" name="Group 138"/>
+          <p:cNvGrpSpPr/>
+          <p:nvPr/>
+        </p:nvGrpSpPr>
+        <p:grpSpPr>
+          <a:xfrm>
+            <a:off x="1039776" y="1851177"/>
+            <a:ext cx="3191273" cy="1073607"/>
+            <a:chOff x="1159393" y="3395610"/>
+            <a:chExt cx="3191274" cy="1357157"/>
+          </a:xfrm>
+        </p:grpSpPr>
+        <p:sp>
+          <p:nvSpPr>
+            <p:cNvPr id="141" name="Rectangle 140"/>
+            <p:cNvSpPr/>
+            <p:nvPr/>
+          </p:nvSpPr>
+          <p:spPr>
+            <a:xfrm>
+              <a:off x="1159394" y="3744557"/>
+              <a:ext cx="274320" cy="329184"/>
+            </a:xfrm>
+            <a:prstGeom prst="rect">
+              <a:avLst/>
+            </a:prstGeom>
+          </p:spPr>
+          <p:style>
+            <a:lnRef idx="2">
+              <a:schemeClr val="dk1"/>
+            </a:lnRef>
+            <a:fillRef idx="1">
+              <a:schemeClr val="lt1"/>
+            </a:fillRef>
+            <a:effectRef idx="0">
+              <a:schemeClr val="dk1"/>
+            </a:effectRef>
+            <a:fontRef idx="minor">
+              <a:schemeClr val="dk1"/>
+            </a:fontRef>
+          </p:style>
+          <p:txBody>
+            <a:bodyPr lIns="0" rIns="0" rtlCol="0" anchor="ctr"/>
+            <a:lstStyle/>
+            <a:p>
+              <a:pPr algn="ctr"/>
+              <a:r>
+                <a:rPr lang="en-US" sz="1100" dirty="0">
+                  <a:solidFill>
+                    <a:sysClr val="windowText" lastClr="000000"/>
+                  </a:solidFill>
+                  <a:latin typeface="Arial"/>
+                  <a:cs typeface="Arial"/>
+                </a:rPr>
+                <a:t>P1</a:t>
+              </a:r>
+            </a:p>
+          </p:txBody>
+        </p:sp>
+        <p:sp>
+          <p:nvSpPr>
+            <p:cNvPr id="142" name="Rectangle 141"/>
+            <p:cNvSpPr/>
+            <p:nvPr/>
+          </p:nvSpPr>
+          <p:spPr>
+            <a:xfrm>
+              <a:off x="1432305" y="3743713"/>
+              <a:ext cx="551619" cy="329184"/>
+            </a:xfrm>
+            <a:prstGeom prst="rect">
+              <a:avLst/>
+            </a:prstGeom>
+          </p:spPr>
+          <p:style>
+            <a:lnRef idx="2">
+              <a:schemeClr val="dk1"/>
+            </a:lnRef>
+            <a:fillRef idx="1">
+              <a:schemeClr val="lt1"/>
+            </a:fillRef>
+            <a:effectRef idx="0">
+              <a:schemeClr val="dk1"/>
+            </a:effectRef>
+            <a:fontRef idx="minor">
+              <a:schemeClr val="dk1"/>
+            </a:fontRef>
+          </p:style>
+          <p:txBody>
+            <a:bodyPr lIns="0" rIns="0" rtlCol="0" anchor="ctr"/>
+            <a:lstStyle/>
+            <a:p>
+              <a:pPr algn="ctr"/>
+              <a:r>
+                <a:rPr lang="en-US" sz="1100" dirty="0">
+                  <a:solidFill>
+                    <a:sysClr val="windowText" lastClr="000000"/>
+                  </a:solidFill>
+                  <a:latin typeface="Arial"/>
+                  <a:cs typeface="Arial"/>
+                </a:rPr>
+                <a:t>P2</a:t>
+              </a:r>
+            </a:p>
+          </p:txBody>
+        </p:sp>
+        <p:sp>
+          <p:nvSpPr>
+            <p:cNvPr id="143" name="Rectangle 142"/>
+            <p:cNvSpPr/>
+            <p:nvPr/>
+          </p:nvSpPr>
+          <p:spPr>
+            <a:xfrm>
+              <a:off x="2005107" y="3744557"/>
+              <a:ext cx="292608" cy="329184"/>
+            </a:xfrm>
+            <a:prstGeom prst="rect">
+              <a:avLst/>
+            </a:prstGeom>
+          </p:spPr>
+          <p:style>
+            <a:lnRef idx="2">
+              <a:schemeClr val="accent1"/>
+            </a:lnRef>
+            <a:fillRef idx="1">
+              <a:schemeClr val="lt1"/>
+            </a:fillRef>
+            <a:effectRef idx="0">
+              <a:schemeClr val="accent1"/>
+            </a:effectRef>
+            <a:fontRef idx="minor">
+              <a:schemeClr val="dk1"/>
+            </a:fontRef>
+          </p:style>
+          <p:txBody>
+            <a:bodyPr lIns="0" rIns="0" rtlCol="0" anchor="ctr"/>
+            <a:lstStyle/>
+            <a:p>
+              <a:pPr algn="ctr"/>
+              <a:r>
+                <a:rPr lang="en-US" sz="1100" dirty="0">
+                  <a:solidFill>
+                    <a:sysClr val="windowText" lastClr="000000"/>
+                  </a:solidFill>
+                  <a:latin typeface="Arial"/>
+                  <a:cs typeface="Arial"/>
+                </a:rPr>
+                <a:t>F1</a:t>
+              </a:r>
+            </a:p>
+          </p:txBody>
+        </p:sp>
+        <p:sp>
+          <p:nvSpPr>
+            <p:cNvPr id="144" name="Rectangle 143"/>
+            <p:cNvSpPr/>
+            <p:nvPr/>
+          </p:nvSpPr>
+          <p:spPr>
+            <a:xfrm>
+              <a:off x="2307270" y="3744557"/>
+              <a:ext cx="292608" cy="329184"/>
+            </a:xfrm>
+            <a:prstGeom prst="rect">
+              <a:avLst/>
+            </a:prstGeom>
+          </p:spPr>
+          <p:style>
+            <a:lnRef idx="2">
+              <a:schemeClr val="accent1"/>
+            </a:lnRef>
+            <a:fillRef idx="1">
+              <a:schemeClr val="lt1"/>
+            </a:fillRef>
+            <a:effectRef idx="0">
+              <a:schemeClr val="accent1"/>
+            </a:effectRef>
+            <a:fontRef idx="minor">
+              <a:schemeClr val="dk1"/>
+            </a:fontRef>
+          </p:style>
+          <p:txBody>
+            <a:bodyPr lIns="0" rIns="0" rtlCol="0" anchor="ctr"/>
+            <a:lstStyle/>
+            <a:p>
+              <a:pPr algn="ctr"/>
+              <a:r>
+                <a:rPr lang="en-US" sz="1100" dirty="0">
+                  <a:solidFill>
+                    <a:sysClr val="windowText" lastClr="000000"/>
+                  </a:solidFill>
+                  <a:latin typeface="Arial"/>
+                  <a:cs typeface="Arial"/>
+                </a:rPr>
+                <a:t>G1</a:t>
+              </a:r>
+            </a:p>
+          </p:txBody>
+        </p:sp>
+        <p:sp>
+          <p:nvSpPr>
+            <p:cNvPr id="145" name="Rectangle 144"/>
+            <p:cNvSpPr/>
+            <p:nvPr/>
+          </p:nvSpPr>
+          <p:spPr>
+            <a:xfrm>
+              <a:off x="2599878" y="3746037"/>
+              <a:ext cx="426105" cy="329184"/>
+            </a:xfrm>
+            <a:prstGeom prst="rect">
+              <a:avLst/>
+            </a:prstGeom>
+          </p:spPr>
+          <p:style>
+            <a:lnRef idx="2">
+              <a:schemeClr val="accent4"/>
+            </a:lnRef>
+            <a:fillRef idx="1">
+              <a:schemeClr val="lt1"/>
+            </a:fillRef>
+            <a:effectRef idx="0">
+              <a:schemeClr val="accent4"/>
+            </a:effectRef>
+            <a:fontRef idx="minor">
+              <a:schemeClr val="dk1"/>
+            </a:fontRef>
+          </p:style>
+          <p:txBody>
+            <a:bodyPr lIns="0" rIns="0" rtlCol="0" anchor="ctr"/>
+            <a:lstStyle/>
+            <a:p>
+              <a:pPr algn="ctr"/>
+              <a:r>
+                <a:rPr lang="en-US" sz="1100" dirty="0">
+                  <a:solidFill>
+                    <a:sysClr val="windowText" lastClr="000000"/>
+                  </a:solidFill>
+                  <a:latin typeface="Arial"/>
+                  <a:cs typeface="Arial"/>
+                </a:rPr>
+                <a:t>M1</a:t>
+              </a:r>
+            </a:p>
+          </p:txBody>
+        </p:sp>
+        <p:sp>
+          <p:nvSpPr>
+            <p:cNvPr id="147" name="Rectangle 146"/>
+            <p:cNvSpPr/>
+            <p:nvPr/>
+          </p:nvSpPr>
+          <p:spPr>
+            <a:xfrm>
+              <a:off x="1829479" y="4094399"/>
+              <a:ext cx="655490" cy="329184"/>
+            </a:xfrm>
+            <a:prstGeom prst="rect">
+              <a:avLst/>
+            </a:prstGeom>
+          </p:spPr>
+          <p:style>
+            <a:lnRef idx="2">
+              <a:schemeClr val="accent1"/>
+            </a:lnRef>
+            <a:fillRef idx="1">
+              <a:schemeClr val="lt1"/>
+            </a:fillRef>
+            <a:effectRef idx="0">
+              <a:schemeClr val="accent1"/>
+            </a:effectRef>
+            <a:fontRef idx="minor">
+              <a:schemeClr val="dk1"/>
+            </a:fontRef>
+          </p:style>
+          <p:txBody>
+            <a:bodyPr lIns="0" rIns="0" rtlCol="0" anchor="ctr"/>
+            <a:lstStyle/>
+            <a:p>
+              <a:pPr algn="ctr"/>
+              <a:r>
+                <a:rPr lang="en-US" sz="1100" dirty="0">
+                  <a:solidFill>
+                    <a:sysClr val="windowText" lastClr="000000"/>
+                  </a:solidFill>
+                  <a:latin typeface="Arial"/>
+                  <a:cs typeface="Arial"/>
+                </a:rPr>
+                <a:t>G2</a:t>
+              </a:r>
+            </a:p>
+          </p:txBody>
+        </p:sp>
+        <p:sp>
+          <p:nvSpPr>
+            <p:cNvPr id="148" name="Rectangle 147"/>
+            <p:cNvSpPr/>
+            <p:nvPr/>
+          </p:nvSpPr>
+          <p:spPr>
+            <a:xfrm>
+              <a:off x="2496296" y="4088569"/>
+              <a:ext cx="961164" cy="329184"/>
+            </a:xfrm>
+            <a:prstGeom prst="rect">
+              <a:avLst/>
+            </a:prstGeom>
+          </p:spPr>
+          <p:style>
+            <a:lnRef idx="2">
+              <a:schemeClr val="accent4"/>
+            </a:lnRef>
+            <a:fillRef idx="1">
+              <a:schemeClr val="lt1"/>
+            </a:fillRef>
+            <a:effectRef idx="0">
+              <a:schemeClr val="accent4"/>
+            </a:effectRef>
+            <a:fontRef idx="minor">
+              <a:schemeClr val="dk1"/>
+            </a:fontRef>
+          </p:style>
+          <p:txBody>
+            <a:bodyPr lIns="0" rIns="0" rtlCol="0" anchor="ctr"/>
+            <a:lstStyle/>
+            <a:p>
+              <a:pPr algn="ctr"/>
+              <a:r>
+                <a:rPr lang="en-US" sz="1100" dirty="0">
+                  <a:solidFill>
+                    <a:sysClr val="windowText" lastClr="000000"/>
+                  </a:solidFill>
+                  <a:latin typeface="Arial"/>
+                  <a:cs typeface="Arial"/>
+                </a:rPr>
+                <a:t>M2</a:t>
+              </a:r>
+            </a:p>
+          </p:txBody>
+        </p:sp>
+        <p:sp>
+          <p:nvSpPr>
+            <p:cNvPr id="149" name="Rectangle 148"/>
+            <p:cNvSpPr/>
+            <p:nvPr/>
+          </p:nvSpPr>
+          <p:spPr>
+            <a:xfrm>
+              <a:off x="1162661" y="4094399"/>
+              <a:ext cx="655490" cy="329184"/>
+            </a:xfrm>
+            <a:prstGeom prst="rect">
+              <a:avLst/>
+            </a:prstGeom>
+          </p:spPr>
+          <p:style>
+            <a:lnRef idx="2">
+              <a:schemeClr val="accent1"/>
+            </a:lnRef>
+            <a:fillRef idx="1">
+              <a:schemeClr val="lt1"/>
+            </a:fillRef>
+            <a:effectRef idx="0">
+              <a:schemeClr val="accent1"/>
+            </a:effectRef>
+            <a:fontRef idx="minor">
+              <a:schemeClr val="dk1"/>
+            </a:fontRef>
+          </p:style>
+          <p:txBody>
+            <a:bodyPr lIns="0" rIns="0" rtlCol="0" anchor="ctr"/>
+            <a:lstStyle/>
+            <a:p>
+              <a:pPr algn="ctr"/>
+              <a:r>
+                <a:rPr lang="en-US" sz="1100" dirty="0">
+                  <a:solidFill>
+                    <a:sysClr val="windowText" lastClr="000000"/>
+                  </a:solidFill>
+                  <a:latin typeface="Arial"/>
+                  <a:cs typeface="Arial"/>
+                </a:rPr>
+                <a:t>F2</a:t>
+              </a:r>
+            </a:p>
+          </p:txBody>
+        </p:sp>
+        <p:sp>
+          <p:nvSpPr>
+            <p:cNvPr id="150" name="Rectangle 149"/>
+            <p:cNvSpPr/>
+            <p:nvPr/>
+          </p:nvSpPr>
+          <p:spPr>
+            <a:xfrm>
+              <a:off x="1165702" y="4423583"/>
+              <a:ext cx="951110" cy="329184"/>
+            </a:xfrm>
+            <a:prstGeom prst="rect">
+              <a:avLst/>
+            </a:prstGeom>
+          </p:spPr>
+          <p:style>
+            <a:lnRef idx="2">
+              <a:schemeClr val="dk1"/>
+            </a:lnRef>
+            <a:fillRef idx="1">
+              <a:schemeClr val="lt1"/>
+            </a:fillRef>
+            <a:effectRef idx="0">
+              <a:schemeClr val="dk1"/>
+            </a:effectRef>
+            <a:fontRef idx="minor">
+              <a:schemeClr val="dk1"/>
+            </a:fontRef>
+          </p:style>
+          <p:txBody>
+            <a:bodyPr lIns="0" rIns="0" rtlCol="0" anchor="ctr"/>
+            <a:lstStyle/>
+            <a:p>
+              <a:pPr algn="ctr"/>
+              <a:r>
+                <a:rPr lang="en-US" sz="1100" dirty="0">
+                  <a:solidFill>
+                    <a:sysClr val="windowText" lastClr="000000"/>
+                  </a:solidFill>
+                  <a:latin typeface="Arial"/>
+                  <a:cs typeface="Arial"/>
+                </a:rPr>
+                <a:t>P3</a:t>
+              </a:r>
+            </a:p>
+          </p:txBody>
+        </p:sp>
+        <p:sp>
+          <p:nvSpPr>
+            <p:cNvPr id="151" name="Rectangle 150"/>
+            <p:cNvSpPr/>
+            <p:nvPr/>
+          </p:nvSpPr>
+          <p:spPr>
+            <a:xfrm>
+              <a:off x="2125985" y="4423583"/>
+              <a:ext cx="1746504" cy="329184"/>
+            </a:xfrm>
+            <a:prstGeom prst="rect">
+              <a:avLst/>
+            </a:prstGeom>
+          </p:spPr>
+          <p:style>
+            <a:lnRef idx="2">
+              <a:schemeClr val="dk1"/>
+            </a:lnRef>
+            <a:fillRef idx="1">
+              <a:schemeClr val="lt1"/>
+            </a:fillRef>
+            <a:effectRef idx="0">
+              <a:schemeClr val="dk1"/>
+            </a:effectRef>
+            <a:fontRef idx="minor">
+              <a:schemeClr val="dk1"/>
+            </a:fontRef>
+          </p:style>
+          <p:txBody>
+            <a:bodyPr lIns="0" rIns="0" rtlCol="0" anchor="ctr"/>
+            <a:lstStyle/>
+            <a:p>
+              <a:pPr algn="ctr"/>
+              <a:r>
+                <a:rPr lang="en-US" sz="1100" dirty="0">
+                  <a:solidFill>
+                    <a:sysClr val="windowText" lastClr="000000"/>
+                  </a:solidFill>
+                  <a:latin typeface="Arial"/>
+                  <a:cs typeface="Arial"/>
+                </a:rPr>
+                <a:t>P4</a:t>
+              </a:r>
+            </a:p>
+          </p:txBody>
+        </p:sp>
+        <p:sp>
+          <p:nvSpPr>
+            <p:cNvPr id="152" name="TextBox 151"/>
+            <p:cNvSpPr txBox="1"/>
+            <p:nvPr/>
+          </p:nvSpPr>
+          <p:spPr>
+            <a:xfrm>
+              <a:off x="1159393" y="3395610"/>
+              <a:ext cx="3191274" cy="330704"/>
+            </a:xfrm>
+            <a:prstGeom prst="rect">
+              <a:avLst/>
+            </a:prstGeom>
+            <a:noFill/>
+          </p:spPr>
+          <p:txBody>
+            <a:bodyPr wrap="none" rtlCol="0">
+              <a:spAutoFit/>
+            </a:bodyPr>
+            <a:lstStyle/>
+            <a:p>
+              <a:r>
+                <a:rPr lang="en-US" sz="1100" i="1" dirty="0" smtClean="0"/>
+                <a:t>c. Initial storage </a:t>
+              </a:r>
+              <a:r>
+                <a:rPr lang="en-US" sz="1100" i="1" dirty="0" smtClean="0"/>
+                <a:t>layout after data movement settled</a:t>
+              </a:r>
+              <a:endParaRPr lang="en-US" sz="1100" i="1" dirty="0"/>
+            </a:p>
+          </p:txBody>
+        </p:sp>
+      </p:grpSp>
+      <p:grpSp>
+        <p:nvGrpSpPr>
+          <p:cNvPr id="153" name="Group 152"/>
+          <p:cNvGrpSpPr/>
+          <p:nvPr/>
+        </p:nvGrpSpPr>
+        <p:grpSpPr>
+          <a:xfrm>
+            <a:off x="1039776" y="3105239"/>
+            <a:ext cx="3323843" cy="1063999"/>
+            <a:chOff x="634973" y="4576699"/>
+            <a:chExt cx="3323844" cy="1345012"/>
+          </a:xfrm>
+        </p:grpSpPr>
+        <p:sp>
+          <p:nvSpPr>
+            <p:cNvPr id="154" name="Rectangle 153"/>
+            <p:cNvSpPr/>
+            <p:nvPr/>
+          </p:nvSpPr>
+          <p:spPr>
+            <a:xfrm>
+              <a:off x="664533" y="4909489"/>
+              <a:ext cx="274320" cy="329184"/>
+            </a:xfrm>
+            <a:prstGeom prst="rect">
+              <a:avLst/>
+            </a:prstGeom>
+          </p:spPr>
+          <p:style>
+            <a:lnRef idx="2">
+              <a:schemeClr val="dk1"/>
+            </a:lnRef>
+            <a:fillRef idx="1">
+              <a:schemeClr val="lt1"/>
+            </a:fillRef>
+            <a:effectRef idx="0">
+              <a:schemeClr val="dk1"/>
+            </a:effectRef>
+            <a:fontRef idx="minor">
+              <a:schemeClr val="dk1"/>
+            </a:fontRef>
+          </p:style>
+          <p:txBody>
+            <a:bodyPr lIns="0" rIns="0" rtlCol="0" anchor="ctr"/>
+            <a:lstStyle/>
+            <a:p>
+              <a:pPr algn="ctr"/>
+              <a:r>
+                <a:rPr lang="en-US" sz="1100" dirty="0">
+                  <a:solidFill>
+                    <a:sysClr val="windowText" lastClr="000000"/>
+                  </a:solidFill>
+                  <a:latin typeface="Arial"/>
+                  <a:cs typeface="Arial"/>
+                </a:rPr>
+                <a:t>P1</a:t>
+              </a:r>
+            </a:p>
+          </p:txBody>
+        </p:sp>
+        <p:sp>
+          <p:nvSpPr>
+            <p:cNvPr id="155" name="Rectangle 154"/>
+            <p:cNvSpPr/>
+            <p:nvPr/>
+          </p:nvSpPr>
+          <p:spPr>
+            <a:xfrm>
+              <a:off x="945431" y="4909489"/>
+              <a:ext cx="292608" cy="329184"/>
+            </a:xfrm>
+            <a:prstGeom prst="rect">
+              <a:avLst/>
+            </a:prstGeom>
+          </p:spPr>
+          <p:style>
+            <a:lnRef idx="2">
+              <a:schemeClr val="accent1"/>
+            </a:lnRef>
+            <a:fillRef idx="1">
+              <a:schemeClr val="lt1"/>
+            </a:fillRef>
+            <a:effectRef idx="0">
+              <a:schemeClr val="accent1"/>
+            </a:effectRef>
+            <a:fontRef idx="minor">
+              <a:schemeClr val="dk1"/>
+            </a:fontRef>
+          </p:style>
+          <p:txBody>
+            <a:bodyPr lIns="0" rIns="0" rtlCol="0" anchor="ctr"/>
+            <a:lstStyle/>
+            <a:p>
+              <a:pPr algn="ctr"/>
+              <a:r>
+                <a:rPr lang="en-US" sz="1100" dirty="0">
+                  <a:solidFill>
+                    <a:sysClr val="windowText" lastClr="000000"/>
+                  </a:solidFill>
+                  <a:latin typeface="Arial"/>
+                  <a:cs typeface="Arial"/>
+                </a:rPr>
+                <a:t>F1</a:t>
+              </a:r>
+            </a:p>
+          </p:txBody>
+        </p:sp>
+        <p:sp>
+          <p:nvSpPr>
+            <p:cNvPr id="156" name="Rectangle 155"/>
+            <p:cNvSpPr/>
+            <p:nvPr/>
+          </p:nvSpPr>
+          <p:spPr>
+            <a:xfrm>
+              <a:off x="1247594" y="4909489"/>
+              <a:ext cx="292608" cy="329184"/>
+            </a:xfrm>
+            <a:prstGeom prst="rect">
+              <a:avLst/>
+            </a:prstGeom>
+          </p:spPr>
+          <p:style>
+            <a:lnRef idx="2">
+              <a:schemeClr val="accent1"/>
+            </a:lnRef>
+            <a:fillRef idx="1">
+              <a:schemeClr val="lt1"/>
+            </a:fillRef>
+            <a:effectRef idx="0">
+              <a:schemeClr val="accent1"/>
+            </a:effectRef>
+            <a:fontRef idx="minor">
+              <a:schemeClr val="dk1"/>
+            </a:fontRef>
+          </p:style>
+          <p:txBody>
+            <a:bodyPr lIns="0" rIns="0" rtlCol="0" anchor="ctr"/>
+            <a:lstStyle/>
+            <a:p>
+              <a:pPr algn="ctr"/>
+              <a:r>
+                <a:rPr lang="en-US" sz="1100" dirty="0">
+                  <a:solidFill>
+                    <a:sysClr val="windowText" lastClr="000000"/>
+                  </a:solidFill>
+                  <a:latin typeface="Arial"/>
+                  <a:cs typeface="Arial"/>
+                </a:rPr>
+                <a:t>G1</a:t>
+              </a:r>
+            </a:p>
+          </p:txBody>
+        </p:sp>
+        <p:sp>
+          <p:nvSpPr>
+            <p:cNvPr id="157" name="Rectangle 156"/>
+            <p:cNvSpPr/>
+            <p:nvPr/>
+          </p:nvSpPr>
+          <p:spPr>
+            <a:xfrm>
+              <a:off x="1540202" y="4910969"/>
+              <a:ext cx="431674" cy="329184"/>
+            </a:xfrm>
+            <a:prstGeom prst="rect">
+              <a:avLst/>
+            </a:prstGeom>
+          </p:spPr>
+          <p:style>
+            <a:lnRef idx="2">
+              <a:schemeClr val="accent4"/>
+            </a:lnRef>
+            <a:fillRef idx="1">
+              <a:schemeClr val="lt1"/>
+            </a:fillRef>
+            <a:effectRef idx="0">
+              <a:schemeClr val="accent4"/>
+            </a:effectRef>
+            <a:fontRef idx="minor">
+              <a:schemeClr val="dk1"/>
+            </a:fontRef>
+          </p:style>
+          <p:txBody>
+            <a:bodyPr lIns="0" rIns="0" rtlCol="0" anchor="ctr"/>
+            <a:lstStyle/>
+            <a:p>
+              <a:pPr algn="ctr"/>
+              <a:r>
+                <a:rPr lang="en-US" sz="1100" dirty="0">
+                  <a:solidFill>
+                    <a:sysClr val="windowText" lastClr="000000"/>
+                  </a:solidFill>
+                  <a:latin typeface="Arial"/>
+                  <a:cs typeface="Arial"/>
+                </a:rPr>
+                <a:t>M1</a:t>
+              </a:r>
+            </a:p>
+          </p:txBody>
+        </p:sp>
+        <p:sp>
+          <p:nvSpPr>
+            <p:cNvPr id="159" name="Rectangle 158"/>
+            <p:cNvSpPr/>
+            <p:nvPr/>
+          </p:nvSpPr>
+          <p:spPr>
+            <a:xfrm>
+              <a:off x="1326365" y="5259331"/>
+              <a:ext cx="655490" cy="329184"/>
+            </a:xfrm>
+            <a:prstGeom prst="rect">
+              <a:avLst/>
+            </a:prstGeom>
+          </p:spPr>
+          <p:style>
+            <a:lnRef idx="2">
+              <a:schemeClr val="accent1"/>
+            </a:lnRef>
+            <a:fillRef idx="1">
+              <a:schemeClr val="lt1"/>
+            </a:fillRef>
+            <a:effectRef idx="0">
+              <a:schemeClr val="accent1"/>
+            </a:effectRef>
+            <a:fontRef idx="minor">
+              <a:schemeClr val="dk1"/>
+            </a:fontRef>
+          </p:style>
+          <p:txBody>
+            <a:bodyPr lIns="0" rIns="0" rtlCol="0" anchor="ctr"/>
+            <a:lstStyle/>
+            <a:p>
+              <a:pPr algn="ctr"/>
+              <a:r>
+                <a:rPr lang="en-US" sz="1100" dirty="0">
+                  <a:solidFill>
+                    <a:sysClr val="windowText" lastClr="000000"/>
+                  </a:solidFill>
+                  <a:latin typeface="Arial"/>
+                  <a:cs typeface="Arial"/>
+                </a:rPr>
+                <a:t>G2</a:t>
+              </a:r>
+            </a:p>
+          </p:txBody>
+        </p:sp>
+        <p:sp>
+          <p:nvSpPr>
+            <p:cNvPr id="160" name="Rectangle 159"/>
+            <p:cNvSpPr/>
+            <p:nvPr/>
+          </p:nvSpPr>
+          <p:spPr>
+            <a:xfrm>
+              <a:off x="1993183" y="5253501"/>
+              <a:ext cx="1246460" cy="329184"/>
+            </a:xfrm>
+            <a:prstGeom prst="rect">
+              <a:avLst/>
+            </a:prstGeom>
+          </p:spPr>
+          <p:style>
+            <a:lnRef idx="2">
+              <a:schemeClr val="accent4"/>
+            </a:lnRef>
+            <a:fillRef idx="1">
+              <a:schemeClr val="lt1"/>
+            </a:fillRef>
+            <a:effectRef idx="0">
+              <a:schemeClr val="accent4"/>
+            </a:effectRef>
+            <a:fontRef idx="minor">
+              <a:schemeClr val="dk1"/>
+            </a:fontRef>
+          </p:style>
+          <p:txBody>
+            <a:bodyPr lIns="0" rIns="0" rtlCol="0" anchor="ctr"/>
+            <a:lstStyle/>
+            <a:p>
+              <a:pPr algn="ctr"/>
+              <a:r>
+                <a:rPr lang="en-US" sz="1100" dirty="0">
+                  <a:solidFill>
+                    <a:sysClr val="windowText" lastClr="000000"/>
+                  </a:solidFill>
+                  <a:latin typeface="Arial"/>
+                  <a:cs typeface="Arial"/>
+                </a:rPr>
+                <a:t>M2</a:t>
+              </a:r>
+            </a:p>
+          </p:txBody>
+        </p:sp>
+        <p:sp>
+          <p:nvSpPr>
+            <p:cNvPr id="161" name="Rectangle 160"/>
+            <p:cNvSpPr/>
+            <p:nvPr/>
+          </p:nvSpPr>
+          <p:spPr>
+            <a:xfrm>
+              <a:off x="659547" y="5259331"/>
+              <a:ext cx="655490" cy="329184"/>
+            </a:xfrm>
+            <a:prstGeom prst="rect">
+              <a:avLst/>
+            </a:prstGeom>
+          </p:spPr>
+          <p:style>
+            <a:lnRef idx="2">
+              <a:schemeClr val="accent1"/>
+            </a:lnRef>
+            <a:fillRef idx="1">
+              <a:schemeClr val="lt1"/>
+            </a:fillRef>
+            <a:effectRef idx="0">
+              <a:schemeClr val="accent1"/>
+            </a:effectRef>
+            <a:fontRef idx="minor">
+              <a:schemeClr val="dk1"/>
+            </a:fontRef>
+          </p:style>
+          <p:txBody>
+            <a:bodyPr lIns="0" rIns="0" rtlCol="0" anchor="ctr"/>
+            <a:lstStyle/>
+            <a:p>
+              <a:pPr algn="ctr"/>
+              <a:r>
+                <a:rPr lang="en-US" sz="1100" dirty="0">
+                  <a:solidFill>
+                    <a:sysClr val="windowText" lastClr="000000"/>
+                  </a:solidFill>
+                  <a:latin typeface="Arial"/>
+                  <a:cs typeface="Arial"/>
+                </a:rPr>
+                <a:t>F2</a:t>
+              </a:r>
+            </a:p>
+          </p:txBody>
+        </p:sp>
+        <p:sp>
+          <p:nvSpPr>
+            <p:cNvPr id="162" name="Rectangle 161"/>
+            <p:cNvSpPr/>
+            <p:nvPr/>
+          </p:nvSpPr>
+          <p:spPr>
+            <a:xfrm>
+              <a:off x="664533" y="5588515"/>
+              <a:ext cx="951110" cy="329184"/>
+            </a:xfrm>
+            <a:prstGeom prst="rect">
+              <a:avLst/>
+            </a:prstGeom>
+          </p:spPr>
+          <p:style>
+            <a:lnRef idx="2">
+              <a:schemeClr val="dk1"/>
+            </a:lnRef>
+            <a:fillRef idx="1">
+              <a:schemeClr val="lt1"/>
+            </a:fillRef>
+            <a:effectRef idx="0">
+              <a:schemeClr val="dk1"/>
+            </a:effectRef>
+            <a:fontRef idx="minor">
+              <a:schemeClr val="dk1"/>
+            </a:fontRef>
+          </p:style>
+          <p:txBody>
+            <a:bodyPr lIns="0" rIns="0" rtlCol="0" anchor="ctr"/>
+            <a:lstStyle/>
+            <a:p>
+              <a:pPr algn="ctr"/>
+              <a:r>
+                <a:rPr lang="en-US" sz="1100" dirty="0">
+                  <a:solidFill>
+                    <a:sysClr val="windowText" lastClr="000000"/>
+                  </a:solidFill>
+                  <a:latin typeface="Arial"/>
+                  <a:cs typeface="Arial"/>
+                </a:rPr>
+                <a:t>P3</a:t>
+              </a:r>
+            </a:p>
+          </p:txBody>
+        </p:sp>
+        <p:sp>
+          <p:nvSpPr>
+            <p:cNvPr id="163" name="Rectangle 162"/>
+            <p:cNvSpPr/>
+            <p:nvPr/>
+          </p:nvSpPr>
+          <p:spPr>
+            <a:xfrm>
+              <a:off x="1624816" y="5588515"/>
+              <a:ext cx="1746504" cy="329184"/>
+            </a:xfrm>
+            <a:prstGeom prst="rect">
+              <a:avLst/>
+            </a:prstGeom>
+          </p:spPr>
+          <p:style>
+            <a:lnRef idx="2">
+              <a:schemeClr val="dk1"/>
+            </a:lnRef>
+            <a:fillRef idx="1">
+              <a:schemeClr val="lt1"/>
+            </a:fillRef>
+            <a:effectRef idx="0">
+              <a:schemeClr val="dk1"/>
+            </a:effectRef>
+            <a:fontRef idx="minor">
+              <a:schemeClr val="dk1"/>
+            </a:fontRef>
+          </p:style>
+          <p:txBody>
+            <a:bodyPr lIns="0" rIns="0" rtlCol="0" anchor="ctr"/>
+            <a:lstStyle/>
+            <a:p>
+              <a:pPr algn="ctr"/>
+              <a:r>
+                <a:rPr lang="en-US" sz="1100" dirty="0">
+                  <a:solidFill>
+                    <a:sysClr val="windowText" lastClr="000000"/>
+                  </a:solidFill>
+                  <a:latin typeface="Arial"/>
+                  <a:cs typeface="Arial"/>
+                </a:rPr>
+                <a:t>P4</a:t>
+              </a:r>
+            </a:p>
+          </p:txBody>
+        </p:sp>
+        <p:sp>
+          <p:nvSpPr>
+            <p:cNvPr id="164" name="TextBox 163"/>
+            <p:cNvSpPr txBox="1"/>
+            <p:nvPr/>
+          </p:nvSpPr>
+          <p:spPr>
+            <a:xfrm>
+              <a:off x="634973" y="4576699"/>
+              <a:ext cx="3262151" cy="330704"/>
+            </a:xfrm>
+            <a:prstGeom prst="rect">
+              <a:avLst/>
+            </a:prstGeom>
+            <a:noFill/>
+          </p:spPr>
+          <p:txBody>
+            <a:bodyPr wrap="none" rtlCol="0">
+              <a:spAutoFit/>
+            </a:bodyPr>
+            <a:lstStyle/>
+            <a:p>
+              <a:r>
+                <a:rPr lang="en-US" sz="1100" i="1" dirty="0" smtClean="0"/>
+                <a:t>d. Storage layout </a:t>
+              </a:r>
+              <a:r>
+                <a:rPr lang="en-US" sz="1100" i="1" dirty="0" smtClean="0"/>
+                <a:t>at a later point in the data life-cycle</a:t>
+              </a:r>
+              <a:endParaRPr lang="en-US" sz="1100" i="1" dirty="0"/>
+            </a:p>
+          </p:txBody>
+        </p:sp>
+        <p:sp>
+          <p:nvSpPr>
+            <p:cNvPr id="165" name="Rectangle 164"/>
+            <p:cNvSpPr/>
+            <p:nvPr/>
+          </p:nvSpPr>
+          <p:spPr>
+            <a:xfrm>
+              <a:off x="3392354" y="5592527"/>
+              <a:ext cx="566463" cy="329184"/>
+            </a:xfrm>
+            <a:prstGeom prst="rect">
+              <a:avLst/>
+            </a:prstGeom>
+          </p:spPr>
+          <p:style>
+            <a:lnRef idx="2">
+              <a:schemeClr val="dk1"/>
+            </a:lnRef>
+            <a:fillRef idx="1">
+              <a:schemeClr val="lt1"/>
+            </a:fillRef>
+            <a:effectRef idx="0">
+              <a:schemeClr val="dk1"/>
+            </a:effectRef>
+            <a:fontRef idx="minor">
+              <a:schemeClr val="dk1"/>
+            </a:fontRef>
+          </p:style>
+          <p:txBody>
+            <a:bodyPr lIns="0" rIns="0" rtlCol="0" anchor="ctr"/>
+            <a:lstStyle/>
+            <a:p>
+              <a:pPr algn="ctr"/>
+              <a:r>
+                <a:rPr lang="en-US" sz="1100" dirty="0">
+                  <a:solidFill>
+                    <a:sysClr val="windowText" lastClr="000000"/>
+                  </a:solidFill>
+                  <a:latin typeface="Arial"/>
+                  <a:cs typeface="Arial"/>
+                </a:rPr>
+                <a:t>P2</a:t>
+              </a:r>
+            </a:p>
+          </p:txBody>
+        </p:sp>
+      </p:grpSp>
+      <p:sp>
+        <p:nvSpPr>
+          <p:cNvPr id="2" name="TextBox 1"/>
+          <p:cNvSpPr txBox="1"/>
+          <p:nvPr/>
+        </p:nvSpPr>
+        <p:spPr>
+          <a:xfrm>
+            <a:off x="204577" y="2084847"/>
+            <a:ext cx="732630" cy="246221"/>
+          </a:xfrm>
+          <a:prstGeom prst="rect">
+            <a:avLst/>
+          </a:prstGeom>
+          <a:noFill/>
+        </p:spPr>
+        <p:txBody>
+          <a:bodyPr wrap="none" rtlCol="0">
+            <a:spAutoFit/>
+          </a:bodyPr>
+          <a:lstStyle/>
+          <a:p>
+            <a:pPr algn="r"/>
+            <a:r>
+              <a:rPr lang="en-US" sz="1000" b="1" dirty="0" smtClean="0"/>
+              <a:t>Parallel FS</a:t>
+            </a:r>
+            <a:endParaRPr lang="en-US" sz="1000" b="1" dirty="0"/>
+          </a:p>
+        </p:txBody>
+      </p:sp>
+      <p:sp>
+        <p:nvSpPr>
+          <p:cNvPr id="51" name="TextBox 50"/>
+          <p:cNvSpPr txBox="1"/>
+          <p:nvPr/>
+        </p:nvSpPr>
+        <p:spPr>
+          <a:xfrm>
+            <a:off x="223801" y="2368315"/>
+            <a:ext cx="713406" cy="246221"/>
+          </a:xfrm>
+          <a:prstGeom prst="rect">
+            <a:avLst/>
+          </a:prstGeom>
+          <a:noFill/>
+        </p:spPr>
+        <p:txBody>
+          <a:bodyPr wrap="none" rtlCol="0">
+            <a:spAutoFit/>
+          </a:bodyPr>
+          <a:lstStyle/>
+          <a:p>
+            <a:pPr algn="r"/>
+            <a:r>
+              <a:rPr lang="en-US" sz="1000" b="1" dirty="0" smtClean="0"/>
+              <a:t>Campaign</a:t>
+            </a:r>
+            <a:endParaRPr lang="en-US" sz="1000" b="1" dirty="0"/>
+          </a:p>
+        </p:txBody>
+      </p:sp>
+      <p:sp>
+        <p:nvSpPr>
+          <p:cNvPr id="52" name="TextBox 51"/>
+          <p:cNvSpPr txBox="1"/>
+          <p:nvPr/>
+        </p:nvSpPr>
+        <p:spPr>
+          <a:xfrm>
+            <a:off x="188284" y="2654081"/>
+            <a:ext cx="748923" cy="246221"/>
+          </a:xfrm>
+          <a:prstGeom prst="rect">
+            <a:avLst/>
+          </a:prstGeom>
+          <a:noFill/>
+        </p:spPr>
+        <p:txBody>
+          <a:bodyPr wrap="none" rtlCol="0">
+            <a:spAutoFit/>
+          </a:bodyPr>
+          <a:lstStyle/>
+          <a:p>
+            <a:pPr algn="r"/>
+            <a:r>
+              <a:rPr lang="en-US" sz="1000" b="1" dirty="0" smtClean="0"/>
+              <a:t>Long Term</a:t>
+            </a:r>
+            <a:endParaRPr lang="en-US" sz="1000" b="1" dirty="0"/>
+          </a:p>
+        </p:txBody>
+      </p:sp>
+      <p:sp>
+        <p:nvSpPr>
+          <p:cNvPr id="53" name="TextBox 52"/>
+          <p:cNvSpPr txBox="1"/>
+          <p:nvPr/>
+        </p:nvSpPr>
+        <p:spPr>
+          <a:xfrm>
+            <a:off x="204577" y="3355774"/>
+            <a:ext cx="732630" cy="246221"/>
+          </a:xfrm>
+          <a:prstGeom prst="rect">
+            <a:avLst/>
+          </a:prstGeom>
+          <a:noFill/>
+        </p:spPr>
+        <p:txBody>
+          <a:bodyPr wrap="none" rtlCol="0">
+            <a:spAutoFit/>
+          </a:bodyPr>
+          <a:lstStyle/>
+          <a:p>
+            <a:pPr algn="r"/>
+            <a:r>
+              <a:rPr lang="en-US" sz="1000" b="1" dirty="0" smtClean="0"/>
+              <a:t>Parallel FS</a:t>
+            </a:r>
+            <a:endParaRPr lang="en-US" sz="1000" b="1" dirty="0"/>
+          </a:p>
+        </p:txBody>
+      </p:sp>
+      <p:sp>
+        <p:nvSpPr>
+          <p:cNvPr id="54" name="TextBox 53"/>
+          <p:cNvSpPr txBox="1"/>
+          <p:nvPr/>
+        </p:nvSpPr>
+        <p:spPr>
+          <a:xfrm>
+            <a:off x="223801" y="3631101"/>
+            <a:ext cx="713406" cy="246221"/>
+          </a:xfrm>
+          <a:prstGeom prst="rect">
+            <a:avLst/>
+          </a:prstGeom>
+          <a:noFill/>
+        </p:spPr>
+        <p:txBody>
+          <a:bodyPr wrap="none" rtlCol="0">
+            <a:spAutoFit/>
+          </a:bodyPr>
+          <a:lstStyle/>
+          <a:p>
+            <a:pPr algn="r"/>
+            <a:r>
+              <a:rPr lang="en-US" sz="1000" b="1" dirty="0" smtClean="0"/>
+              <a:t>Campaign</a:t>
+            </a:r>
+            <a:endParaRPr lang="en-US" sz="1000" b="1" dirty="0"/>
+          </a:p>
+        </p:txBody>
+      </p:sp>
+      <p:sp>
+        <p:nvSpPr>
+          <p:cNvPr id="55" name="TextBox 54"/>
+          <p:cNvSpPr txBox="1"/>
+          <p:nvPr/>
+        </p:nvSpPr>
+        <p:spPr>
+          <a:xfrm>
+            <a:off x="188284" y="3884303"/>
+            <a:ext cx="748923" cy="246221"/>
+          </a:xfrm>
+          <a:prstGeom prst="rect">
+            <a:avLst/>
+          </a:prstGeom>
+          <a:noFill/>
+        </p:spPr>
+        <p:txBody>
+          <a:bodyPr wrap="none" rtlCol="0">
+            <a:spAutoFit/>
+          </a:bodyPr>
+          <a:lstStyle/>
+          <a:p>
+            <a:pPr algn="r"/>
+            <a:r>
+              <a:rPr lang="en-US" sz="1000" b="1" dirty="0" smtClean="0"/>
+              <a:t>Long Term</a:t>
+            </a:r>
+            <a:endParaRPr lang="en-US" sz="1000" b="1" dirty="0"/>
+          </a:p>
+        </p:txBody>
+      </p:sp>
+      <p:cxnSp>
+        <p:nvCxnSpPr>
+          <p:cNvPr id="4" name="Straight Connector 3"/>
+          <p:cNvCxnSpPr/>
+          <p:nvPr/>
+        </p:nvCxnSpPr>
+        <p:spPr>
+          <a:xfrm>
+            <a:off x="188284" y="1891757"/>
+            <a:ext cx="4325594" cy="0"/>
+          </a:xfrm>
+          <a:prstGeom prst="line">
+            <a:avLst/>
+          </a:prstGeom>
+          <a:ln>
+            <a:solidFill>
+              <a:schemeClr val="bg1">
+                <a:lumMod val="85000"/>
+              </a:schemeClr>
+            </a:solidFill>
+          </a:ln>
+          <a:effectLst/>
+        </p:spPr>
+        <p:style>
+          <a:lnRef idx="2">
+            <a:schemeClr val="accent1"/>
+          </a:lnRef>
+          <a:fillRef idx="0">
+            <a:schemeClr val="accent1"/>
+          </a:fillRef>
+          <a:effectRef idx="1">
+            <a:schemeClr val="accent1"/>
+          </a:effectRef>
+          <a:fontRef idx="minor">
+            <a:schemeClr val="tx1"/>
+          </a:fontRef>
+        </p:style>
+      </p:cxnSp>
+      <p:cxnSp>
+        <p:nvCxnSpPr>
+          <p:cNvPr id="58" name="Straight Connector 57"/>
+          <p:cNvCxnSpPr/>
+          <p:nvPr/>
+        </p:nvCxnSpPr>
+        <p:spPr>
+          <a:xfrm>
+            <a:off x="188284" y="3077631"/>
+            <a:ext cx="4325594" cy="0"/>
+          </a:xfrm>
+          <a:prstGeom prst="line">
+            <a:avLst/>
+          </a:prstGeom>
+          <a:ln>
+            <a:solidFill>
+              <a:schemeClr val="bg1">
+                <a:lumMod val="85000"/>
+              </a:schemeClr>
+            </a:solidFill>
+          </a:ln>
+          <a:effectLst/>
+        </p:spPr>
+        <p:style>
+          <a:lnRef idx="2">
+            <a:schemeClr val="accent1"/>
+          </a:lnRef>
+          <a:fillRef idx="0">
+            <a:schemeClr val="accent1"/>
+          </a:fillRef>
+          <a:effectRef idx="1">
+            <a:schemeClr val="accent1"/>
+          </a:effectRef>
+          <a:fontRef idx="minor">
+            <a:schemeClr val="tx1"/>
+          </a:fontRef>
+        </p:style>
+      </p:cxnSp>
+      <p:sp>
+        <p:nvSpPr>
+          <p:cNvPr id="56" name="TextBox 55"/>
+          <p:cNvSpPr txBox="1"/>
+          <p:nvPr/>
+        </p:nvSpPr>
+        <p:spPr>
+          <a:xfrm>
+            <a:off x="1039776" y="944171"/>
+            <a:ext cx="2376588" cy="261610"/>
+          </a:xfrm>
+          <a:prstGeom prst="rect">
+            <a:avLst/>
+          </a:prstGeom>
+          <a:noFill/>
+        </p:spPr>
+        <p:txBody>
+          <a:bodyPr wrap="square" rtlCol="0">
+            <a:spAutoFit/>
+          </a:bodyPr>
+          <a:lstStyle/>
+          <a:p>
+            <a:r>
+              <a:rPr lang="en-US" sz="1100" i="1" dirty="0" smtClean="0"/>
+              <a:t>b. Refactored and </a:t>
+            </a:r>
+            <a:r>
+              <a:rPr lang="en-US" sz="1100" i="1" dirty="0"/>
+              <a:t>r</a:t>
+            </a:r>
+            <a:r>
+              <a:rPr lang="en-US" sz="1100" i="1" dirty="0" smtClean="0"/>
+              <a:t>educed data</a:t>
+            </a:r>
+            <a:endParaRPr lang="en-US" sz="1100" i="1" dirty="0"/>
+          </a:p>
+        </p:txBody>
+      </p:sp>
+      <p:cxnSp>
+        <p:nvCxnSpPr>
+          <p:cNvPr id="57" name="Straight Connector 56"/>
+          <p:cNvCxnSpPr/>
+          <p:nvPr/>
+        </p:nvCxnSpPr>
+        <p:spPr>
+          <a:xfrm flipV="1">
+            <a:off x="188284" y="954525"/>
+            <a:ext cx="4325594" cy="20708"/>
+          </a:xfrm>
+          <a:prstGeom prst="line">
+            <a:avLst/>
+          </a:prstGeom>
+          <a:ln>
+            <a:solidFill>
+              <a:schemeClr val="bg1">
+                <a:lumMod val="85000"/>
+              </a:schemeClr>
+            </a:solidFill>
+          </a:ln>
+          <a:effectLst/>
+        </p:spPr>
+        <p:style>
+          <a:lnRef idx="2">
+            <a:schemeClr val="accent1"/>
+          </a:lnRef>
+          <a:fillRef idx="0">
+            <a:schemeClr val="accent1"/>
+          </a:fillRef>
+          <a:effectRef idx="1">
+            <a:schemeClr val="accent1"/>
+          </a:effectRef>
+          <a:fontRef idx="minor">
+            <a:schemeClr val="tx1"/>
+          </a:fontRef>
+        </p:style>
+      </p:cxnSp>
+      <p:sp>
+        <p:nvSpPr>
+          <p:cNvPr id="59" name="TextBox 58"/>
+          <p:cNvSpPr txBox="1"/>
+          <p:nvPr/>
+        </p:nvSpPr>
+        <p:spPr>
+          <a:xfrm>
+            <a:off x="95172" y="1314493"/>
+            <a:ext cx="842035" cy="400110"/>
+          </a:xfrm>
+          <a:prstGeom prst="rect">
+            <a:avLst/>
+          </a:prstGeom>
+          <a:noFill/>
+        </p:spPr>
+        <p:txBody>
+          <a:bodyPr wrap="none" rtlCol="0">
+            <a:spAutoFit/>
+          </a:bodyPr>
+          <a:lstStyle/>
+          <a:p>
+            <a:pPr algn="r"/>
+            <a:r>
+              <a:rPr lang="en-US" sz="1000" b="1" dirty="0" smtClean="0"/>
+              <a:t>Application</a:t>
+            </a:r>
+          </a:p>
+          <a:p>
+            <a:pPr algn="r"/>
+            <a:r>
+              <a:rPr lang="en-US" sz="1000" b="1" dirty="0" smtClean="0"/>
+              <a:t>Memory</a:t>
+            </a:r>
+            <a:endParaRPr lang="en-US" sz="1000" b="1" dirty="0"/>
+          </a:p>
+        </p:txBody>
+      </p:sp>
+      <p:sp>
+        <p:nvSpPr>
+          <p:cNvPr id="60" name="TextBox 59"/>
+          <p:cNvSpPr txBox="1"/>
+          <p:nvPr/>
+        </p:nvSpPr>
+        <p:spPr>
+          <a:xfrm>
+            <a:off x="95172" y="332926"/>
+            <a:ext cx="842035" cy="400110"/>
+          </a:xfrm>
+          <a:prstGeom prst="rect">
+            <a:avLst/>
+          </a:prstGeom>
+          <a:noFill/>
+        </p:spPr>
+        <p:txBody>
+          <a:bodyPr wrap="none" rtlCol="0">
+            <a:spAutoFit/>
+          </a:bodyPr>
+          <a:lstStyle/>
+          <a:p>
+            <a:pPr algn="r"/>
+            <a:r>
+              <a:rPr lang="en-US" sz="1000" b="1" dirty="0" smtClean="0"/>
+              <a:t>Application</a:t>
+            </a:r>
+          </a:p>
+          <a:p>
+            <a:pPr algn="r"/>
+            <a:r>
+              <a:rPr lang="en-US" sz="1000" b="1" dirty="0" smtClean="0"/>
+              <a:t>Memory</a:t>
+            </a:r>
+            <a:endParaRPr lang="en-US" sz="1000" b="1" dirty="0"/>
+          </a:p>
+        </p:txBody>
+      </p:sp>
+      <p:sp>
+        <p:nvSpPr>
+          <p:cNvPr id="61" name="TextBox 60"/>
+          <p:cNvSpPr txBox="1"/>
+          <p:nvPr/>
+        </p:nvSpPr>
+        <p:spPr>
+          <a:xfrm>
+            <a:off x="1046085" y="0"/>
+            <a:ext cx="2376588" cy="261610"/>
+          </a:xfrm>
+          <a:prstGeom prst="rect">
+            <a:avLst/>
+          </a:prstGeom>
+          <a:noFill/>
+        </p:spPr>
+        <p:txBody>
+          <a:bodyPr wrap="square" rtlCol="0">
+            <a:spAutoFit/>
+          </a:bodyPr>
+          <a:lstStyle/>
+          <a:p>
+            <a:r>
+              <a:rPr lang="en-US" sz="1100" i="1" dirty="0" smtClean="0"/>
+              <a:t>a. Original memory arrangement</a:t>
+            </a:r>
+            <a:endParaRPr lang="en-US" sz="1100" i="1" dirty="0"/>
+          </a:p>
+        </p:txBody>
+      </p:sp>
+    </p:spTree>
+    <p:extLst>
+      <p:ext uri="{BB962C8B-B14F-4D97-AF65-F5344CB8AC3E}">
+        <p14:creationId xmlns:p14="http://schemas.microsoft.com/office/powerpoint/2010/main" val="748103420"/>
       </p:ext>
     </p:extLst>
   </p:cSld>

</xml_diff>